<commit_message>
Updates to capability model
</commit_message>
<xml_diff>
--- a/Werkgroep API architectuur/uitwerkingen/media/API Capabilities.pptx
+++ b/Werkgroep API architectuur/uitwerkingen/media/API Capabilities.pptx
@@ -7,6 +7,7 @@
   <p:sldIdLst>
     <p:sldId id="256" r:id="rId2"/>
     <p:sldId id="257" r:id="rId3"/>
+    <p:sldId id="258" r:id="rId4"/>
   </p:sldIdLst>
   <p:sldSz cx="12192000" cy="6858000"/>
   <p:notesSz cx="6858000" cy="9144000"/>
@@ -270,7 +271,7 @@
           <a:p>
             <a:fld id="{9C27045A-4E63-2949-8A05-DA4D85C37A94}" type="datetimeFigureOut">
               <a:rPr lang="en-NL" smtClean="0"/>
-              <a:t>30/12/2020</a:t>
+              <a:t>25/05/2021</a:t>
             </a:fld>
             <a:endParaRPr lang="en-NL"/>
           </a:p>
@@ -470,7 +471,7 @@
           <a:p>
             <a:fld id="{9C27045A-4E63-2949-8A05-DA4D85C37A94}" type="datetimeFigureOut">
               <a:rPr lang="en-NL" smtClean="0"/>
-              <a:t>30/12/2020</a:t>
+              <a:t>25/05/2021</a:t>
             </a:fld>
             <a:endParaRPr lang="en-NL"/>
           </a:p>
@@ -680,7 +681,7 @@
           <a:p>
             <a:fld id="{9C27045A-4E63-2949-8A05-DA4D85C37A94}" type="datetimeFigureOut">
               <a:rPr lang="en-NL" smtClean="0"/>
-              <a:t>30/12/2020</a:t>
+              <a:t>25/05/2021</a:t>
             </a:fld>
             <a:endParaRPr lang="en-NL"/>
           </a:p>
@@ -880,7 +881,7 @@
           <a:p>
             <a:fld id="{9C27045A-4E63-2949-8A05-DA4D85C37A94}" type="datetimeFigureOut">
               <a:rPr lang="en-NL" smtClean="0"/>
-              <a:t>30/12/2020</a:t>
+              <a:t>25/05/2021</a:t>
             </a:fld>
             <a:endParaRPr lang="en-NL"/>
           </a:p>
@@ -1156,7 +1157,7 @@
           <a:p>
             <a:fld id="{9C27045A-4E63-2949-8A05-DA4D85C37A94}" type="datetimeFigureOut">
               <a:rPr lang="en-NL" smtClean="0"/>
-              <a:t>30/12/2020</a:t>
+              <a:t>25/05/2021</a:t>
             </a:fld>
             <a:endParaRPr lang="en-NL"/>
           </a:p>
@@ -1424,7 +1425,7 @@
           <a:p>
             <a:fld id="{9C27045A-4E63-2949-8A05-DA4D85C37A94}" type="datetimeFigureOut">
               <a:rPr lang="en-NL" smtClean="0"/>
-              <a:t>30/12/2020</a:t>
+              <a:t>25/05/2021</a:t>
             </a:fld>
             <a:endParaRPr lang="en-NL"/>
           </a:p>
@@ -1839,7 +1840,7 @@
           <a:p>
             <a:fld id="{9C27045A-4E63-2949-8A05-DA4D85C37A94}" type="datetimeFigureOut">
               <a:rPr lang="en-NL" smtClean="0"/>
-              <a:t>30/12/2020</a:t>
+              <a:t>25/05/2021</a:t>
             </a:fld>
             <a:endParaRPr lang="en-NL"/>
           </a:p>
@@ -1981,7 +1982,7 @@
           <a:p>
             <a:fld id="{9C27045A-4E63-2949-8A05-DA4D85C37A94}" type="datetimeFigureOut">
               <a:rPr lang="en-NL" smtClean="0"/>
-              <a:t>30/12/2020</a:t>
+              <a:t>25/05/2021</a:t>
             </a:fld>
             <a:endParaRPr lang="en-NL"/>
           </a:p>
@@ -2094,7 +2095,7 @@
           <a:p>
             <a:fld id="{9C27045A-4E63-2949-8A05-DA4D85C37A94}" type="datetimeFigureOut">
               <a:rPr lang="en-NL" smtClean="0"/>
-              <a:t>30/12/2020</a:t>
+              <a:t>25/05/2021</a:t>
             </a:fld>
             <a:endParaRPr lang="en-NL"/>
           </a:p>
@@ -2407,7 +2408,7 @@
           <a:p>
             <a:fld id="{9C27045A-4E63-2949-8A05-DA4D85C37A94}" type="datetimeFigureOut">
               <a:rPr lang="en-NL" smtClean="0"/>
-              <a:t>30/12/2020</a:t>
+              <a:t>25/05/2021</a:t>
             </a:fld>
             <a:endParaRPr lang="en-NL"/>
           </a:p>
@@ -2696,7 +2697,7 @@
           <a:p>
             <a:fld id="{9C27045A-4E63-2949-8A05-DA4D85C37A94}" type="datetimeFigureOut">
               <a:rPr lang="en-NL" smtClean="0"/>
-              <a:t>30/12/2020</a:t>
+              <a:t>25/05/2021</a:t>
             </a:fld>
             <a:endParaRPr lang="en-NL"/>
           </a:p>
@@ -2939,7 +2940,7 @@
           <a:p>
             <a:fld id="{9C27045A-4E63-2949-8A05-DA4D85C37A94}" type="datetimeFigureOut">
               <a:rPr lang="en-NL" smtClean="0"/>
-              <a:t>30/12/2020</a:t>
+              <a:t>25/05/2021</a:t>
             </a:fld>
             <a:endParaRPr lang="en-NL"/>
           </a:p>
@@ -8650,6 +8651,2487 @@
 </p:sld>
 </file>
 
+<file path=ppt/slides/slide3.xml><?xml version="1.0" encoding="utf-8"?>
+<p:sld xmlns:a="http://schemas.openxmlformats.org/drawingml/2006/main" xmlns:r="http://schemas.openxmlformats.org/officeDocument/2006/relationships" xmlns:p="http://schemas.openxmlformats.org/presentationml/2006/main">
+  <p:cSld>
+    <p:spTree>
+      <p:nvGrpSpPr>
+        <p:cNvPr id="1" name=""/>
+        <p:cNvGrpSpPr/>
+        <p:nvPr/>
+      </p:nvGrpSpPr>
+      <p:grpSpPr>
+        <a:xfrm>
+          <a:off x="0" y="0"/>
+          <a:ext cx="0" cy="0"/>
+          <a:chOff x="0" y="0"/>
+          <a:chExt cx="0" cy="0"/>
+        </a:xfrm>
+      </p:grpSpPr>
+      <p:sp>
+        <p:nvSpPr>
+          <p:cNvPr id="4" name="Rounded Rectangle 3">
+            <a:extLst>
+              <a:ext uri="{FF2B5EF4-FFF2-40B4-BE49-F238E27FC236}">
+                <a16:creationId xmlns:a16="http://schemas.microsoft.com/office/drawing/2014/main" id="{7C48F387-C0FB-1744-A07B-DCFCA8ED2C34}"/>
+              </a:ext>
+            </a:extLst>
+          </p:cNvPr>
+          <p:cNvSpPr/>
+          <p:nvPr/>
+        </p:nvSpPr>
+        <p:spPr>
+          <a:xfrm>
+            <a:off x="30876" y="24461"/>
+            <a:ext cx="2884607" cy="3743310"/>
+          </a:xfrm>
+          <a:prstGeom prst="roundRect">
+            <a:avLst>
+              <a:gd name="adj" fmla="val 2100"/>
+            </a:avLst>
+          </a:prstGeom>
+          <a:solidFill>
+            <a:srgbClr val="A6A6A6"/>
+          </a:solidFill>
+        </p:spPr>
+        <p:style>
+          <a:lnRef idx="2">
+            <a:schemeClr val="accent1">
+              <a:shade val="50000"/>
+            </a:schemeClr>
+          </a:lnRef>
+          <a:fillRef idx="1">
+            <a:schemeClr val="accent1"/>
+          </a:fillRef>
+          <a:effectRef idx="0">
+            <a:schemeClr val="accent1"/>
+          </a:effectRef>
+          <a:fontRef idx="minor">
+            <a:schemeClr val="lt1"/>
+          </a:fontRef>
+        </p:style>
+        <p:txBody>
+          <a:bodyPr rtlCol="0" anchor="t"/>
+          <a:lstStyle/>
+          <a:p>
+            <a:pPr algn="ctr"/>
+            <a:r>
+              <a:rPr lang="nl-NL" sz="1600" dirty="0">
+                <a:solidFill>
+                  <a:sysClr val="windowText" lastClr="000000"/>
+                </a:solidFill>
+              </a:rPr>
+              <a:t>Registratie &amp; Gebruik</a:t>
+            </a:r>
+            <a:endParaRPr lang="en-NL" sz="1600" dirty="0">
+              <a:solidFill>
+                <a:sysClr val="windowText" lastClr="000000"/>
+              </a:solidFill>
+            </a:endParaRPr>
+          </a:p>
+        </p:txBody>
+      </p:sp>
+      <p:sp>
+        <p:nvSpPr>
+          <p:cNvPr id="38" name="Rounded Rectangle 37">
+            <a:extLst>
+              <a:ext uri="{FF2B5EF4-FFF2-40B4-BE49-F238E27FC236}">
+                <a16:creationId xmlns:a16="http://schemas.microsoft.com/office/drawing/2014/main" id="{64AB7C67-AF7C-4D40-A632-BC5D568267BD}"/>
+              </a:ext>
+            </a:extLst>
+          </p:cNvPr>
+          <p:cNvSpPr/>
+          <p:nvPr/>
+        </p:nvSpPr>
+        <p:spPr>
+          <a:xfrm>
+            <a:off x="30876" y="3833828"/>
+            <a:ext cx="7375764" cy="3024172"/>
+          </a:xfrm>
+          <a:prstGeom prst="roundRect">
+            <a:avLst>
+              <a:gd name="adj" fmla="val 2100"/>
+            </a:avLst>
+          </a:prstGeom>
+          <a:solidFill>
+            <a:srgbClr val="A6A6A6"/>
+          </a:solidFill>
+        </p:spPr>
+        <p:style>
+          <a:lnRef idx="2">
+            <a:schemeClr val="accent1">
+              <a:shade val="50000"/>
+            </a:schemeClr>
+          </a:lnRef>
+          <a:fillRef idx="1">
+            <a:schemeClr val="accent1"/>
+          </a:fillRef>
+          <a:effectRef idx="0">
+            <a:schemeClr val="accent1"/>
+          </a:effectRef>
+          <a:fontRef idx="minor">
+            <a:schemeClr val="lt1"/>
+          </a:fontRef>
+        </p:style>
+        <p:txBody>
+          <a:bodyPr rtlCol="0" anchor="t"/>
+          <a:lstStyle/>
+          <a:p>
+            <a:pPr algn="ctr"/>
+            <a:r>
+              <a:rPr lang="nl-NL" sz="1600" dirty="0">
+                <a:solidFill>
+                  <a:sysClr val="windowText" lastClr="000000"/>
+                </a:solidFill>
+              </a:rPr>
+              <a:t>Runtime</a:t>
+            </a:r>
+            <a:endParaRPr lang="en-NL" sz="1600" dirty="0">
+              <a:solidFill>
+                <a:sysClr val="windowText" lastClr="000000"/>
+              </a:solidFill>
+            </a:endParaRPr>
+          </a:p>
+        </p:txBody>
+      </p:sp>
+      <p:sp>
+        <p:nvSpPr>
+          <p:cNvPr id="53" name="Rounded Rectangle 52">
+            <a:extLst>
+              <a:ext uri="{FF2B5EF4-FFF2-40B4-BE49-F238E27FC236}">
+                <a16:creationId xmlns:a16="http://schemas.microsoft.com/office/drawing/2014/main" id="{E852891F-751B-8F4E-8F16-061050A7EC0C}"/>
+              </a:ext>
+            </a:extLst>
+          </p:cNvPr>
+          <p:cNvSpPr/>
+          <p:nvPr/>
+        </p:nvSpPr>
+        <p:spPr>
+          <a:xfrm>
+            <a:off x="81828" y="1370481"/>
+            <a:ext cx="2777677" cy="2320170"/>
+          </a:xfrm>
+          <a:prstGeom prst="roundRect">
+            <a:avLst>
+              <a:gd name="adj" fmla="val 2100"/>
+            </a:avLst>
+          </a:prstGeom>
+          <a:solidFill>
+            <a:srgbClr val="D9D9D9"/>
+          </a:solidFill>
+        </p:spPr>
+        <p:style>
+          <a:lnRef idx="2">
+            <a:schemeClr val="accent1">
+              <a:shade val="50000"/>
+            </a:schemeClr>
+          </a:lnRef>
+          <a:fillRef idx="1">
+            <a:schemeClr val="accent1"/>
+          </a:fillRef>
+          <a:effectRef idx="0">
+            <a:schemeClr val="accent1"/>
+          </a:effectRef>
+          <a:fontRef idx="minor">
+            <a:schemeClr val="lt1"/>
+          </a:fontRef>
+        </p:style>
+        <p:txBody>
+          <a:bodyPr rtlCol="0" anchor="t"/>
+          <a:lstStyle/>
+          <a:p>
+            <a:pPr algn="ctr"/>
+            <a:r>
+              <a:rPr lang="en-NL" sz="1400" dirty="0">
+                <a:solidFill>
+                  <a:sysClr val="windowText" lastClr="000000"/>
+                </a:solidFill>
+              </a:rPr>
+              <a:t>Ontdekken</a:t>
+            </a:r>
+          </a:p>
+        </p:txBody>
+      </p:sp>
+      <p:sp>
+        <p:nvSpPr>
+          <p:cNvPr id="5" name="Rounded Rectangle 4">
+            <a:extLst>
+              <a:ext uri="{FF2B5EF4-FFF2-40B4-BE49-F238E27FC236}">
+                <a16:creationId xmlns:a16="http://schemas.microsoft.com/office/drawing/2014/main" id="{86E0E427-3389-D24A-9559-2F0767B28EF5}"/>
+              </a:ext>
+            </a:extLst>
+          </p:cNvPr>
+          <p:cNvSpPr/>
+          <p:nvPr/>
+        </p:nvSpPr>
+        <p:spPr>
+          <a:xfrm>
+            <a:off x="150929" y="1678272"/>
+            <a:ext cx="1299434" cy="573336"/>
+          </a:xfrm>
+          <a:prstGeom prst="roundRect">
+            <a:avLst/>
+          </a:prstGeom>
+          <a:solidFill>
+            <a:srgbClr val="3A4298"/>
+          </a:solidFill>
+        </p:spPr>
+        <p:style>
+          <a:lnRef idx="2">
+            <a:schemeClr val="accent1">
+              <a:shade val="50000"/>
+            </a:schemeClr>
+          </a:lnRef>
+          <a:fillRef idx="1">
+            <a:schemeClr val="accent1"/>
+          </a:fillRef>
+          <a:effectRef idx="0">
+            <a:schemeClr val="accent1"/>
+          </a:effectRef>
+          <a:fontRef idx="minor">
+            <a:schemeClr val="lt1"/>
+          </a:fontRef>
+        </p:style>
+        <p:txBody>
+          <a:bodyPr rtlCol="0" anchor="ctr"/>
+          <a:lstStyle/>
+          <a:p>
+            <a:pPr algn="ctr"/>
+            <a:r>
+              <a:rPr lang="en-NL" sz="1200" dirty="0">
+                <a:latin typeface="+mj-lt"/>
+              </a:rPr>
+              <a:t>API Discovery</a:t>
+            </a:r>
+          </a:p>
+        </p:txBody>
+      </p:sp>
+      <p:sp>
+        <p:nvSpPr>
+          <p:cNvPr id="6" name="Rounded Rectangle 5">
+            <a:extLst>
+              <a:ext uri="{FF2B5EF4-FFF2-40B4-BE49-F238E27FC236}">
+                <a16:creationId xmlns:a16="http://schemas.microsoft.com/office/drawing/2014/main" id="{F3DD20AC-5BB9-5041-A56A-B6C74D072F27}"/>
+              </a:ext>
+            </a:extLst>
+          </p:cNvPr>
+          <p:cNvSpPr/>
+          <p:nvPr/>
+        </p:nvSpPr>
+        <p:spPr>
+          <a:xfrm>
+            <a:off x="150929" y="2328162"/>
+            <a:ext cx="1299434" cy="573336"/>
+          </a:xfrm>
+          <a:prstGeom prst="roundRect">
+            <a:avLst/>
+          </a:prstGeom>
+          <a:solidFill>
+            <a:srgbClr val="3A4298"/>
+          </a:solidFill>
+        </p:spPr>
+        <p:style>
+          <a:lnRef idx="2">
+            <a:schemeClr val="accent1">
+              <a:shade val="50000"/>
+            </a:schemeClr>
+          </a:lnRef>
+          <a:fillRef idx="1">
+            <a:schemeClr val="accent1"/>
+          </a:fillRef>
+          <a:effectRef idx="0">
+            <a:schemeClr val="accent1"/>
+          </a:effectRef>
+          <a:fontRef idx="minor">
+            <a:schemeClr val="lt1"/>
+          </a:fontRef>
+        </p:style>
+        <p:txBody>
+          <a:bodyPr rtlCol="0" anchor="ctr"/>
+          <a:lstStyle/>
+          <a:p>
+            <a:pPr algn="ctr"/>
+            <a:r>
+              <a:rPr lang="nl-NL" sz="1200" dirty="0">
+                <a:latin typeface="+mj-lt"/>
+              </a:rPr>
+              <a:t>Proeftuin</a:t>
+            </a:r>
+            <a:endParaRPr lang="en-NL" sz="1200" dirty="0">
+              <a:latin typeface="+mj-lt"/>
+            </a:endParaRPr>
+          </a:p>
+        </p:txBody>
+      </p:sp>
+      <p:sp>
+        <p:nvSpPr>
+          <p:cNvPr id="7" name="Rounded Rectangle 6">
+            <a:extLst>
+              <a:ext uri="{FF2B5EF4-FFF2-40B4-BE49-F238E27FC236}">
+                <a16:creationId xmlns:a16="http://schemas.microsoft.com/office/drawing/2014/main" id="{EB123578-E907-044D-A528-9A262A27CD96}"/>
+              </a:ext>
+            </a:extLst>
+          </p:cNvPr>
+          <p:cNvSpPr/>
+          <p:nvPr/>
+        </p:nvSpPr>
+        <p:spPr>
+          <a:xfrm>
+            <a:off x="1508901" y="1678272"/>
+            <a:ext cx="1299434" cy="573336"/>
+          </a:xfrm>
+          <a:prstGeom prst="roundRect">
+            <a:avLst/>
+          </a:prstGeom>
+          <a:solidFill>
+            <a:srgbClr val="3A4298"/>
+          </a:solidFill>
+        </p:spPr>
+        <p:style>
+          <a:lnRef idx="2">
+            <a:schemeClr val="accent1">
+              <a:shade val="50000"/>
+            </a:schemeClr>
+          </a:lnRef>
+          <a:fillRef idx="1">
+            <a:schemeClr val="accent1"/>
+          </a:fillRef>
+          <a:effectRef idx="0">
+            <a:schemeClr val="accent1"/>
+          </a:effectRef>
+          <a:fontRef idx="minor">
+            <a:schemeClr val="lt1"/>
+          </a:fontRef>
+        </p:style>
+        <p:txBody>
+          <a:bodyPr rtlCol="0" anchor="ctr"/>
+          <a:lstStyle/>
+          <a:p>
+            <a:pPr algn="ctr"/>
+            <a:r>
+              <a:rPr lang="nl-NL" sz="1200" dirty="0">
+                <a:latin typeface="+mj-lt"/>
+              </a:rPr>
+              <a:t>Specificatie &amp; D</a:t>
+            </a:r>
+            <a:r>
+              <a:rPr lang="en-NL" sz="1200" dirty="0">
+                <a:latin typeface="+mj-lt"/>
+              </a:rPr>
+              <a:t>ocumentatie</a:t>
+            </a:r>
+          </a:p>
+        </p:txBody>
+      </p:sp>
+      <p:sp>
+        <p:nvSpPr>
+          <p:cNvPr id="59" name="Rounded Rectangle 58">
+            <a:extLst>
+              <a:ext uri="{FF2B5EF4-FFF2-40B4-BE49-F238E27FC236}">
+                <a16:creationId xmlns:a16="http://schemas.microsoft.com/office/drawing/2014/main" id="{A708E40B-C400-D749-86D0-3C375F29DA7D}"/>
+              </a:ext>
+            </a:extLst>
+          </p:cNvPr>
+          <p:cNvSpPr/>
+          <p:nvPr/>
+        </p:nvSpPr>
+        <p:spPr>
+          <a:xfrm>
+            <a:off x="1508901" y="2328162"/>
+            <a:ext cx="1299434" cy="573336"/>
+          </a:xfrm>
+          <a:prstGeom prst="roundRect">
+            <a:avLst/>
+          </a:prstGeom>
+          <a:solidFill>
+            <a:srgbClr val="3A4298"/>
+          </a:solidFill>
+        </p:spPr>
+        <p:style>
+          <a:lnRef idx="2">
+            <a:schemeClr val="accent1">
+              <a:shade val="50000"/>
+            </a:schemeClr>
+          </a:lnRef>
+          <a:fillRef idx="1">
+            <a:schemeClr val="accent1"/>
+          </a:fillRef>
+          <a:effectRef idx="0">
+            <a:schemeClr val="accent1"/>
+          </a:effectRef>
+          <a:fontRef idx="minor">
+            <a:schemeClr val="lt1"/>
+          </a:fontRef>
+        </p:style>
+        <p:txBody>
+          <a:bodyPr rtlCol="0" anchor="ctr"/>
+          <a:lstStyle/>
+          <a:p>
+            <a:pPr algn="ctr"/>
+            <a:r>
+              <a:rPr lang="nl-NL" sz="1200" dirty="0">
+                <a:latin typeface="+mj-lt"/>
+              </a:rPr>
+              <a:t>Code voorbeelden &amp; </a:t>
+            </a:r>
+            <a:r>
+              <a:rPr lang="en-NL" sz="1200" dirty="0">
+                <a:latin typeface="+mj-lt"/>
+              </a:rPr>
+              <a:t>SDK</a:t>
+            </a:r>
+          </a:p>
+        </p:txBody>
+      </p:sp>
+      <p:sp>
+        <p:nvSpPr>
+          <p:cNvPr id="54" name="Rounded Rectangle 53">
+            <a:extLst>
+              <a:ext uri="{FF2B5EF4-FFF2-40B4-BE49-F238E27FC236}">
+                <a16:creationId xmlns:a16="http://schemas.microsoft.com/office/drawing/2014/main" id="{F48D20D8-D6EB-2046-BD6E-53F25FB03E25}"/>
+              </a:ext>
+            </a:extLst>
+          </p:cNvPr>
+          <p:cNvSpPr/>
+          <p:nvPr/>
+        </p:nvSpPr>
+        <p:spPr>
+          <a:xfrm>
+            <a:off x="81828" y="373862"/>
+            <a:ext cx="2777677" cy="944564"/>
+          </a:xfrm>
+          <a:prstGeom prst="roundRect">
+            <a:avLst>
+              <a:gd name="adj" fmla="val 2100"/>
+            </a:avLst>
+          </a:prstGeom>
+          <a:solidFill>
+            <a:srgbClr val="D9D9D9"/>
+          </a:solidFill>
+        </p:spPr>
+        <p:style>
+          <a:lnRef idx="2">
+            <a:schemeClr val="accent1">
+              <a:shade val="50000"/>
+            </a:schemeClr>
+          </a:lnRef>
+          <a:fillRef idx="1">
+            <a:schemeClr val="accent1"/>
+          </a:fillRef>
+          <a:effectRef idx="0">
+            <a:schemeClr val="accent1"/>
+          </a:effectRef>
+          <a:fontRef idx="minor">
+            <a:schemeClr val="lt1"/>
+          </a:fontRef>
+        </p:style>
+        <p:txBody>
+          <a:bodyPr rtlCol="0" anchor="t"/>
+          <a:lstStyle/>
+          <a:p>
+            <a:pPr algn="ctr"/>
+            <a:r>
+              <a:rPr lang="en-NL" sz="1400" dirty="0">
+                <a:solidFill>
+                  <a:sysClr val="windowText" lastClr="000000"/>
+                </a:solidFill>
+              </a:rPr>
+              <a:t>Aanmelden &amp; Registratie</a:t>
+            </a:r>
+          </a:p>
+        </p:txBody>
+      </p:sp>
+      <p:sp>
+        <p:nvSpPr>
+          <p:cNvPr id="8" name="Rounded Rectangle 7">
+            <a:extLst>
+              <a:ext uri="{FF2B5EF4-FFF2-40B4-BE49-F238E27FC236}">
+                <a16:creationId xmlns:a16="http://schemas.microsoft.com/office/drawing/2014/main" id="{450200C0-5DD2-E343-AF7F-2AF4A72E5E60}"/>
+              </a:ext>
+            </a:extLst>
+          </p:cNvPr>
+          <p:cNvSpPr/>
+          <p:nvPr/>
+        </p:nvSpPr>
+        <p:spPr>
+          <a:xfrm>
+            <a:off x="1508901" y="689401"/>
+            <a:ext cx="1299434" cy="573336"/>
+          </a:xfrm>
+          <a:prstGeom prst="roundRect">
+            <a:avLst/>
+          </a:prstGeom>
+          <a:solidFill>
+            <a:srgbClr val="3A4298"/>
+          </a:solidFill>
+        </p:spPr>
+        <p:style>
+          <a:lnRef idx="2">
+            <a:schemeClr val="accent1">
+              <a:shade val="50000"/>
+            </a:schemeClr>
+          </a:lnRef>
+          <a:fillRef idx="1">
+            <a:schemeClr val="accent1"/>
+          </a:fillRef>
+          <a:effectRef idx="0">
+            <a:schemeClr val="accent1"/>
+          </a:effectRef>
+          <a:fontRef idx="minor">
+            <a:schemeClr val="lt1"/>
+          </a:fontRef>
+        </p:style>
+        <p:txBody>
+          <a:bodyPr rtlCol="0" anchor="ctr"/>
+          <a:lstStyle/>
+          <a:p>
+            <a:pPr algn="ctr"/>
+            <a:r>
+              <a:rPr lang="nl-NL" sz="1200" dirty="0">
+                <a:latin typeface="+mj-lt"/>
+              </a:rPr>
+              <a:t>Applicatie registratie</a:t>
+            </a:r>
+            <a:endParaRPr lang="en-NL" sz="1200" dirty="0">
+              <a:latin typeface="+mj-lt"/>
+            </a:endParaRPr>
+          </a:p>
+        </p:txBody>
+      </p:sp>
+      <p:sp>
+        <p:nvSpPr>
+          <p:cNvPr id="9" name="Rounded Rectangle 8">
+            <a:extLst>
+              <a:ext uri="{FF2B5EF4-FFF2-40B4-BE49-F238E27FC236}">
+                <a16:creationId xmlns:a16="http://schemas.microsoft.com/office/drawing/2014/main" id="{302CB914-8FCC-D94F-98D1-3FC184057CEF}"/>
+              </a:ext>
+            </a:extLst>
+          </p:cNvPr>
+          <p:cNvSpPr/>
+          <p:nvPr/>
+        </p:nvSpPr>
+        <p:spPr>
+          <a:xfrm>
+            <a:off x="150929" y="689401"/>
+            <a:ext cx="1299434" cy="573336"/>
+          </a:xfrm>
+          <a:prstGeom prst="roundRect">
+            <a:avLst/>
+          </a:prstGeom>
+          <a:solidFill>
+            <a:srgbClr val="3A4298"/>
+          </a:solidFill>
+        </p:spPr>
+        <p:style>
+          <a:lnRef idx="2">
+            <a:schemeClr val="accent1">
+              <a:shade val="50000"/>
+            </a:schemeClr>
+          </a:lnRef>
+          <a:fillRef idx="1">
+            <a:schemeClr val="accent1"/>
+          </a:fillRef>
+          <a:effectRef idx="0">
+            <a:schemeClr val="accent1"/>
+          </a:effectRef>
+          <a:fontRef idx="minor">
+            <a:schemeClr val="lt1"/>
+          </a:fontRef>
+        </p:style>
+        <p:txBody>
+          <a:bodyPr rtlCol="0" anchor="ctr"/>
+          <a:lstStyle/>
+          <a:p>
+            <a:pPr algn="ctr"/>
+            <a:r>
+              <a:rPr lang="en-NL" sz="1200" dirty="0">
+                <a:latin typeface="+mj-lt"/>
+              </a:rPr>
+              <a:t>Ontwikkelaar onboarding</a:t>
+            </a:r>
+          </a:p>
+        </p:txBody>
+      </p:sp>
+      <p:sp>
+        <p:nvSpPr>
+          <p:cNvPr id="61" name="Rounded Rectangle 60">
+            <a:extLst>
+              <a:ext uri="{FF2B5EF4-FFF2-40B4-BE49-F238E27FC236}">
+                <a16:creationId xmlns:a16="http://schemas.microsoft.com/office/drawing/2014/main" id="{1883E248-0E21-E74F-96F8-11BB739EA99C}"/>
+              </a:ext>
+            </a:extLst>
+          </p:cNvPr>
+          <p:cNvSpPr/>
+          <p:nvPr/>
+        </p:nvSpPr>
+        <p:spPr>
+          <a:xfrm>
+            <a:off x="3008747" y="24460"/>
+            <a:ext cx="4397893" cy="3743309"/>
+          </a:xfrm>
+          <a:prstGeom prst="roundRect">
+            <a:avLst>
+              <a:gd name="adj" fmla="val 2100"/>
+            </a:avLst>
+          </a:prstGeom>
+          <a:solidFill>
+            <a:srgbClr val="A6A6A6"/>
+          </a:solidFill>
+        </p:spPr>
+        <p:style>
+          <a:lnRef idx="2">
+            <a:schemeClr val="accent1">
+              <a:shade val="50000"/>
+            </a:schemeClr>
+          </a:lnRef>
+          <a:fillRef idx="1">
+            <a:schemeClr val="accent1"/>
+          </a:fillRef>
+          <a:effectRef idx="0">
+            <a:schemeClr val="accent1"/>
+          </a:effectRef>
+          <a:fontRef idx="minor">
+            <a:schemeClr val="lt1"/>
+          </a:fontRef>
+        </p:style>
+        <p:txBody>
+          <a:bodyPr rtlCol="0" anchor="t"/>
+          <a:lstStyle/>
+          <a:p>
+            <a:pPr algn="ctr"/>
+            <a:r>
+              <a:rPr lang="nl-NL" sz="1600" dirty="0">
+                <a:solidFill>
+                  <a:sysClr val="windowText" lastClr="000000"/>
+                </a:solidFill>
+              </a:rPr>
+              <a:t>Realisatie &amp; Beheer</a:t>
+            </a:r>
+            <a:endParaRPr lang="en-NL" sz="1600" dirty="0">
+              <a:solidFill>
+                <a:sysClr val="windowText" lastClr="000000"/>
+              </a:solidFill>
+            </a:endParaRPr>
+          </a:p>
+        </p:txBody>
+      </p:sp>
+      <p:sp>
+        <p:nvSpPr>
+          <p:cNvPr id="42" name="Rounded Rectangle 41">
+            <a:extLst>
+              <a:ext uri="{FF2B5EF4-FFF2-40B4-BE49-F238E27FC236}">
+                <a16:creationId xmlns:a16="http://schemas.microsoft.com/office/drawing/2014/main" id="{A6AC3A0E-53C4-194D-B2E0-0325DE0D10B3}"/>
+              </a:ext>
+            </a:extLst>
+          </p:cNvPr>
+          <p:cNvSpPr/>
+          <p:nvPr/>
+        </p:nvSpPr>
+        <p:spPr>
+          <a:xfrm>
+            <a:off x="3058130" y="4886620"/>
+            <a:ext cx="1299434" cy="573336"/>
+          </a:xfrm>
+          <a:prstGeom prst="roundRect">
+            <a:avLst/>
+          </a:prstGeom>
+          <a:solidFill>
+            <a:srgbClr val="3A4298"/>
+          </a:solidFill>
+        </p:spPr>
+        <p:style>
+          <a:lnRef idx="2">
+            <a:schemeClr val="accent1">
+              <a:shade val="50000"/>
+            </a:schemeClr>
+          </a:lnRef>
+          <a:fillRef idx="1">
+            <a:schemeClr val="accent1"/>
+          </a:fillRef>
+          <a:effectRef idx="0">
+            <a:schemeClr val="accent1"/>
+          </a:effectRef>
+          <a:fontRef idx="minor">
+            <a:schemeClr val="lt1"/>
+          </a:fontRef>
+        </p:style>
+        <p:txBody>
+          <a:bodyPr rtlCol="0" anchor="ctr"/>
+          <a:lstStyle/>
+          <a:p>
+            <a:pPr algn="ctr"/>
+            <a:r>
+              <a:rPr lang="en-NL" sz="1200" dirty="0">
+                <a:latin typeface="+mj-lt"/>
+              </a:rPr>
+              <a:t>Monitoring &amp; Alerting</a:t>
+            </a:r>
+          </a:p>
+        </p:txBody>
+      </p:sp>
+      <p:sp>
+        <p:nvSpPr>
+          <p:cNvPr id="35" name="Rounded Rectangle 34">
+            <a:extLst>
+              <a:ext uri="{FF2B5EF4-FFF2-40B4-BE49-F238E27FC236}">
+                <a16:creationId xmlns:a16="http://schemas.microsoft.com/office/drawing/2014/main" id="{23700455-5CF1-084B-93E4-CE7E87E87DD4}"/>
+              </a:ext>
+            </a:extLst>
+          </p:cNvPr>
+          <p:cNvSpPr/>
+          <p:nvPr/>
+        </p:nvSpPr>
+        <p:spPr>
+          <a:xfrm>
+            <a:off x="1603901" y="4886620"/>
+            <a:ext cx="1299434" cy="573336"/>
+          </a:xfrm>
+          <a:prstGeom prst="roundRect">
+            <a:avLst/>
+          </a:prstGeom>
+          <a:solidFill>
+            <a:srgbClr val="3A4298"/>
+          </a:solidFill>
+        </p:spPr>
+        <p:style>
+          <a:lnRef idx="2">
+            <a:schemeClr val="accent1">
+              <a:shade val="50000"/>
+            </a:schemeClr>
+          </a:lnRef>
+          <a:fillRef idx="1">
+            <a:schemeClr val="accent1"/>
+          </a:fillRef>
+          <a:effectRef idx="0">
+            <a:schemeClr val="accent1"/>
+          </a:effectRef>
+          <a:fontRef idx="minor">
+            <a:schemeClr val="lt1"/>
+          </a:fontRef>
+        </p:style>
+        <p:txBody>
+          <a:bodyPr rtlCol="0" anchor="ctr"/>
+          <a:lstStyle/>
+          <a:p>
+            <a:pPr algn="ctr"/>
+            <a:r>
+              <a:rPr lang="en-NL" sz="1200" dirty="0">
+                <a:latin typeface="+mj-lt"/>
+              </a:rPr>
+              <a:t>Logging </a:t>
+            </a:r>
+            <a:r>
+              <a:rPr lang="nl-NL" sz="1200" dirty="0">
+                <a:latin typeface="+mj-lt"/>
+              </a:rPr>
+              <a:t>&amp;</a:t>
+            </a:r>
+            <a:r>
+              <a:rPr lang="en-NL" sz="1200" dirty="0">
+                <a:latin typeface="+mj-lt"/>
+              </a:rPr>
+              <a:t> Audit Trail</a:t>
+            </a:r>
+          </a:p>
+        </p:txBody>
+      </p:sp>
+      <p:sp>
+        <p:nvSpPr>
+          <p:cNvPr id="77" name="Rounded Rectangle 34">
+            <a:extLst>
+              <a:ext uri="{FF2B5EF4-FFF2-40B4-BE49-F238E27FC236}">
+                <a16:creationId xmlns:a16="http://schemas.microsoft.com/office/drawing/2014/main" id="{23700455-5CF1-084B-93E4-CE7E87E87DD4}"/>
+              </a:ext>
+            </a:extLst>
+          </p:cNvPr>
+          <p:cNvSpPr/>
+          <p:nvPr/>
+        </p:nvSpPr>
+        <p:spPr>
+          <a:xfrm>
+            <a:off x="4512359" y="4886620"/>
+            <a:ext cx="1299434" cy="573336"/>
+          </a:xfrm>
+          <a:prstGeom prst="roundRect">
+            <a:avLst/>
+          </a:prstGeom>
+          <a:solidFill>
+            <a:srgbClr val="3A4298"/>
+          </a:solidFill>
+        </p:spPr>
+        <p:style>
+          <a:lnRef idx="2">
+            <a:schemeClr val="accent1">
+              <a:shade val="50000"/>
+            </a:schemeClr>
+          </a:lnRef>
+          <a:fillRef idx="1">
+            <a:schemeClr val="accent1"/>
+          </a:fillRef>
+          <a:effectRef idx="0">
+            <a:schemeClr val="accent1"/>
+          </a:effectRef>
+          <a:fontRef idx="minor">
+            <a:schemeClr val="lt1"/>
+          </a:fontRef>
+        </p:style>
+        <p:txBody>
+          <a:bodyPr rtlCol="0" anchor="ctr"/>
+          <a:lstStyle/>
+          <a:p>
+            <a:pPr algn="ctr"/>
+            <a:r>
+              <a:rPr lang="nl-NL" sz="1200" dirty="0">
+                <a:latin typeface="+mj-lt"/>
+              </a:rPr>
+              <a:t>Analytics &amp; Dashboarding</a:t>
+            </a:r>
+            <a:endParaRPr lang="en-NL" sz="1200" dirty="0">
+              <a:latin typeface="+mj-lt"/>
+            </a:endParaRPr>
+          </a:p>
+        </p:txBody>
+      </p:sp>
+      <p:sp>
+        <p:nvSpPr>
+          <p:cNvPr id="44" name="Rounded Rectangle 43">
+            <a:extLst>
+              <a:ext uri="{FF2B5EF4-FFF2-40B4-BE49-F238E27FC236}">
+                <a16:creationId xmlns:a16="http://schemas.microsoft.com/office/drawing/2014/main" id="{B62883E1-8D45-F147-988F-B25B6ADC8673}"/>
+              </a:ext>
+            </a:extLst>
+          </p:cNvPr>
+          <p:cNvSpPr/>
+          <p:nvPr/>
+        </p:nvSpPr>
+        <p:spPr>
+          <a:xfrm>
+            <a:off x="5966588" y="4886620"/>
+            <a:ext cx="1299434" cy="573336"/>
+          </a:xfrm>
+          <a:prstGeom prst="roundRect">
+            <a:avLst/>
+          </a:prstGeom>
+          <a:solidFill>
+            <a:srgbClr val="3A4298"/>
+          </a:solidFill>
+        </p:spPr>
+        <p:style>
+          <a:lnRef idx="2">
+            <a:schemeClr val="accent1">
+              <a:shade val="50000"/>
+            </a:schemeClr>
+          </a:lnRef>
+          <a:fillRef idx="1">
+            <a:schemeClr val="accent1"/>
+          </a:fillRef>
+          <a:effectRef idx="0">
+            <a:schemeClr val="accent1"/>
+          </a:effectRef>
+          <a:fontRef idx="minor">
+            <a:schemeClr val="lt1"/>
+          </a:fontRef>
+        </p:style>
+        <p:txBody>
+          <a:bodyPr rtlCol="0" anchor="ctr"/>
+          <a:lstStyle/>
+          <a:p>
+            <a:pPr algn="ctr"/>
+            <a:r>
+              <a:rPr lang="en-NL" sz="1200" dirty="0">
+                <a:latin typeface="+mj-lt"/>
+              </a:rPr>
+              <a:t>Fout</a:t>
+            </a:r>
+          </a:p>
+          <a:p>
+            <a:pPr algn="ctr"/>
+            <a:r>
+              <a:rPr lang="en-NL" sz="1200" dirty="0">
+                <a:latin typeface="+mj-lt"/>
+              </a:rPr>
+              <a:t>afhandeling</a:t>
+            </a:r>
+          </a:p>
+        </p:txBody>
+      </p:sp>
+      <p:sp>
+        <p:nvSpPr>
+          <p:cNvPr id="52" name="Rounded Rectangle 51">
+            <a:extLst>
+              <a:ext uri="{FF2B5EF4-FFF2-40B4-BE49-F238E27FC236}">
+                <a16:creationId xmlns:a16="http://schemas.microsoft.com/office/drawing/2014/main" id="{31F77BE2-76C8-274C-8AB1-E4A9F2D9242E}"/>
+              </a:ext>
+            </a:extLst>
+          </p:cNvPr>
+          <p:cNvSpPr/>
+          <p:nvPr/>
+        </p:nvSpPr>
+        <p:spPr>
+          <a:xfrm>
+            <a:off x="149672" y="4886620"/>
+            <a:ext cx="1299434" cy="573336"/>
+          </a:xfrm>
+          <a:prstGeom prst="roundRect">
+            <a:avLst/>
+          </a:prstGeom>
+          <a:solidFill>
+            <a:srgbClr val="3A4298"/>
+          </a:solidFill>
+        </p:spPr>
+        <p:style>
+          <a:lnRef idx="2">
+            <a:schemeClr val="accent1">
+              <a:shade val="50000"/>
+            </a:schemeClr>
+          </a:lnRef>
+          <a:fillRef idx="1">
+            <a:schemeClr val="accent1"/>
+          </a:fillRef>
+          <a:effectRef idx="0">
+            <a:schemeClr val="accent1"/>
+          </a:effectRef>
+          <a:fontRef idx="minor">
+            <a:schemeClr val="lt1"/>
+          </a:fontRef>
+        </p:style>
+        <p:txBody>
+          <a:bodyPr rtlCol="0" anchor="ctr"/>
+          <a:lstStyle/>
+          <a:p>
+            <a:pPr algn="ctr"/>
+            <a:r>
+              <a:rPr lang="en-NL" sz="1200" dirty="0">
+                <a:latin typeface="+mj-lt"/>
+              </a:rPr>
+              <a:t>Rout</a:t>
+            </a:r>
+            <a:r>
+              <a:rPr lang="nl-NL" sz="1200" dirty="0">
+                <a:latin typeface="+mj-lt"/>
+              </a:rPr>
+              <a:t>er</a:t>
+            </a:r>
+            <a:r>
+              <a:rPr lang="en-NL" sz="1200" dirty="0">
+                <a:latin typeface="+mj-lt"/>
+              </a:rPr>
+              <a:t>ing</a:t>
+            </a:r>
+          </a:p>
+        </p:txBody>
+      </p:sp>
+      <p:sp>
+        <p:nvSpPr>
+          <p:cNvPr id="34" name="Rounded Rectangle 33">
+            <a:extLst>
+              <a:ext uri="{FF2B5EF4-FFF2-40B4-BE49-F238E27FC236}">
+                <a16:creationId xmlns:a16="http://schemas.microsoft.com/office/drawing/2014/main" id="{20D509D5-40A9-B142-BCA3-8243E162AFD8}"/>
+              </a:ext>
+            </a:extLst>
+          </p:cNvPr>
+          <p:cNvSpPr/>
+          <p:nvPr/>
+        </p:nvSpPr>
+        <p:spPr>
+          <a:xfrm>
+            <a:off x="149672" y="6210056"/>
+            <a:ext cx="1299434" cy="573336"/>
+          </a:xfrm>
+          <a:prstGeom prst="roundRect">
+            <a:avLst/>
+          </a:prstGeom>
+          <a:solidFill>
+            <a:srgbClr val="3A4298"/>
+          </a:solidFill>
+        </p:spPr>
+        <p:style>
+          <a:lnRef idx="2">
+            <a:schemeClr val="accent1">
+              <a:shade val="50000"/>
+            </a:schemeClr>
+          </a:lnRef>
+          <a:fillRef idx="1">
+            <a:schemeClr val="accent1"/>
+          </a:fillRef>
+          <a:effectRef idx="0">
+            <a:schemeClr val="accent1"/>
+          </a:effectRef>
+          <a:fontRef idx="minor">
+            <a:schemeClr val="lt1"/>
+          </a:fontRef>
+        </p:style>
+        <p:txBody>
+          <a:bodyPr rtlCol="0" anchor="ctr"/>
+          <a:lstStyle/>
+          <a:p>
+            <a:pPr algn="ctr"/>
+            <a:r>
+              <a:rPr lang="en-NL" sz="1200" dirty="0">
+                <a:latin typeface="+mj-lt"/>
+              </a:rPr>
+              <a:t>Protocol conversies</a:t>
+            </a:r>
+          </a:p>
+        </p:txBody>
+      </p:sp>
+      <p:sp>
+        <p:nvSpPr>
+          <p:cNvPr id="29" name="Rounded Rectangle 28">
+            <a:extLst>
+              <a:ext uri="{FF2B5EF4-FFF2-40B4-BE49-F238E27FC236}">
+                <a16:creationId xmlns:a16="http://schemas.microsoft.com/office/drawing/2014/main" id="{D5B13440-F73D-C041-8C5E-EC28670620D2}"/>
+              </a:ext>
+            </a:extLst>
+          </p:cNvPr>
+          <p:cNvSpPr/>
+          <p:nvPr/>
+        </p:nvSpPr>
+        <p:spPr>
+          <a:xfrm>
+            <a:off x="149672" y="5548338"/>
+            <a:ext cx="1299434" cy="573336"/>
+          </a:xfrm>
+          <a:prstGeom prst="roundRect">
+            <a:avLst/>
+          </a:prstGeom>
+          <a:solidFill>
+            <a:srgbClr val="3A4298"/>
+          </a:solidFill>
+        </p:spPr>
+        <p:style>
+          <a:lnRef idx="2">
+            <a:schemeClr val="accent1">
+              <a:shade val="50000"/>
+            </a:schemeClr>
+          </a:lnRef>
+          <a:fillRef idx="1">
+            <a:schemeClr val="accent1"/>
+          </a:fillRef>
+          <a:effectRef idx="0">
+            <a:schemeClr val="accent1"/>
+          </a:effectRef>
+          <a:fontRef idx="minor">
+            <a:schemeClr val="lt1"/>
+          </a:fontRef>
+        </p:style>
+        <p:txBody>
+          <a:bodyPr rtlCol="0" anchor="ctr"/>
+          <a:lstStyle/>
+          <a:p>
+            <a:pPr algn="ctr"/>
+            <a:r>
+              <a:rPr lang="en-NL" sz="1200" dirty="0">
+                <a:latin typeface="+mj-lt"/>
+              </a:rPr>
+              <a:t>Data Transformaties</a:t>
+            </a:r>
+          </a:p>
+        </p:txBody>
+      </p:sp>
+      <p:sp>
+        <p:nvSpPr>
+          <p:cNvPr id="51" name="Rounded Rectangle 50">
+            <a:extLst>
+              <a:ext uri="{FF2B5EF4-FFF2-40B4-BE49-F238E27FC236}">
+                <a16:creationId xmlns:a16="http://schemas.microsoft.com/office/drawing/2014/main" id="{EE56DF24-FBB9-9646-8CFE-063E17FA2859}"/>
+              </a:ext>
+            </a:extLst>
+          </p:cNvPr>
+          <p:cNvSpPr/>
+          <p:nvPr/>
+        </p:nvSpPr>
+        <p:spPr>
+          <a:xfrm>
+            <a:off x="1603901" y="5548338"/>
+            <a:ext cx="1299434" cy="573336"/>
+          </a:xfrm>
+          <a:prstGeom prst="roundRect">
+            <a:avLst/>
+          </a:prstGeom>
+          <a:solidFill>
+            <a:srgbClr val="3A4298"/>
+          </a:solidFill>
+        </p:spPr>
+        <p:style>
+          <a:lnRef idx="2">
+            <a:schemeClr val="accent1">
+              <a:shade val="50000"/>
+            </a:schemeClr>
+          </a:lnRef>
+          <a:fillRef idx="1">
+            <a:schemeClr val="accent1"/>
+          </a:fillRef>
+          <a:effectRef idx="0">
+            <a:schemeClr val="accent1"/>
+          </a:effectRef>
+          <a:fontRef idx="minor">
+            <a:schemeClr val="lt1"/>
+          </a:fontRef>
+        </p:style>
+        <p:txBody>
+          <a:bodyPr rtlCol="0" anchor="ctr"/>
+          <a:lstStyle/>
+          <a:p>
+            <a:pPr algn="ctr"/>
+            <a:r>
+              <a:rPr lang="nl-NL" sz="1200" dirty="0">
+                <a:latin typeface="+mj-lt"/>
+              </a:rPr>
+              <a:t>Service Level</a:t>
+            </a:r>
+            <a:r>
+              <a:rPr lang="en-NL" sz="1200" dirty="0">
+                <a:latin typeface="+mj-lt"/>
+              </a:rPr>
+              <a:t> Management</a:t>
+            </a:r>
+          </a:p>
+        </p:txBody>
+      </p:sp>
+      <p:sp>
+        <p:nvSpPr>
+          <p:cNvPr id="31" name="Rounded Rectangle 30">
+            <a:extLst>
+              <a:ext uri="{FF2B5EF4-FFF2-40B4-BE49-F238E27FC236}">
+                <a16:creationId xmlns:a16="http://schemas.microsoft.com/office/drawing/2014/main" id="{08360BF1-2669-444B-BED0-3D9411C66508}"/>
+              </a:ext>
+            </a:extLst>
+          </p:cNvPr>
+          <p:cNvSpPr/>
+          <p:nvPr/>
+        </p:nvSpPr>
+        <p:spPr>
+          <a:xfrm>
+            <a:off x="5966588" y="5548338"/>
+            <a:ext cx="1299434" cy="573336"/>
+          </a:xfrm>
+          <a:prstGeom prst="roundRect">
+            <a:avLst/>
+          </a:prstGeom>
+          <a:solidFill>
+            <a:srgbClr val="3A4298"/>
+          </a:solidFill>
+        </p:spPr>
+        <p:style>
+          <a:lnRef idx="2">
+            <a:schemeClr val="accent1">
+              <a:shade val="50000"/>
+            </a:schemeClr>
+          </a:lnRef>
+          <a:fillRef idx="1">
+            <a:schemeClr val="accent1"/>
+          </a:fillRef>
+          <a:effectRef idx="0">
+            <a:schemeClr val="accent1"/>
+          </a:effectRef>
+          <a:fontRef idx="minor">
+            <a:schemeClr val="lt1"/>
+          </a:fontRef>
+        </p:style>
+        <p:txBody>
+          <a:bodyPr rtlCol="0" anchor="ctr"/>
+          <a:lstStyle/>
+          <a:p>
+            <a:pPr algn="ctr"/>
+            <a:r>
+              <a:rPr lang="en-NL" sz="1200" dirty="0">
+                <a:latin typeface="+mj-lt"/>
+              </a:rPr>
+              <a:t>Caching</a:t>
+            </a:r>
+          </a:p>
+        </p:txBody>
+      </p:sp>
+      <p:sp>
+        <p:nvSpPr>
+          <p:cNvPr id="14" name="Rounded Rectangle 13">
+            <a:extLst>
+              <a:ext uri="{FF2B5EF4-FFF2-40B4-BE49-F238E27FC236}">
+                <a16:creationId xmlns:a16="http://schemas.microsoft.com/office/drawing/2014/main" id="{96046C79-0F25-7644-89C7-A5FE98CA8823}"/>
+              </a:ext>
+            </a:extLst>
+          </p:cNvPr>
+          <p:cNvSpPr/>
+          <p:nvPr/>
+        </p:nvSpPr>
+        <p:spPr>
+          <a:xfrm>
+            <a:off x="3058130" y="5548338"/>
+            <a:ext cx="1299434" cy="573336"/>
+          </a:xfrm>
+          <a:prstGeom prst="roundRect">
+            <a:avLst/>
+          </a:prstGeom>
+          <a:solidFill>
+            <a:srgbClr val="3A4298"/>
+          </a:solidFill>
+        </p:spPr>
+        <p:style>
+          <a:lnRef idx="2">
+            <a:schemeClr val="accent1">
+              <a:shade val="50000"/>
+            </a:schemeClr>
+          </a:lnRef>
+          <a:fillRef idx="1">
+            <a:schemeClr val="accent1"/>
+          </a:fillRef>
+          <a:effectRef idx="0">
+            <a:schemeClr val="accent1"/>
+          </a:effectRef>
+          <a:fontRef idx="minor">
+            <a:schemeClr val="lt1"/>
+          </a:fontRef>
+        </p:style>
+        <p:txBody>
+          <a:bodyPr rtlCol="0" anchor="ctr"/>
+          <a:lstStyle/>
+          <a:p>
+            <a:pPr algn="ctr"/>
+            <a:r>
+              <a:rPr lang="en-NL" sz="1200" dirty="0">
+                <a:latin typeface="+mj-lt"/>
+              </a:rPr>
+              <a:t>Doorbelasting</a:t>
+            </a:r>
+          </a:p>
+        </p:txBody>
+      </p:sp>
+      <p:sp>
+        <p:nvSpPr>
+          <p:cNvPr id="50" name="Rounded Rectangle 49">
+            <a:extLst>
+              <a:ext uri="{FF2B5EF4-FFF2-40B4-BE49-F238E27FC236}">
+                <a16:creationId xmlns:a16="http://schemas.microsoft.com/office/drawing/2014/main" id="{5C32873E-79ED-634E-B7C3-871442944345}"/>
+              </a:ext>
+            </a:extLst>
+          </p:cNvPr>
+          <p:cNvSpPr/>
+          <p:nvPr/>
+        </p:nvSpPr>
+        <p:spPr>
+          <a:xfrm>
+            <a:off x="4512359" y="5548338"/>
+            <a:ext cx="1299434" cy="573336"/>
+          </a:xfrm>
+          <a:prstGeom prst="roundRect">
+            <a:avLst/>
+          </a:prstGeom>
+          <a:solidFill>
+            <a:srgbClr val="3A4298"/>
+          </a:solidFill>
+        </p:spPr>
+        <p:style>
+          <a:lnRef idx="2">
+            <a:schemeClr val="accent1">
+              <a:shade val="50000"/>
+            </a:schemeClr>
+          </a:lnRef>
+          <a:fillRef idx="1">
+            <a:schemeClr val="accent1"/>
+          </a:fillRef>
+          <a:effectRef idx="0">
+            <a:schemeClr val="accent1"/>
+          </a:effectRef>
+          <a:fontRef idx="minor">
+            <a:schemeClr val="lt1"/>
+          </a:fontRef>
+        </p:style>
+        <p:txBody>
+          <a:bodyPr rtlCol="0" anchor="ctr"/>
+          <a:lstStyle/>
+          <a:p>
+            <a:pPr algn="ctr"/>
+            <a:r>
+              <a:rPr lang="en-NL" sz="1200" dirty="0">
+                <a:latin typeface="+mj-lt"/>
+              </a:rPr>
+              <a:t>Rate Limiting / Throttling</a:t>
+            </a:r>
+          </a:p>
+        </p:txBody>
+      </p:sp>
+      <p:sp>
+        <p:nvSpPr>
+          <p:cNvPr id="78" name="Rounded Rectangle 67">
+            <a:extLst>
+              <a:ext uri="{FF2B5EF4-FFF2-40B4-BE49-F238E27FC236}">
+                <a16:creationId xmlns:a16="http://schemas.microsoft.com/office/drawing/2014/main" id="{3C0DA008-AD6A-A34A-9972-251A08D5611E}"/>
+              </a:ext>
+            </a:extLst>
+          </p:cNvPr>
+          <p:cNvSpPr/>
+          <p:nvPr/>
+        </p:nvSpPr>
+        <p:spPr>
+          <a:xfrm>
+            <a:off x="5966588" y="373861"/>
+            <a:ext cx="1404781" cy="3316789"/>
+          </a:xfrm>
+          <a:prstGeom prst="roundRect">
+            <a:avLst>
+              <a:gd name="adj" fmla="val 2100"/>
+            </a:avLst>
+          </a:prstGeom>
+          <a:solidFill>
+            <a:srgbClr val="D9D9D9"/>
+          </a:solidFill>
+        </p:spPr>
+        <p:style>
+          <a:lnRef idx="2">
+            <a:schemeClr val="accent1">
+              <a:shade val="50000"/>
+            </a:schemeClr>
+          </a:lnRef>
+          <a:fillRef idx="1">
+            <a:schemeClr val="accent1"/>
+          </a:fillRef>
+          <a:effectRef idx="0">
+            <a:schemeClr val="accent1"/>
+          </a:effectRef>
+          <a:fontRef idx="minor">
+            <a:schemeClr val="lt1"/>
+          </a:fontRef>
+        </p:style>
+        <p:txBody>
+          <a:bodyPr rtlCol="0" anchor="t"/>
+          <a:lstStyle/>
+          <a:p>
+            <a:pPr algn="ctr"/>
+            <a:r>
+              <a:rPr lang="nl-NL" sz="1400" dirty="0">
+                <a:solidFill>
+                  <a:sysClr val="windowText" lastClr="000000"/>
+                </a:solidFill>
+              </a:rPr>
+              <a:t>Platform beheer</a:t>
+            </a:r>
+            <a:endParaRPr lang="en-NL" sz="1400" dirty="0">
+              <a:solidFill>
+                <a:sysClr val="windowText" lastClr="000000"/>
+              </a:solidFill>
+            </a:endParaRPr>
+          </a:p>
+        </p:txBody>
+      </p:sp>
+      <p:sp>
+        <p:nvSpPr>
+          <p:cNvPr id="64" name="Rounded Rectangle 38">
+            <a:extLst>
+              <a:ext uri="{FF2B5EF4-FFF2-40B4-BE49-F238E27FC236}">
+                <a16:creationId xmlns:a16="http://schemas.microsoft.com/office/drawing/2014/main" id="{E5C27DE2-CC0B-574B-A955-49A95A2F0DCB}"/>
+              </a:ext>
+            </a:extLst>
+          </p:cNvPr>
+          <p:cNvSpPr/>
+          <p:nvPr/>
+        </p:nvSpPr>
+        <p:spPr>
+          <a:xfrm>
+            <a:off x="6019261" y="2972174"/>
+            <a:ext cx="1299434" cy="573336"/>
+          </a:xfrm>
+          <a:prstGeom prst="roundRect">
+            <a:avLst/>
+          </a:prstGeom>
+          <a:solidFill>
+            <a:srgbClr val="3A4298"/>
+          </a:solidFill>
+        </p:spPr>
+        <p:style>
+          <a:lnRef idx="2">
+            <a:schemeClr val="accent1">
+              <a:shade val="50000"/>
+            </a:schemeClr>
+          </a:lnRef>
+          <a:fillRef idx="1">
+            <a:schemeClr val="accent1"/>
+          </a:fillRef>
+          <a:effectRef idx="0">
+            <a:schemeClr val="accent1"/>
+          </a:effectRef>
+          <a:fontRef idx="minor">
+            <a:schemeClr val="lt1"/>
+          </a:fontRef>
+        </p:style>
+        <p:txBody>
+          <a:bodyPr rtlCol="0" anchor="ctr"/>
+          <a:lstStyle/>
+          <a:p>
+            <a:pPr algn="ctr"/>
+            <a:r>
+              <a:rPr lang="nl-NL" sz="1200" dirty="0">
+                <a:latin typeface="+mj-lt"/>
+              </a:rPr>
+              <a:t>Sleutelbeheer</a:t>
+            </a:r>
+          </a:p>
+        </p:txBody>
+      </p:sp>
+      <p:sp>
+        <p:nvSpPr>
+          <p:cNvPr id="67" name="Rounded Rectangle 38">
+            <a:extLst>
+              <a:ext uri="{FF2B5EF4-FFF2-40B4-BE49-F238E27FC236}">
+                <a16:creationId xmlns:a16="http://schemas.microsoft.com/office/drawing/2014/main" id="{E5C27DE2-CC0B-574B-A955-49A95A2F0DCB}"/>
+              </a:ext>
+            </a:extLst>
+          </p:cNvPr>
+          <p:cNvSpPr/>
+          <p:nvPr/>
+        </p:nvSpPr>
+        <p:spPr>
+          <a:xfrm>
+            <a:off x="6019261" y="1661205"/>
+            <a:ext cx="1299434" cy="573336"/>
+          </a:xfrm>
+          <a:prstGeom prst="roundRect">
+            <a:avLst/>
+          </a:prstGeom>
+          <a:solidFill>
+            <a:srgbClr val="3A4298"/>
+          </a:solidFill>
+        </p:spPr>
+        <p:style>
+          <a:lnRef idx="2">
+            <a:schemeClr val="accent1">
+              <a:shade val="50000"/>
+            </a:schemeClr>
+          </a:lnRef>
+          <a:fillRef idx="1">
+            <a:schemeClr val="accent1"/>
+          </a:fillRef>
+          <a:effectRef idx="0">
+            <a:schemeClr val="accent1"/>
+          </a:effectRef>
+          <a:fontRef idx="minor">
+            <a:schemeClr val="lt1"/>
+          </a:fontRef>
+        </p:style>
+        <p:txBody>
+          <a:bodyPr rtlCol="0" anchor="ctr"/>
+          <a:lstStyle/>
+          <a:p>
+            <a:pPr algn="ctr"/>
+            <a:r>
+              <a:rPr lang="nl-NL" sz="1200" dirty="0">
+                <a:latin typeface="+mj-lt"/>
+              </a:rPr>
+              <a:t>Toegangsbeheer</a:t>
+            </a:r>
+            <a:endParaRPr lang="en-NL" sz="1200" dirty="0">
+              <a:latin typeface="+mj-lt"/>
+            </a:endParaRPr>
+          </a:p>
+        </p:txBody>
+      </p:sp>
+      <p:sp>
+        <p:nvSpPr>
+          <p:cNvPr id="70" name="Rounded Rectangle 38">
+            <a:extLst>
+              <a:ext uri="{FF2B5EF4-FFF2-40B4-BE49-F238E27FC236}">
+                <a16:creationId xmlns:a16="http://schemas.microsoft.com/office/drawing/2014/main" id="{E5C27DE2-CC0B-574B-A955-49A95A2F0DCB}"/>
+              </a:ext>
+            </a:extLst>
+          </p:cNvPr>
+          <p:cNvSpPr/>
+          <p:nvPr/>
+        </p:nvSpPr>
+        <p:spPr>
+          <a:xfrm>
+            <a:off x="6019261" y="2328162"/>
+            <a:ext cx="1299434" cy="573336"/>
+          </a:xfrm>
+          <a:prstGeom prst="roundRect">
+            <a:avLst/>
+          </a:prstGeom>
+          <a:solidFill>
+            <a:srgbClr val="3A4298"/>
+          </a:solidFill>
+        </p:spPr>
+        <p:style>
+          <a:lnRef idx="2">
+            <a:schemeClr val="accent1">
+              <a:shade val="50000"/>
+            </a:schemeClr>
+          </a:lnRef>
+          <a:fillRef idx="1">
+            <a:schemeClr val="accent1"/>
+          </a:fillRef>
+          <a:effectRef idx="0">
+            <a:schemeClr val="accent1"/>
+          </a:effectRef>
+          <a:fontRef idx="minor">
+            <a:schemeClr val="lt1"/>
+          </a:fontRef>
+        </p:style>
+        <p:txBody>
+          <a:bodyPr rtlCol="0" anchor="ctr"/>
+          <a:lstStyle/>
+          <a:p>
+            <a:pPr algn="ctr"/>
+            <a:r>
+              <a:rPr lang="nl-NL" sz="1200" dirty="0">
+                <a:latin typeface="+mj-lt"/>
+              </a:rPr>
+              <a:t>Gateway beheer</a:t>
+            </a:r>
+            <a:endParaRPr lang="en-NL" sz="1200" dirty="0">
+              <a:latin typeface="+mj-lt"/>
+            </a:endParaRPr>
+          </a:p>
+        </p:txBody>
+      </p:sp>
+      <p:sp>
+        <p:nvSpPr>
+          <p:cNvPr id="80" name="Rounded Rectangle 57">
+            <a:extLst>
+              <a:ext uri="{FF2B5EF4-FFF2-40B4-BE49-F238E27FC236}">
+                <a16:creationId xmlns:a16="http://schemas.microsoft.com/office/drawing/2014/main" id="{351800BB-D8F5-DD4E-B04D-EFCA44C52CF1}"/>
+              </a:ext>
+            </a:extLst>
+          </p:cNvPr>
+          <p:cNvSpPr/>
+          <p:nvPr/>
+        </p:nvSpPr>
+        <p:spPr>
+          <a:xfrm>
+            <a:off x="1518195" y="2978052"/>
+            <a:ext cx="1299434" cy="573336"/>
+          </a:xfrm>
+          <a:prstGeom prst="roundRect">
+            <a:avLst/>
+          </a:prstGeom>
+          <a:solidFill>
+            <a:srgbClr val="3A4298"/>
+          </a:solidFill>
+        </p:spPr>
+        <p:style>
+          <a:lnRef idx="2">
+            <a:schemeClr val="accent1">
+              <a:shade val="50000"/>
+            </a:schemeClr>
+          </a:lnRef>
+          <a:fillRef idx="1">
+            <a:schemeClr val="accent1"/>
+          </a:fillRef>
+          <a:effectRef idx="0">
+            <a:schemeClr val="accent1"/>
+          </a:effectRef>
+          <a:fontRef idx="minor">
+            <a:schemeClr val="lt1"/>
+          </a:fontRef>
+        </p:style>
+        <p:txBody>
+          <a:bodyPr rtlCol="0" anchor="ctr"/>
+          <a:lstStyle/>
+          <a:p>
+            <a:pPr algn="ctr"/>
+            <a:r>
+              <a:rPr lang="nl-NL" sz="1200" dirty="0">
+                <a:latin typeface="+mj-lt"/>
+              </a:rPr>
+              <a:t>Kennisdeling &amp; Ondersteuning</a:t>
+            </a:r>
+            <a:endParaRPr lang="en-NL" sz="1200" dirty="0">
+              <a:latin typeface="+mj-lt"/>
+            </a:endParaRPr>
+          </a:p>
+        </p:txBody>
+      </p:sp>
+      <p:sp>
+        <p:nvSpPr>
+          <p:cNvPr id="41" name="Rounded Rectangle 40">
+            <a:extLst>
+              <a:ext uri="{FF2B5EF4-FFF2-40B4-BE49-F238E27FC236}">
+                <a16:creationId xmlns:a16="http://schemas.microsoft.com/office/drawing/2014/main" id="{BEFA111F-B4F9-AC4D-8085-BC6A063166CB}"/>
+              </a:ext>
+            </a:extLst>
+          </p:cNvPr>
+          <p:cNvSpPr/>
+          <p:nvPr/>
+        </p:nvSpPr>
+        <p:spPr>
+          <a:xfrm>
+            <a:off x="1603901" y="4224902"/>
+            <a:ext cx="1299434" cy="573336"/>
+          </a:xfrm>
+          <a:prstGeom prst="roundRect">
+            <a:avLst/>
+          </a:prstGeom>
+          <a:solidFill>
+            <a:srgbClr val="3A4298"/>
+          </a:solidFill>
+        </p:spPr>
+        <p:style>
+          <a:lnRef idx="2">
+            <a:schemeClr val="accent1">
+              <a:shade val="50000"/>
+            </a:schemeClr>
+          </a:lnRef>
+          <a:fillRef idx="1">
+            <a:schemeClr val="accent1"/>
+          </a:fillRef>
+          <a:effectRef idx="0">
+            <a:schemeClr val="accent1"/>
+          </a:effectRef>
+          <a:fontRef idx="minor">
+            <a:schemeClr val="lt1"/>
+          </a:fontRef>
+        </p:style>
+        <p:txBody>
+          <a:bodyPr rtlCol="0" anchor="ctr"/>
+          <a:lstStyle/>
+          <a:p>
+            <a:pPr algn="ctr"/>
+            <a:r>
+              <a:rPr lang="nl-NL" sz="1200" dirty="0">
+                <a:latin typeface="+mj-lt"/>
+              </a:rPr>
+              <a:t>Identificatie &amp; Authenticatie</a:t>
+            </a:r>
+            <a:endParaRPr lang="en-NL" sz="1200" dirty="0">
+              <a:latin typeface="+mj-lt"/>
+            </a:endParaRPr>
+          </a:p>
+        </p:txBody>
+      </p:sp>
+      <p:sp>
+        <p:nvSpPr>
+          <p:cNvPr id="76" name="Rounded Rectangle 40">
+            <a:extLst>
+              <a:ext uri="{FF2B5EF4-FFF2-40B4-BE49-F238E27FC236}">
+                <a16:creationId xmlns:a16="http://schemas.microsoft.com/office/drawing/2014/main" id="{BEFA111F-B4F9-AC4D-8085-BC6A063166CB}"/>
+              </a:ext>
+            </a:extLst>
+          </p:cNvPr>
+          <p:cNvSpPr/>
+          <p:nvPr/>
+        </p:nvSpPr>
+        <p:spPr>
+          <a:xfrm>
+            <a:off x="3058130" y="4224902"/>
+            <a:ext cx="1299434" cy="573336"/>
+          </a:xfrm>
+          <a:prstGeom prst="roundRect">
+            <a:avLst/>
+          </a:prstGeom>
+          <a:solidFill>
+            <a:srgbClr val="3A4298"/>
+          </a:solidFill>
+        </p:spPr>
+        <p:style>
+          <a:lnRef idx="2">
+            <a:schemeClr val="accent1">
+              <a:shade val="50000"/>
+            </a:schemeClr>
+          </a:lnRef>
+          <a:fillRef idx="1">
+            <a:schemeClr val="accent1"/>
+          </a:fillRef>
+          <a:effectRef idx="0">
+            <a:schemeClr val="accent1"/>
+          </a:effectRef>
+          <a:fontRef idx="minor">
+            <a:schemeClr val="lt1"/>
+          </a:fontRef>
+        </p:style>
+        <p:txBody>
+          <a:bodyPr rtlCol="0" anchor="ctr"/>
+          <a:lstStyle/>
+          <a:p>
+            <a:pPr algn="ctr"/>
+            <a:r>
+              <a:rPr lang="nl-NL" sz="1200" dirty="0">
+                <a:latin typeface="+mj-lt"/>
+              </a:rPr>
+              <a:t>Autorisatie</a:t>
+            </a:r>
+            <a:endParaRPr lang="en-NL" sz="1200" dirty="0">
+              <a:latin typeface="+mj-lt"/>
+            </a:endParaRPr>
+          </a:p>
+        </p:txBody>
+      </p:sp>
+      <p:sp>
+        <p:nvSpPr>
+          <p:cNvPr id="30" name="Rounded Rectangle 29">
+            <a:extLst>
+              <a:ext uri="{FF2B5EF4-FFF2-40B4-BE49-F238E27FC236}">
+                <a16:creationId xmlns:a16="http://schemas.microsoft.com/office/drawing/2014/main" id="{1D962EEE-DB89-944D-9623-088B18156BBE}"/>
+              </a:ext>
+            </a:extLst>
+          </p:cNvPr>
+          <p:cNvSpPr/>
+          <p:nvPr/>
+        </p:nvSpPr>
+        <p:spPr>
+          <a:xfrm>
+            <a:off x="149672" y="4224902"/>
+            <a:ext cx="1299434" cy="573336"/>
+          </a:xfrm>
+          <a:prstGeom prst="roundRect">
+            <a:avLst/>
+          </a:prstGeom>
+          <a:solidFill>
+            <a:srgbClr val="3A4298"/>
+          </a:solidFill>
+        </p:spPr>
+        <p:style>
+          <a:lnRef idx="2">
+            <a:schemeClr val="accent1">
+              <a:shade val="50000"/>
+            </a:schemeClr>
+          </a:lnRef>
+          <a:fillRef idx="1">
+            <a:schemeClr val="accent1"/>
+          </a:fillRef>
+          <a:effectRef idx="0">
+            <a:schemeClr val="accent1"/>
+          </a:effectRef>
+          <a:fontRef idx="minor">
+            <a:schemeClr val="lt1"/>
+          </a:fontRef>
+        </p:style>
+        <p:txBody>
+          <a:bodyPr rtlCol="0" anchor="ctr"/>
+          <a:lstStyle/>
+          <a:p>
+            <a:pPr algn="ctr"/>
+            <a:r>
+              <a:rPr lang="en-NL" sz="1200" dirty="0">
+                <a:latin typeface="+mj-lt"/>
+              </a:rPr>
+              <a:t>Mediatie / Orkestratie</a:t>
+            </a:r>
+          </a:p>
+        </p:txBody>
+      </p:sp>
+      <p:sp>
+        <p:nvSpPr>
+          <p:cNvPr id="36" name="Rounded Rectangle 35">
+            <a:extLst>
+              <a:ext uri="{FF2B5EF4-FFF2-40B4-BE49-F238E27FC236}">
+                <a16:creationId xmlns:a16="http://schemas.microsoft.com/office/drawing/2014/main" id="{3E8BA4F3-561C-D948-BE94-F344EA45A459}"/>
+              </a:ext>
+            </a:extLst>
+          </p:cNvPr>
+          <p:cNvSpPr/>
+          <p:nvPr/>
+        </p:nvSpPr>
+        <p:spPr>
+          <a:xfrm>
+            <a:off x="4512359" y="4224902"/>
+            <a:ext cx="1299434" cy="573336"/>
+          </a:xfrm>
+          <a:prstGeom prst="roundRect">
+            <a:avLst/>
+          </a:prstGeom>
+          <a:solidFill>
+            <a:srgbClr val="3A4298"/>
+          </a:solidFill>
+        </p:spPr>
+        <p:style>
+          <a:lnRef idx="2">
+            <a:schemeClr val="accent1">
+              <a:shade val="50000"/>
+            </a:schemeClr>
+          </a:lnRef>
+          <a:fillRef idx="1">
+            <a:schemeClr val="accent1"/>
+          </a:fillRef>
+          <a:effectRef idx="0">
+            <a:schemeClr val="accent1"/>
+          </a:effectRef>
+          <a:fontRef idx="minor">
+            <a:schemeClr val="lt1"/>
+          </a:fontRef>
+        </p:style>
+        <p:txBody>
+          <a:bodyPr rtlCol="0" anchor="ctr"/>
+          <a:lstStyle/>
+          <a:p>
+            <a:pPr algn="ctr"/>
+            <a:r>
+              <a:rPr lang="en-NL" sz="1200" dirty="0">
+                <a:latin typeface="+mj-lt"/>
+              </a:rPr>
+              <a:t>Policy handhaving</a:t>
+            </a:r>
+          </a:p>
+        </p:txBody>
+      </p:sp>
+      <p:sp>
+        <p:nvSpPr>
+          <p:cNvPr id="81" name="Rounded Rectangle 33">
+            <a:extLst>
+              <a:ext uri="{FF2B5EF4-FFF2-40B4-BE49-F238E27FC236}">
+                <a16:creationId xmlns:a16="http://schemas.microsoft.com/office/drawing/2014/main" id="{20D509D5-40A9-B142-BCA3-8243E162AFD8}"/>
+              </a:ext>
+            </a:extLst>
+          </p:cNvPr>
+          <p:cNvSpPr/>
+          <p:nvPr/>
+        </p:nvSpPr>
+        <p:spPr>
+          <a:xfrm>
+            <a:off x="5966588" y="4224902"/>
+            <a:ext cx="1299434" cy="573336"/>
+          </a:xfrm>
+          <a:prstGeom prst="roundRect">
+            <a:avLst/>
+          </a:prstGeom>
+          <a:solidFill>
+            <a:srgbClr val="3A4298"/>
+          </a:solidFill>
+        </p:spPr>
+        <p:style>
+          <a:lnRef idx="2">
+            <a:schemeClr val="accent1">
+              <a:shade val="50000"/>
+            </a:schemeClr>
+          </a:lnRef>
+          <a:fillRef idx="1">
+            <a:schemeClr val="accent1"/>
+          </a:fillRef>
+          <a:effectRef idx="0">
+            <a:schemeClr val="accent1"/>
+          </a:effectRef>
+          <a:fontRef idx="minor">
+            <a:schemeClr val="lt1"/>
+          </a:fontRef>
+        </p:style>
+        <p:txBody>
+          <a:bodyPr rtlCol="0" anchor="ctr"/>
+          <a:lstStyle/>
+          <a:p>
+            <a:pPr algn="ctr"/>
+            <a:r>
+              <a:rPr lang="nl-NL" sz="1200" dirty="0">
+                <a:latin typeface="+mj-lt"/>
+              </a:rPr>
+              <a:t>Anomalie detectie</a:t>
+            </a:r>
+            <a:endParaRPr lang="en-NL" sz="1200" dirty="0">
+              <a:latin typeface="+mj-lt"/>
+            </a:endParaRPr>
+          </a:p>
+        </p:txBody>
+      </p:sp>
+      <p:sp>
+        <p:nvSpPr>
+          <p:cNvPr id="68" name="Rounded Rectangle 67">
+            <a:extLst>
+              <a:ext uri="{FF2B5EF4-FFF2-40B4-BE49-F238E27FC236}">
+                <a16:creationId xmlns:a16="http://schemas.microsoft.com/office/drawing/2014/main" id="{3C0DA008-AD6A-A34A-9972-251A08D5611E}"/>
+              </a:ext>
+            </a:extLst>
+          </p:cNvPr>
+          <p:cNvSpPr/>
+          <p:nvPr/>
+        </p:nvSpPr>
+        <p:spPr>
+          <a:xfrm>
+            <a:off x="3055012" y="373861"/>
+            <a:ext cx="1404781" cy="3316789"/>
+          </a:xfrm>
+          <a:prstGeom prst="roundRect">
+            <a:avLst>
+              <a:gd name="adj" fmla="val 2100"/>
+            </a:avLst>
+          </a:prstGeom>
+          <a:solidFill>
+            <a:srgbClr val="D9D9D9"/>
+          </a:solidFill>
+        </p:spPr>
+        <p:style>
+          <a:lnRef idx="2">
+            <a:schemeClr val="accent1">
+              <a:shade val="50000"/>
+            </a:schemeClr>
+          </a:lnRef>
+          <a:fillRef idx="1">
+            <a:schemeClr val="accent1"/>
+          </a:fillRef>
+          <a:effectRef idx="0">
+            <a:schemeClr val="accent1"/>
+          </a:effectRef>
+          <a:fontRef idx="minor">
+            <a:schemeClr val="lt1"/>
+          </a:fontRef>
+        </p:style>
+        <p:txBody>
+          <a:bodyPr rtlCol="0" anchor="t"/>
+          <a:lstStyle/>
+          <a:p>
+            <a:pPr algn="ctr"/>
+            <a:r>
+              <a:rPr lang="nl-NL" sz="1400" dirty="0">
+                <a:solidFill>
+                  <a:sysClr val="windowText" lastClr="000000"/>
+                </a:solidFill>
+              </a:rPr>
+              <a:t>Realisatie</a:t>
+            </a:r>
+            <a:endParaRPr lang="en-NL" sz="1400" dirty="0">
+              <a:solidFill>
+                <a:sysClr val="windowText" lastClr="000000"/>
+              </a:solidFill>
+            </a:endParaRPr>
+          </a:p>
+        </p:txBody>
+      </p:sp>
+      <p:sp>
+        <p:nvSpPr>
+          <p:cNvPr id="26" name="Rounded Rectangle 25">
+            <a:extLst>
+              <a:ext uri="{FF2B5EF4-FFF2-40B4-BE49-F238E27FC236}">
+                <a16:creationId xmlns:a16="http://schemas.microsoft.com/office/drawing/2014/main" id="{8F1B430A-C5D1-9346-B807-C0F1396288F3}"/>
+              </a:ext>
+            </a:extLst>
+          </p:cNvPr>
+          <p:cNvSpPr/>
+          <p:nvPr/>
+        </p:nvSpPr>
+        <p:spPr>
+          <a:xfrm>
+            <a:off x="3120513" y="1031758"/>
+            <a:ext cx="1299434" cy="573336"/>
+          </a:xfrm>
+          <a:prstGeom prst="roundRect">
+            <a:avLst/>
+          </a:prstGeom>
+          <a:solidFill>
+            <a:srgbClr val="3A4298"/>
+          </a:solidFill>
+        </p:spPr>
+        <p:style>
+          <a:lnRef idx="2">
+            <a:schemeClr val="accent1">
+              <a:shade val="50000"/>
+            </a:schemeClr>
+          </a:lnRef>
+          <a:fillRef idx="1">
+            <a:schemeClr val="accent1"/>
+          </a:fillRef>
+          <a:effectRef idx="0">
+            <a:schemeClr val="accent1"/>
+          </a:effectRef>
+          <a:fontRef idx="minor">
+            <a:schemeClr val="lt1"/>
+          </a:fontRef>
+        </p:style>
+        <p:txBody>
+          <a:bodyPr rtlCol="0" anchor="ctr"/>
+          <a:lstStyle/>
+          <a:p>
+            <a:pPr algn="ctr"/>
+            <a:r>
+              <a:rPr lang="en-NL" sz="1200" dirty="0">
+                <a:latin typeface="+mj-lt"/>
+              </a:rPr>
+              <a:t>Ontwerp</a:t>
+            </a:r>
+          </a:p>
+        </p:txBody>
+      </p:sp>
+      <p:sp>
+        <p:nvSpPr>
+          <p:cNvPr id="27" name="Rounded Rectangle 26">
+            <a:extLst>
+              <a:ext uri="{FF2B5EF4-FFF2-40B4-BE49-F238E27FC236}">
+                <a16:creationId xmlns:a16="http://schemas.microsoft.com/office/drawing/2014/main" id="{9AFD52BC-AB61-C443-8316-1ACBA1500810}"/>
+              </a:ext>
+            </a:extLst>
+          </p:cNvPr>
+          <p:cNvSpPr/>
+          <p:nvPr/>
+        </p:nvSpPr>
+        <p:spPr>
+          <a:xfrm>
+            <a:off x="3120513" y="1680523"/>
+            <a:ext cx="1299434" cy="573336"/>
+          </a:xfrm>
+          <a:prstGeom prst="roundRect">
+            <a:avLst/>
+          </a:prstGeom>
+          <a:solidFill>
+            <a:srgbClr val="3A4298"/>
+          </a:solidFill>
+        </p:spPr>
+        <p:style>
+          <a:lnRef idx="2">
+            <a:schemeClr val="accent1">
+              <a:shade val="50000"/>
+            </a:schemeClr>
+          </a:lnRef>
+          <a:fillRef idx="1">
+            <a:schemeClr val="accent1"/>
+          </a:fillRef>
+          <a:effectRef idx="0">
+            <a:schemeClr val="accent1"/>
+          </a:effectRef>
+          <a:fontRef idx="minor">
+            <a:schemeClr val="lt1"/>
+          </a:fontRef>
+        </p:style>
+        <p:txBody>
+          <a:bodyPr rtlCol="0" anchor="ctr"/>
+          <a:lstStyle/>
+          <a:p>
+            <a:pPr algn="ctr"/>
+            <a:r>
+              <a:rPr lang="nl-NL" sz="1200" dirty="0">
+                <a:latin typeface="+mj-lt"/>
+              </a:rPr>
+              <a:t>Ontwikkeling</a:t>
+            </a:r>
+            <a:endParaRPr lang="en-NL" sz="1200" dirty="0">
+              <a:latin typeface="+mj-lt"/>
+            </a:endParaRPr>
+          </a:p>
+        </p:txBody>
+      </p:sp>
+      <p:sp>
+        <p:nvSpPr>
+          <p:cNvPr id="39" name="Rounded Rectangle 38">
+            <a:extLst>
+              <a:ext uri="{FF2B5EF4-FFF2-40B4-BE49-F238E27FC236}">
+                <a16:creationId xmlns:a16="http://schemas.microsoft.com/office/drawing/2014/main" id="{E5C27DE2-CC0B-574B-A955-49A95A2F0DCB}"/>
+              </a:ext>
+            </a:extLst>
+          </p:cNvPr>
+          <p:cNvSpPr/>
+          <p:nvPr/>
+        </p:nvSpPr>
+        <p:spPr>
+          <a:xfrm>
+            <a:off x="3120513" y="2978052"/>
+            <a:ext cx="1299434" cy="573336"/>
+          </a:xfrm>
+          <a:prstGeom prst="roundRect">
+            <a:avLst/>
+          </a:prstGeom>
+          <a:solidFill>
+            <a:srgbClr val="3A4298"/>
+          </a:solidFill>
+        </p:spPr>
+        <p:style>
+          <a:lnRef idx="2">
+            <a:schemeClr val="accent1">
+              <a:shade val="50000"/>
+            </a:schemeClr>
+          </a:lnRef>
+          <a:fillRef idx="1">
+            <a:schemeClr val="accent1"/>
+          </a:fillRef>
+          <a:effectRef idx="0">
+            <a:schemeClr val="accent1"/>
+          </a:effectRef>
+          <a:fontRef idx="minor">
+            <a:schemeClr val="lt1"/>
+          </a:fontRef>
+        </p:style>
+        <p:txBody>
+          <a:bodyPr rtlCol="0" anchor="ctr"/>
+          <a:lstStyle/>
+          <a:p>
+            <a:pPr algn="ctr"/>
+            <a:r>
+              <a:rPr lang="en-NL" sz="1200" dirty="0">
+                <a:latin typeface="+mj-lt"/>
+              </a:rPr>
+              <a:t>Policy Definitie</a:t>
+            </a:r>
+          </a:p>
+        </p:txBody>
+      </p:sp>
+      <p:sp>
+        <p:nvSpPr>
+          <p:cNvPr id="43" name="Rounded Rectangle 26">
+            <a:extLst>
+              <a:ext uri="{FF2B5EF4-FFF2-40B4-BE49-F238E27FC236}">
+                <a16:creationId xmlns:a16="http://schemas.microsoft.com/office/drawing/2014/main" id="{9AFD52BC-AB61-C443-8316-1ACBA1500810}"/>
+              </a:ext>
+            </a:extLst>
+          </p:cNvPr>
+          <p:cNvSpPr/>
+          <p:nvPr/>
+        </p:nvSpPr>
+        <p:spPr>
+          <a:xfrm>
+            <a:off x="3120513" y="2329288"/>
+            <a:ext cx="1299434" cy="573336"/>
+          </a:xfrm>
+          <a:prstGeom prst="roundRect">
+            <a:avLst/>
+          </a:prstGeom>
+          <a:solidFill>
+            <a:srgbClr val="3A4298"/>
+          </a:solidFill>
+        </p:spPr>
+        <p:style>
+          <a:lnRef idx="2">
+            <a:schemeClr val="accent1">
+              <a:shade val="50000"/>
+            </a:schemeClr>
+          </a:lnRef>
+          <a:fillRef idx="1">
+            <a:schemeClr val="accent1"/>
+          </a:fillRef>
+          <a:effectRef idx="0">
+            <a:schemeClr val="accent1"/>
+          </a:effectRef>
+          <a:fontRef idx="minor">
+            <a:schemeClr val="lt1"/>
+          </a:fontRef>
+        </p:style>
+        <p:txBody>
+          <a:bodyPr rtlCol="0" anchor="ctr"/>
+          <a:lstStyle/>
+          <a:p>
+            <a:pPr algn="ctr"/>
+            <a:r>
+              <a:rPr lang="nl-NL" sz="1200" dirty="0">
+                <a:latin typeface="+mj-lt"/>
+              </a:rPr>
+              <a:t>Test</a:t>
+            </a:r>
+            <a:endParaRPr lang="en-NL" sz="1200" dirty="0">
+              <a:latin typeface="+mj-lt"/>
+            </a:endParaRPr>
+          </a:p>
+        </p:txBody>
+      </p:sp>
+      <p:sp>
+        <p:nvSpPr>
+          <p:cNvPr id="79" name="Rounded Rectangle 67">
+            <a:extLst>
+              <a:ext uri="{FF2B5EF4-FFF2-40B4-BE49-F238E27FC236}">
+                <a16:creationId xmlns:a16="http://schemas.microsoft.com/office/drawing/2014/main" id="{3C0DA008-AD6A-A34A-9972-251A08D5611E}"/>
+              </a:ext>
+            </a:extLst>
+          </p:cNvPr>
+          <p:cNvSpPr/>
+          <p:nvPr/>
+        </p:nvSpPr>
+        <p:spPr>
+          <a:xfrm>
+            <a:off x="4510800" y="373861"/>
+            <a:ext cx="1404781" cy="3316789"/>
+          </a:xfrm>
+          <a:prstGeom prst="roundRect">
+            <a:avLst>
+              <a:gd name="adj" fmla="val 2100"/>
+            </a:avLst>
+          </a:prstGeom>
+          <a:solidFill>
+            <a:srgbClr val="D9D9D9"/>
+          </a:solidFill>
+        </p:spPr>
+        <p:style>
+          <a:lnRef idx="2">
+            <a:schemeClr val="accent1">
+              <a:shade val="50000"/>
+            </a:schemeClr>
+          </a:lnRef>
+          <a:fillRef idx="1">
+            <a:schemeClr val="accent1"/>
+          </a:fillRef>
+          <a:effectRef idx="0">
+            <a:schemeClr val="accent1"/>
+          </a:effectRef>
+          <a:fontRef idx="minor">
+            <a:schemeClr val="lt1"/>
+          </a:fontRef>
+        </p:style>
+        <p:txBody>
+          <a:bodyPr rtlCol="0" anchor="t"/>
+          <a:lstStyle/>
+          <a:p>
+            <a:pPr algn="ctr"/>
+            <a:r>
+              <a:rPr lang="nl-NL" sz="1400" dirty="0">
+                <a:solidFill>
+                  <a:sysClr val="windowText" lastClr="000000"/>
+                </a:solidFill>
+              </a:rPr>
+              <a:t>API </a:t>
+            </a:r>
+            <a:r>
+              <a:rPr lang="nl-NL" sz="1400" dirty="0" err="1">
+                <a:solidFill>
+                  <a:sysClr val="windowText" lastClr="000000"/>
+                </a:solidFill>
+              </a:rPr>
+              <a:t>Lifecycle</a:t>
+            </a:r>
+            <a:r>
+              <a:rPr lang="nl-NL" sz="1400" dirty="0">
+                <a:solidFill>
+                  <a:sysClr val="windowText" lastClr="000000"/>
+                </a:solidFill>
+              </a:rPr>
+              <a:t> beheer</a:t>
+            </a:r>
+            <a:endParaRPr lang="en-NL" sz="1400" dirty="0">
+              <a:solidFill>
+                <a:sysClr val="windowText" lastClr="000000"/>
+              </a:solidFill>
+            </a:endParaRPr>
+          </a:p>
+        </p:txBody>
+      </p:sp>
+      <p:sp>
+        <p:nvSpPr>
+          <p:cNvPr id="12" name="Rounded Rectangle 11">
+            <a:extLst>
+              <a:ext uri="{FF2B5EF4-FFF2-40B4-BE49-F238E27FC236}">
+                <a16:creationId xmlns:a16="http://schemas.microsoft.com/office/drawing/2014/main" id="{25BFF694-07BA-614A-BE59-5071E564B2A3}"/>
+              </a:ext>
+            </a:extLst>
+          </p:cNvPr>
+          <p:cNvSpPr/>
+          <p:nvPr/>
+        </p:nvSpPr>
+        <p:spPr>
+          <a:xfrm>
+            <a:off x="4563473" y="2978052"/>
+            <a:ext cx="1299434" cy="573336"/>
+          </a:xfrm>
+          <a:prstGeom prst="roundRect">
+            <a:avLst/>
+          </a:prstGeom>
+          <a:solidFill>
+            <a:srgbClr val="3A4298"/>
+          </a:solidFill>
+        </p:spPr>
+        <p:style>
+          <a:lnRef idx="2">
+            <a:schemeClr val="accent1">
+              <a:shade val="50000"/>
+            </a:schemeClr>
+          </a:lnRef>
+          <a:fillRef idx="1">
+            <a:schemeClr val="accent1"/>
+          </a:fillRef>
+          <a:effectRef idx="0">
+            <a:schemeClr val="accent1"/>
+          </a:effectRef>
+          <a:fontRef idx="minor">
+            <a:schemeClr val="lt1"/>
+          </a:fontRef>
+        </p:style>
+        <p:txBody>
+          <a:bodyPr rtlCol="0" anchor="ctr"/>
+          <a:lstStyle/>
+          <a:p>
+            <a:pPr algn="ctr"/>
+            <a:r>
+              <a:rPr lang="nl-NL" sz="1200" dirty="0" err="1">
+                <a:latin typeface="+mj-lt"/>
+              </a:rPr>
+              <a:t>Versionering</a:t>
+            </a:r>
+            <a:endParaRPr lang="en-NL" sz="1200" dirty="0">
+              <a:latin typeface="+mj-lt"/>
+            </a:endParaRPr>
+          </a:p>
+        </p:txBody>
+      </p:sp>
+      <p:sp>
+        <p:nvSpPr>
+          <p:cNvPr id="62" name="Rounded Rectangle 61">
+            <a:extLst>
+              <a:ext uri="{FF2B5EF4-FFF2-40B4-BE49-F238E27FC236}">
+                <a16:creationId xmlns:a16="http://schemas.microsoft.com/office/drawing/2014/main" id="{4131E2F9-4AFD-C64A-ACB3-397DDBCDF606}"/>
+              </a:ext>
+            </a:extLst>
+          </p:cNvPr>
+          <p:cNvSpPr/>
+          <p:nvPr/>
+        </p:nvSpPr>
+        <p:spPr>
+          <a:xfrm>
+            <a:off x="4563473" y="2319168"/>
+            <a:ext cx="1299434" cy="573336"/>
+          </a:xfrm>
+          <a:prstGeom prst="roundRect">
+            <a:avLst/>
+          </a:prstGeom>
+          <a:solidFill>
+            <a:srgbClr val="3A4298"/>
+          </a:solidFill>
+        </p:spPr>
+        <p:style>
+          <a:lnRef idx="2">
+            <a:schemeClr val="accent1">
+              <a:shade val="50000"/>
+            </a:schemeClr>
+          </a:lnRef>
+          <a:fillRef idx="1">
+            <a:schemeClr val="accent1"/>
+          </a:fillRef>
+          <a:effectRef idx="0">
+            <a:schemeClr val="accent1"/>
+          </a:effectRef>
+          <a:fontRef idx="minor">
+            <a:schemeClr val="lt1"/>
+          </a:fontRef>
+        </p:style>
+        <p:txBody>
+          <a:bodyPr rtlCol="0" anchor="ctr"/>
+          <a:lstStyle/>
+          <a:p>
+            <a:pPr algn="ctr"/>
+            <a:r>
+              <a:rPr lang="nl-NL" sz="1200" dirty="0">
+                <a:latin typeface="+mj-lt"/>
+              </a:rPr>
+              <a:t>API </a:t>
+            </a:r>
+            <a:r>
+              <a:rPr lang="nl-NL" sz="1200" dirty="0" err="1">
+                <a:latin typeface="+mj-lt"/>
+              </a:rPr>
+              <a:t>Lifecycle</a:t>
+            </a:r>
+            <a:r>
+              <a:rPr lang="nl-NL" sz="1200" dirty="0">
+                <a:latin typeface="+mj-lt"/>
+              </a:rPr>
+              <a:t> beheer</a:t>
+            </a:r>
+            <a:endParaRPr lang="en-NL" sz="1200" dirty="0">
+              <a:latin typeface="+mj-lt"/>
+            </a:endParaRPr>
+          </a:p>
+        </p:txBody>
+      </p:sp>
+      <p:sp>
+        <p:nvSpPr>
+          <p:cNvPr id="57" name="Rounded Rectangle 38">
+            <a:extLst>
+              <a:ext uri="{FF2B5EF4-FFF2-40B4-BE49-F238E27FC236}">
+                <a16:creationId xmlns:a16="http://schemas.microsoft.com/office/drawing/2014/main" id="{E5C27DE2-CC0B-574B-A955-49A95A2F0DCB}"/>
+              </a:ext>
+            </a:extLst>
+          </p:cNvPr>
+          <p:cNvSpPr/>
+          <p:nvPr/>
+        </p:nvSpPr>
+        <p:spPr>
+          <a:xfrm>
+            <a:off x="4563473" y="1668713"/>
+            <a:ext cx="1299434" cy="573336"/>
+          </a:xfrm>
+          <a:prstGeom prst="roundRect">
+            <a:avLst/>
+          </a:prstGeom>
+          <a:solidFill>
+            <a:srgbClr val="3A4298"/>
+          </a:solidFill>
+        </p:spPr>
+        <p:style>
+          <a:lnRef idx="2">
+            <a:schemeClr val="accent1">
+              <a:shade val="50000"/>
+            </a:schemeClr>
+          </a:lnRef>
+          <a:fillRef idx="1">
+            <a:schemeClr val="accent1"/>
+          </a:fillRef>
+          <a:effectRef idx="0">
+            <a:schemeClr val="accent1"/>
+          </a:effectRef>
+          <a:fontRef idx="minor">
+            <a:schemeClr val="lt1"/>
+          </a:fontRef>
+        </p:style>
+        <p:txBody>
+          <a:bodyPr rtlCol="0" anchor="ctr"/>
+          <a:lstStyle/>
+          <a:p>
+            <a:pPr algn="ctr"/>
+            <a:r>
+              <a:rPr lang="nl-NL" sz="1200" dirty="0">
+                <a:latin typeface="+mj-lt"/>
+              </a:rPr>
+              <a:t>Afspraken, Standaarden &amp; Richtlijnen</a:t>
+            </a:r>
+            <a:endParaRPr lang="en-NL" sz="1200" dirty="0">
+              <a:latin typeface="+mj-lt"/>
+            </a:endParaRPr>
+          </a:p>
+        </p:txBody>
+      </p:sp>
+      <p:sp>
+        <p:nvSpPr>
+          <p:cNvPr id="45" name="Rounded Rectangle 38">
+            <a:extLst>
+              <a:ext uri="{FF2B5EF4-FFF2-40B4-BE49-F238E27FC236}">
+                <a16:creationId xmlns:a16="http://schemas.microsoft.com/office/drawing/2014/main" id="{E5C27DE2-CC0B-574B-A955-49A95A2F0DCB}"/>
+              </a:ext>
+            </a:extLst>
+          </p:cNvPr>
+          <p:cNvSpPr/>
+          <p:nvPr/>
+        </p:nvSpPr>
+        <p:spPr>
+          <a:xfrm>
+            <a:off x="4563473" y="1031758"/>
+            <a:ext cx="1299434" cy="573336"/>
+          </a:xfrm>
+          <a:prstGeom prst="roundRect">
+            <a:avLst/>
+          </a:prstGeom>
+          <a:solidFill>
+            <a:srgbClr val="3A4298"/>
+          </a:solidFill>
+        </p:spPr>
+        <p:style>
+          <a:lnRef idx="2">
+            <a:schemeClr val="accent1">
+              <a:shade val="50000"/>
+            </a:schemeClr>
+          </a:lnRef>
+          <a:fillRef idx="1">
+            <a:schemeClr val="accent1"/>
+          </a:fillRef>
+          <a:effectRef idx="0">
+            <a:schemeClr val="accent1"/>
+          </a:effectRef>
+          <a:fontRef idx="minor">
+            <a:schemeClr val="lt1"/>
+          </a:fontRef>
+        </p:style>
+        <p:txBody>
+          <a:bodyPr rtlCol="0" anchor="ctr"/>
+          <a:lstStyle/>
+          <a:p>
+            <a:pPr algn="ctr"/>
+            <a:r>
+              <a:rPr lang="en-NL" sz="1200" dirty="0">
+                <a:latin typeface="+mj-lt"/>
+              </a:rPr>
+              <a:t>API Resource Registratie</a:t>
+            </a:r>
+          </a:p>
+        </p:txBody>
+      </p:sp>
+    </p:spTree>
+    <p:extLst>
+      <p:ext uri="{BB962C8B-B14F-4D97-AF65-F5344CB8AC3E}">
+        <p14:creationId xmlns:p14="http://schemas.microsoft.com/office/powerpoint/2010/main" val="3908372904"/>
+      </p:ext>
+    </p:extLst>
+  </p:cSld>
+  <p:clrMapOvr>
+    <a:masterClrMapping/>
+  </p:clrMapOvr>
+</p:sld>
+</file>
+
 <file path=ppt/theme/theme1.xml><?xml version="1.0" encoding="utf-8"?>
 <a:theme xmlns:a="http://schemas.openxmlformats.org/drawingml/2006/main" name="Office Theme">
   <a:themeElements>

</xml_diff>

<commit_message>
Added descriptions to API capability model
</commit_message>
<xml_diff>
--- a/Werkgroep API architectuur/uitwerkingen/media/API Capabilities.pptx
+++ b/Werkgroep API architectuur/uitwerkingen/media/API Capabilities.pptx
@@ -4,10 +4,14 @@
   <p:sldMasterIdLst>
     <p:sldMasterId id="2147483648" r:id="rId1"/>
   </p:sldMasterIdLst>
+  <p:notesMasterIdLst>
+    <p:notesMasterId r:id="rId6"/>
+  </p:notesMasterIdLst>
   <p:sldIdLst>
     <p:sldId id="256" r:id="rId2"/>
     <p:sldId id="257" r:id="rId3"/>
     <p:sldId id="258" r:id="rId4"/>
+    <p:sldId id="259" r:id="rId5"/>
   </p:sldIdLst>
   <p:sldSz cx="12192000" cy="6858000"/>
   <p:notesSz cx="6858000" cy="9144000"/>
@@ -122,6 +126,445 @@
 </p1510:revInfo>
 </file>
 
+<file path=ppt/notesMasters/notesMaster1.xml><?xml version="1.0" encoding="utf-8"?>
+<p:notesMaster xmlns:a="http://schemas.openxmlformats.org/drawingml/2006/main" xmlns:r="http://schemas.openxmlformats.org/officeDocument/2006/relationships" xmlns:p="http://schemas.openxmlformats.org/presentationml/2006/main">
+  <p:cSld>
+    <p:bg>
+      <p:bgRef idx="1001">
+        <a:schemeClr val="bg1"/>
+      </p:bgRef>
+    </p:bg>
+    <p:spTree>
+      <p:nvGrpSpPr>
+        <p:cNvPr id="1" name=""/>
+        <p:cNvGrpSpPr/>
+        <p:nvPr/>
+      </p:nvGrpSpPr>
+      <p:grpSpPr>
+        <a:xfrm>
+          <a:off x="0" y="0"/>
+          <a:ext cx="0" cy="0"/>
+          <a:chOff x="0" y="0"/>
+          <a:chExt cx="0" cy="0"/>
+        </a:xfrm>
+      </p:grpSpPr>
+      <p:sp>
+        <p:nvSpPr>
+          <p:cNvPr id="2" name="Header Placeholder 1"/>
+          <p:cNvSpPr>
+            <a:spLocks noGrp="1"/>
+          </p:cNvSpPr>
+          <p:nvPr>
+            <p:ph type="hdr" sz="quarter"/>
+          </p:nvPr>
+        </p:nvSpPr>
+        <p:spPr>
+          <a:xfrm>
+            <a:off x="0" y="0"/>
+            <a:ext cx="2971800" cy="458788"/>
+          </a:xfrm>
+          <a:prstGeom prst="rect">
+            <a:avLst/>
+          </a:prstGeom>
+        </p:spPr>
+        <p:txBody>
+          <a:bodyPr vert="horz" lIns="91440" tIns="45720" rIns="91440" bIns="45720" rtlCol="0"/>
+          <a:lstStyle>
+            <a:lvl1pPr algn="l">
+              <a:defRPr sz="1200"/>
+            </a:lvl1pPr>
+          </a:lstStyle>
+          <a:p>
+            <a:endParaRPr lang="en-NL"/>
+          </a:p>
+        </p:txBody>
+      </p:sp>
+      <p:sp>
+        <p:nvSpPr>
+          <p:cNvPr id="3" name="Date Placeholder 2"/>
+          <p:cNvSpPr>
+            <a:spLocks noGrp="1"/>
+          </p:cNvSpPr>
+          <p:nvPr>
+            <p:ph type="dt" idx="1"/>
+          </p:nvPr>
+        </p:nvSpPr>
+        <p:spPr>
+          <a:xfrm>
+            <a:off x="3884613" y="0"/>
+            <a:ext cx="2971800" cy="458788"/>
+          </a:xfrm>
+          <a:prstGeom prst="rect">
+            <a:avLst/>
+          </a:prstGeom>
+        </p:spPr>
+        <p:txBody>
+          <a:bodyPr vert="horz" lIns="91440" tIns="45720" rIns="91440" bIns="45720" rtlCol="0"/>
+          <a:lstStyle>
+            <a:lvl1pPr algn="r">
+              <a:defRPr sz="1200"/>
+            </a:lvl1pPr>
+          </a:lstStyle>
+          <a:p>
+            <a:fld id="{C74F389D-EBBB-934F-B4E0-C9D666754445}" type="datetimeFigureOut">
+              <a:rPr lang="en-NL" smtClean="0"/>
+              <a:t>26/05/2021</a:t>
+            </a:fld>
+            <a:endParaRPr lang="en-NL"/>
+          </a:p>
+        </p:txBody>
+      </p:sp>
+      <p:sp>
+        <p:nvSpPr>
+          <p:cNvPr id="4" name="Slide Image Placeholder 3"/>
+          <p:cNvSpPr>
+            <a:spLocks noGrp="1" noRot="1" noChangeAspect="1"/>
+          </p:cNvSpPr>
+          <p:nvPr>
+            <p:ph type="sldImg" idx="2"/>
+          </p:nvPr>
+        </p:nvSpPr>
+        <p:spPr>
+          <a:xfrm>
+            <a:off x="685800" y="1143000"/>
+            <a:ext cx="5486400" cy="3086100"/>
+          </a:xfrm>
+          <a:prstGeom prst="rect">
+            <a:avLst/>
+          </a:prstGeom>
+          <a:noFill/>
+          <a:ln w="12700">
+            <a:solidFill>
+              <a:prstClr val="black"/>
+            </a:solidFill>
+          </a:ln>
+        </p:spPr>
+        <p:txBody>
+          <a:bodyPr vert="horz" lIns="91440" tIns="45720" rIns="91440" bIns="45720" rtlCol="0" anchor="ctr"/>
+          <a:lstStyle/>
+          <a:p>
+            <a:endParaRPr lang="en-NL"/>
+          </a:p>
+        </p:txBody>
+      </p:sp>
+      <p:sp>
+        <p:nvSpPr>
+          <p:cNvPr id="5" name="Notes Placeholder 4"/>
+          <p:cNvSpPr>
+            <a:spLocks noGrp="1"/>
+          </p:cNvSpPr>
+          <p:nvPr>
+            <p:ph type="body" sz="quarter" idx="3"/>
+          </p:nvPr>
+        </p:nvSpPr>
+        <p:spPr>
+          <a:xfrm>
+            <a:off x="685800" y="4400550"/>
+            <a:ext cx="5486400" cy="3600450"/>
+          </a:xfrm>
+          <a:prstGeom prst="rect">
+            <a:avLst/>
+          </a:prstGeom>
+        </p:spPr>
+        <p:txBody>
+          <a:bodyPr vert="horz" lIns="91440" tIns="45720" rIns="91440" bIns="45720" rtlCol="0"/>
+          <a:lstStyle/>
+          <a:p>
+            <a:pPr lvl="0"/>
+            <a:r>
+              <a:rPr lang="en-GB"/>
+              <a:t>Click to edit Master text styles</a:t>
+            </a:r>
+          </a:p>
+          <a:p>
+            <a:pPr lvl="1"/>
+            <a:r>
+              <a:rPr lang="en-GB"/>
+              <a:t>Second level</a:t>
+            </a:r>
+          </a:p>
+          <a:p>
+            <a:pPr lvl="2"/>
+            <a:r>
+              <a:rPr lang="en-GB"/>
+              <a:t>Third level</a:t>
+            </a:r>
+          </a:p>
+          <a:p>
+            <a:pPr lvl="3"/>
+            <a:r>
+              <a:rPr lang="en-GB"/>
+              <a:t>Fourth level</a:t>
+            </a:r>
+          </a:p>
+          <a:p>
+            <a:pPr lvl="4"/>
+            <a:r>
+              <a:rPr lang="en-GB"/>
+              <a:t>Fifth level</a:t>
+            </a:r>
+            <a:endParaRPr lang="en-NL"/>
+          </a:p>
+        </p:txBody>
+      </p:sp>
+      <p:sp>
+        <p:nvSpPr>
+          <p:cNvPr id="6" name="Footer Placeholder 5"/>
+          <p:cNvSpPr>
+            <a:spLocks noGrp="1"/>
+          </p:cNvSpPr>
+          <p:nvPr>
+            <p:ph type="ftr" sz="quarter" idx="4"/>
+          </p:nvPr>
+        </p:nvSpPr>
+        <p:spPr>
+          <a:xfrm>
+            <a:off x="0" y="8685213"/>
+            <a:ext cx="2971800" cy="458787"/>
+          </a:xfrm>
+          <a:prstGeom prst="rect">
+            <a:avLst/>
+          </a:prstGeom>
+        </p:spPr>
+        <p:txBody>
+          <a:bodyPr vert="horz" lIns="91440" tIns="45720" rIns="91440" bIns="45720" rtlCol="0" anchor="b"/>
+          <a:lstStyle>
+            <a:lvl1pPr algn="l">
+              <a:defRPr sz="1200"/>
+            </a:lvl1pPr>
+          </a:lstStyle>
+          <a:p>
+            <a:endParaRPr lang="en-NL"/>
+          </a:p>
+        </p:txBody>
+      </p:sp>
+      <p:sp>
+        <p:nvSpPr>
+          <p:cNvPr id="7" name="Slide Number Placeholder 6"/>
+          <p:cNvSpPr>
+            <a:spLocks noGrp="1"/>
+          </p:cNvSpPr>
+          <p:nvPr>
+            <p:ph type="sldNum" sz="quarter" idx="5"/>
+          </p:nvPr>
+        </p:nvSpPr>
+        <p:spPr>
+          <a:xfrm>
+            <a:off x="3884613" y="8685213"/>
+            <a:ext cx="2971800" cy="458787"/>
+          </a:xfrm>
+          <a:prstGeom prst="rect">
+            <a:avLst/>
+          </a:prstGeom>
+        </p:spPr>
+        <p:txBody>
+          <a:bodyPr vert="horz" lIns="91440" tIns="45720" rIns="91440" bIns="45720" rtlCol="0" anchor="b"/>
+          <a:lstStyle>
+            <a:lvl1pPr algn="r">
+              <a:defRPr sz="1200"/>
+            </a:lvl1pPr>
+          </a:lstStyle>
+          <a:p>
+            <a:fld id="{F1E1357B-3B64-7648-A5E1-35E13923AA70}" type="slidenum">
+              <a:rPr lang="en-NL" smtClean="0"/>
+              <a:t>‹#›</a:t>
+            </a:fld>
+            <a:endParaRPr lang="en-NL"/>
+          </a:p>
+        </p:txBody>
+      </p:sp>
+    </p:spTree>
+    <p:extLst>
+      <p:ext uri="{BB962C8B-B14F-4D97-AF65-F5344CB8AC3E}">
+        <p14:creationId xmlns:p14="http://schemas.microsoft.com/office/powerpoint/2010/main" val="1192134369"/>
+      </p:ext>
+    </p:extLst>
+  </p:cSld>
+  <p:clrMap bg1="lt1" tx1="dk1" bg2="lt2" tx2="dk2" accent1="accent1" accent2="accent2" accent3="accent3" accent4="accent4" accent5="accent5" accent6="accent6" hlink="hlink" folHlink="folHlink"/>
+  <p:notesStyle>
+    <a:lvl1pPr marL="0" algn="l" defTabSz="914400" rtl="0" eaLnBrk="1" latinLnBrk="0" hangingPunct="1">
+      <a:defRPr sz="1200" kern="1200">
+        <a:solidFill>
+          <a:schemeClr val="tx1"/>
+        </a:solidFill>
+        <a:latin typeface="+mn-lt"/>
+        <a:ea typeface="+mn-ea"/>
+        <a:cs typeface="+mn-cs"/>
+      </a:defRPr>
+    </a:lvl1pPr>
+    <a:lvl2pPr marL="457200" algn="l" defTabSz="914400" rtl="0" eaLnBrk="1" latinLnBrk="0" hangingPunct="1">
+      <a:defRPr sz="1200" kern="1200">
+        <a:solidFill>
+          <a:schemeClr val="tx1"/>
+        </a:solidFill>
+        <a:latin typeface="+mn-lt"/>
+        <a:ea typeface="+mn-ea"/>
+        <a:cs typeface="+mn-cs"/>
+      </a:defRPr>
+    </a:lvl2pPr>
+    <a:lvl3pPr marL="914400" algn="l" defTabSz="914400" rtl="0" eaLnBrk="1" latinLnBrk="0" hangingPunct="1">
+      <a:defRPr sz="1200" kern="1200">
+        <a:solidFill>
+          <a:schemeClr val="tx1"/>
+        </a:solidFill>
+        <a:latin typeface="+mn-lt"/>
+        <a:ea typeface="+mn-ea"/>
+        <a:cs typeface="+mn-cs"/>
+      </a:defRPr>
+    </a:lvl3pPr>
+    <a:lvl4pPr marL="1371600" algn="l" defTabSz="914400" rtl="0" eaLnBrk="1" latinLnBrk="0" hangingPunct="1">
+      <a:defRPr sz="1200" kern="1200">
+        <a:solidFill>
+          <a:schemeClr val="tx1"/>
+        </a:solidFill>
+        <a:latin typeface="+mn-lt"/>
+        <a:ea typeface="+mn-ea"/>
+        <a:cs typeface="+mn-cs"/>
+      </a:defRPr>
+    </a:lvl4pPr>
+    <a:lvl5pPr marL="1828800" algn="l" defTabSz="914400" rtl="0" eaLnBrk="1" latinLnBrk="0" hangingPunct="1">
+      <a:defRPr sz="1200" kern="1200">
+        <a:solidFill>
+          <a:schemeClr val="tx1"/>
+        </a:solidFill>
+        <a:latin typeface="+mn-lt"/>
+        <a:ea typeface="+mn-ea"/>
+        <a:cs typeface="+mn-cs"/>
+      </a:defRPr>
+    </a:lvl5pPr>
+    <a:lvl6pPr marL="2286000" algn="l" defTabSz="914400" rtl="0" eaLnBrk="1" latinLnBrk="0" hangingPunct="1">
+      <a:defRPr sz="1200" kern="1200">
+        <a:solidFill>
+          <a:schemeClr val="tx1"/>
+        </a:solidFill>
+        <a:latin typeface="+mn-lt"/>
+        <a:ea typeface="+mn-ea"/>
+        <a:cs typeface="+mn-cs"/>
+      </a:defRPr>
+    </a:lvl6pPr>
+    <a:lvl7pPr marL="2743200" algn="l" defTabSz="914400" rtl="0" eaLnBrk="1" latinLnBrk="0" hangingPunct="1">
+      <a:defRPr sz="1200" kern="1200">
+        <a:solidFill>
+          <a:schemeClr val="tx1"/>
+        </a:solidFill>
+        <a:latin typeface="+mn-lt"/>
+        <a:ea typeface="+mn-ea"/>
+        <a:cs typeface="+mn-cs"/>
+      </a:defRPr>
+    </a:lvl7pPr>
+    <a:lvl8pPr marL="3200400" algn="l" defTabSz="914400" rtl="0" eaLnBrk="1" latinLnBrk="0" hangingPunct="1">
+      <a:defRPr sz="1200" kern="1200">
+        <a:solidFill>
+          <a:schemeClr val="tx1"/>
+        </a:solidFill>
+        <a:latin typeface="+mn-lt"/>
+        <a:ea typeface="+mn-ea"/>
+        <a:cs typeface="+mn-cs"/>
+      </a:defRPr>
+    </a:lvl8pPr>
+    <a:lvl9pPr marL="3657600" algn="l" defTabSz="914400" rtl="0" eaLnBrk="1" latinLnBrk="0" hangingPunct="1">
+      <a:defRPr sz="1200" kern="1200">
+        <a:solidFill>
+          <a:schemeClr val="tx1"/>
+        </a:solidFill>
+        <a:latin typeface="+mn-lt"/>
+        <a:ea typeface="+mn-ea"/>
+        <a:cs typeface="+mn-cs"/>
+      </a:defRPr>
+    </a:lvl9pPr>
+  </p:notesStyle>
+</p:notesMaster>
+</file>
+
+<file path=ppt/notesSlides/notesSlide1.xml><?xml version="1.0" encoding="utf-8"?>
+<p:notes xmlns:a="http://schemas.openxmlformats.org/drawingml/2006/main" xmlns:r="http://schemas.openxmlformats.org/officeDocument/2006/relationships" xmlns:p="http://schemas.openxmlformats.org/presentationml/2006/main">
+  <p:cSld>
+    <p:spTree>
+      <p:nvGrpSpPr>
+        <p:cNvPr id="1" name=""/>
+        <p:cNvGrpSpPr/>
+        <p:nvPr/>
+      </p:nvGrpSpPr>
+      <p:grpSpPr>
+        <a:xfrm>
+          <a:off x="0" y="0"/>
+          <a:ext cx="0" cy="0"/>
+          <a:chOff x="0" y="0"/>
+          <a:chExt cx="0" cy="0"/>
+        </a:xfrm>
+      </p:grpSpPr>
+      <p:sp>
+        <p:nvSpPr>
+          <p:cNvPr id="2" name="Slide Image Placeholder 1"/>
+          <p:cNvSpPr>
+            <a:spLocks noGrp="1" noRot="1" noChangeAspect="1"/>
+          </p:cNvSpPr>
+          <p:nvPr>
+            <p:ph type="sldImg"/>
+          </p:nvPr>
+        </p:nvSpPr>
+        <p:spPr>
+          <a:xfrm>
+            <a:off x="685800" y="1143000"/>
+            <a:ext cx="5486400" cy="3086100"/>
+          </a:xfrm>
+        </p:spPr>
+      </p:sp>
+      <p:sp>
+        <p:nvSpPr>
+          <p:cNvPr id="3" name="Notes Placeholder 2"/>
+          <p:cNvSpPr>
+            <a:spLocks noGrp="1"/>
+          </p:cNvSpPr>
+          <p:nvPr>
+            <p:ph type="body" idx="1"/>
+          </p:nvPr>
+        </p:nvSpPr>
+        <p:spPr/>
+        <p:txBody>
+          <a:bodyPr/>
+          <a:lstStyle/>
+          <a:p>
+            <a:endParaRPr lang="en-NL" dirty="0"/>
+          </a:p>
+        </p:txBody>
+      </p:sp>
+      <p:sp>
+        <p:nvSpPr>
+          <p:cNvPr id="4" name="Slide Number Placeholder 3"/>
+          <p:cNvSpPr>
+            <a:spLocks noGrp="1"/>
+          </p:cNvSpPr>
+          <p:nvPr>
+            <p:ph type="sldNum" sz="quarter" idx="5"/>
+          </p:nvPr>
+        </p:nvSpPr>
+        <p:spPr/>
+        <p:txBody>
+          <a:bodyPr/>
+          <a:lstStyle/>
+          <a:p>
+            <a:fld id="{F1E1357B-3B64-7648-A5E1-35E13923AA70}" type="slidenum">
+              <a:rPr lang="en-NL" smtClean="0"/>
+              <a:t>4</a:t>
+            </a:fld>
+            <a:endParaRPr lang="en-NL"/>
+          </a:p>
+        </p:txBody>
+      </p:sp>
+    </p:spTree>
+    <p:extLst>
+      <p:ext uri="{BB962C8B-B14F-4D97-AF65-F5344CB8AC3E}">
+        <p14:creationId xmlns:p14="http://schemas.microsoft.com/office/powerpoint/2010/main" val="287159074"/>
+      </p:ext>
+    </p:extLst>
+  </p:cSld>
+  <p:clrMapOvr>
+    <a:masterClrMapping/>
+  </p:clrMapOvr>
+</p:notes>
+</file>
+
 <file path=ppt/slideLayouts/slideLayout1.xml><?xml version="1.0" encoding="utf-8"?>
 <p:sldLayout xmlns:a="http://schemas.openxmlformats.org/drawingml/2006/main" xmlns:r="http://schemas.openxmlformats.org/officeDocument/2006/relationships" xmlns:p="http://schemas.openxmlformats.org/presentationml/2006/main" type="title" preserve="1">
   <p:cSld name="Title Slide">
@@ -157,7 +600,7 @@
         </p:nvSpPr>
         <p:spPr>
           <a:xfrm>
-            <a:off x="1524000" y="1122363"/>
+            <a:off x="1524001" y="1122363"/>
             <a:ext cx="9144000" cy="2387600"/>
           </a:xfrm>
         </p:spPr>
@@ -195,7 +638,7 @@
         </p:nvSpPr>
         <p:spPr>
           <a:xfrm>
-            <a:off x="1524000" y="3602038"/>
+            <a:off x="1524001" y="3602038"/>
             <a:ext cx="9144000" cy="1655762"/>
           </a:xfrm>
         </p:spPr>
@@ -271,7 +714,7 @@
           <a:p>
             <a:fld id="{9C27045A-4E63-2949-8A05-DA4D85C37A94}" type="datetimeFigureOut">
               <a:rPr lang="en-NL" smtClean="0"/>
-              <a:t>25/05/2021</a:t>
+              <a:t>26/05/2021</a:t>
             </a:fld>
             <a:endParaRPr lang="en-NL"/>
           </a:p>
@@ -471,7 +914,7 @@
           <a:p>
             <a:fld id="{9C27045A-4E63-2949-8A05-DA4D85C37A94}" type="datetimeFigureOut">
               <a:rPr lang="en-NL" smtClean="0"/>
-              <a:t>25/05/2021</a:t>
+              <a:t>26/05/2021</a:t>
             </a:fld>
             <a:endParaRPr lang="en-NL"/>
           </a:p>
@@ -681,7 +1124,7 @@
           <a:p>
             <a:fld id="{9C27045A-4E63-2949-8A05-DA4D85C37A94}" type="datetimeFigureOut">
               <a:rPr lang="en-NL" smtClean="0"/>
-              <a:t>25/05/2021</a:t>
+              <a:t>26/05/2021</a:t>
             </a:fld>
             <a:endParaRPr lang="en-NL"/>
           </a:p>
@@ -881,7 +1324,7 @@
           <a:p>
             <a:fld id="{9C27045A-4E63-2949-8A05-DA4D85C37A94}" type="datetimeFigureOut">
               <a:rPr lang="en-NL" smtClean="0"/>
-              <a:t>25/05/2021</a:t>
+              <a:t>26/05/2021</a:t>
             </a:fld>
             <a:endParaRPr lang="en-NL"/>
           </a:p>
@@ -989,7 +1432,7 @@
         </p:nvSpPr>
         <p:spPr>
           <a:xfrm>
-            <a:off x="831850" y="1709738"/>
+            <a:off x="831850" y="1709740"/>
             <a:ext cx="10515600" cy="2852737"/>
           </a:xfrm>
         </p:spPr>
@@ -1027,7 +1470,7 @@
         </p:nvSpPr>
         <p:spPr>
           <a:xfrm>
-            <a:off x="831850" y="4589463"/>
+            <a:off x="831850" y="4589465"/>
             <a:ext cx="10515600" cy="1500187"/>
           </a:xfrm>
         </p:spPr>
@@ -1157,7 +1600,7 @@
           <a:p>
             <a:fld id="{9C27045A-4E63-2949-8A05-DA4D85C37A94}" type="datetimeFigureOut">
               <a:rPr lang="en-NL" smtClean="0"/>
-              <a:t>25/05/2021</a:t>
+              <a:t>26/05/2021</a:t>
             </a:fld>
             <a:endParaRPr lang="en-NL"/>
           </a:p>
@@ -1425,7 +1868,7 @@
           <a:p>
             <a:fld id="{9C27045A-4E63-2949-8A05-DA4D85C37A94}" type="datetimeFigureOut">
               <a:rPr lang="en-NL" smtClean="0"/>
-              <a:t>25/05/2021</a:t>
+              <a:t>26/05/2021</a:t>
             </a:fld>
             <a:endParaRPr lang="en-NL"/>
           </a:p>
@@ -1533,7 +1976,7 @@
         </p:nvSpPr>
         <p:spPr>
           <a:xfrm>
-            <a:off x="839788" y="365125"/>
+            <a:off x="839788" y="365127"/>
             <a:ext cx="10515600" cy="1325563"/>
           </a:xfrm>
         </p:spPr>
@@ -1567,7 +2010,7 @@
         </p:nvSpPr>
         <p:spPr>
           <a:xfrm>
-            <a:off x="839788" y="1681163"/>
+            <a:off x="839789" y="1681163"/>
             <a:ext cx="5157787" cy="823912"/>
           </a:xfrm>
         </p:spPr>
@@ -1638,7 +2081,7 @@
         </p:nvSpPr>
         <p:spPr>
           <a:xfrm>
-            <a:off x="839788" y="2505075"/>
+            <a:off x="839789" y="2505075"/>
             <a:ext cx="5157787" cy="3684588"/>
           </a:xfrm>
         </p:spPr>
@@ -1701,7 +2144,7 @@
         </p:nvSpPr>
         <p:spPr>
           <a:xfrm>
-            <a:off x="6172200" y="1681163"/>
+            <a:off x="6172201" y="1681163"/>
             <a:ext cx="5183188" cy="823912"/>
           </a:xfrm>
         </p:spPr>
@@ -1772,7 +2215,7 @@
         </p:nvSpPr>
         <p:spPr>
           <a:xfrm>
-            <a:off x="6172200" y="2505075"/>
+            <a:off x="6172201" y="2505075"/>
             <a:ext cx="5183188" cy="3684588"/>
           </a:xfrm>
         </p:spPr>
@@ -1840,7 +2283,7 @@
           <a:p>
             <a:fld id="{9C27045A-4E63-2949-8A05-DA4D85C37A94}" type="datetimeFigureOut">
               <a:rPr lang="en-NL" smtClean="0"/>
-              <a:t>25/05/2021</a:t>
+              <a:t>26/05/2021</a:t>
             </a:fld>
             <a:endParaRPr lang="en-NL"/>
           </a:p>
@@ -1982,7 +2425,7 @@
           <a:p>
             <a:fld id="{9C27045A-4E63-2949-8A05-DA4D85C37A94}" type="datetimeFigureOut">
               <a:rPr lang="en-NL" smtClean="0"/>
-              <a:t>25/05/2021</a:t>
+              <a:t>26/05/2021</a:t>
             </a:fld>
             <a:endParaRPr lang="en-NL"/>
           </a:p>
@@ -2095,7 +2538,7 @@
           <a:p>
             <a:fld id="{9C27045A-4E63-2949-8A05-DA4D85C37A94}" type="datetimeFigureOut">
               <a:rPr lang="en-NL" smtClean="0"/>
-              <a:t>25/05/2021</a:t>
+              <a:t>26/05/2021</a:t>
             </a:fld>
             <a:endParaRPr lang="en-NL"/>
           </a:p>
@@ -2203,7 +2646,7 @@
         </p:nvSpPr>
         <p:spPr>
           <a:xfrm>
-            <a:off x="839788" y="457200"/>
+            <a:off x="839789" y="457200"/>
             <a:ext cx="3932237" cy="1600200"/>
           </a:xfrm>
         </p:spPr>
@@ -2241,8 +2684,8 @@
         </p:nvSpPr>
         <p:spPr>
           <a:xfrm>
-            <a:off x="5183188" y="987425"/>
-            <a:ext cx="6172200" cy="4873625"/>
+            <a:off x="5183188" y="987427"/>
+            <a:ext cx="6172201" cy="4873625"/>
           </a:xfrm>
         </p:spPr>
         <p:txBody>
@@ -2332,7 +2775,7 @@
         </p:nvSpPr>
         <p:spPr>
           <a:xfrm>
-            <a:off x="839788" y="2057400"/>
+            <a:off x="839789" y="2057400"/>
             <a:ext cx="3932237" cy="3811588"/>
           </a:xfrm>
         </p:spPr>
@@ -2408,7 +2851,7 @@
           <a:p>
             <a:fld id="{9C27045A-4E63-2949-8A05-DA4D85C37A94}" type="datetimeFigureOut">
               <a:rPr lang="en-NL" smtClean="0"/>
-              <a:t>25/05/2021</a:t>
+              <a:t>26/05/2021</a:t>
             </a:fld>
             <a:endParaRPr lang="en-NL"/>
           </a:p>
@@ -2516,7 +2959,7 @@
         </p:nvSpPr>
         <p:spPr>
           <a:xfrm>
-            <a:off x="839788" y="457200"/>
+            <a:off x="839789" y="457200"/>
             <a:ext cx="3932237" cy="1600200"/>
           </a:xfrm>
         </p:spPr>
@@ -2554,8 +2997,8 @@
         </p:nvSpPr>
         <p:spPr>
           <a:xfrm>
-            <a:off x="5183188" y="987425"/>
-            <a:ext cx="6172200" cy="4873625"/>
+            <a:off x="5183188" y="987427"/>
+            <a:ext cx="6172201" cy="4873625"/>
           </a:xfrm>
         </p:spPr>
         <p:txBody>
@@ -2621,7 +3064,7 @@
         </p:nvSpPr>
         <p:spPr>
           <a:xfrm>
-            <a:off x="839788" y="2057400"/>
+            <a:off x="839789" y="2057400"/>
             <a:ext cx="3932237" cy="3811588"/>
           </a:xfrm>
         </p:spPr>
@@ -2697,7 +3140,7 @@
           <a:p>
             <a:fld id="{9C27045A-4E63-2949-8A05-DA4D85C37A94}" type="datetimeFigureOut">
               <a:rPr lang="en-NL" smtClean="0"/>
-              <a:t>25/05/2021</a:t>
+              <a:t>26/05/2021</a:t>
             </a:fld>
             <a:endParaRPr lang="en-NL"/>
           </a:p>
@@ -2810,7 +3253,7 @@
         </p:nvSpPr>
         <p:spPr>
           <a:xfrm>
-            <a:off x="838200" y="365125"/>
+            <a:off x="838201" y="365127"/>
             <a:ext cx="10515600" cy="1325563"/>
           </a:xfrm>
           <a:prstGeom prst="rect">
@@ -2849,7 +3292,7 @@
         </p:nvSpPr>
         <p:spPr>
           <a:xfrm>
-            <a:off x="838200" y="1825625"/>
+            <a:off x="838201" y="1825625"/>
             <a:ext cx="10515600" cy="4351338"/>
           </a:xfrm>
           <a:prstGeom prst="rect">
@@ -2917,7 +3360,7 @@
         </p:nvSpPr>
         <p:spPr>
           <a:xfrm>
-            <a:off x="838200" y="6356350"/>
+            <a:off x="838200" y="6356352"/>
             <a:ext cx="2743200" cy="365125"/>
           </a:xfrm>
           <a:prstGeom prst="rect">
@@ -2940,7 +3383,7 @@
           <a:p>
             <a:fld id="{9C27045A-4E63-2949-8A05-DA4D85C37A94}" type="datetimeFigureOut">
               <a:rPr lang="en-NL" smtClean="0"/>
-              <a:t>25/05/2021</a:t>
+              <a:t>26/05/2021</a:t>
             </a:fld>
             <a:endParaRPr lang="en-NL"/>
           </a:p>
@@ -2964,7 +3407,7 @@
         </p:nvSpPr>
         <p:spPr>
           <a:xfrm>
-            <a:off x="4038600" y="6356350"/>
+            <a:off x="4038601" y="6356352"/>
             <a:ext cx="4114800" cy="365125"/>
           </a:xfrm>
           <a:prstGeom prst="rect">
@@ -3007,7 +3450,7 @@
         </p:nvSpPr>
         <p:spPr>
           <a:xfrm>
-            <a:off x="8610600" y="6356350"/>
+            <a:off x="8610601" y="6356352"/>
             <a:ext cx="2743200" cy="365125"/>
           </a:xfrm>
           <a:prstGeom prst="rect">
@@ -3579,7 +4022,7 @@
         </p:nvSpPr>
         <p:spPr>
           <a:xfrm>
-            <a:off x="1905988" y="665016"/>
+            <a:off x="1905990" y="665018"/>
             <a:ext cx="1413165" cy="605637"/>
           </a:xfrm>
           <a:prstGeom prst="roundRect">
@@ -3628,7 +4071,7 @@
         </p:nvSpPr>
         <p:spPr>
           <a:xfrm>
-            <a:off x="1905988" y="1413164"/>
+            <a:off x="1905990" y="1413166"/>
             <a:ext cx="1413165" cy="605637"/>
           </a:xfrm>
           <a:prstGeom prst="roundRect">
@@ -3677,7 +4120,7 @@
         </p:nvSpPr>
         <p:spPr>
           <a:xfrm>
-            <a:off x="1905988" y="2161313"/>
+            <a:off x="1905990" y="2161315"/>
             <a:ext cx="1413165" cy="605637"/>
           </a:xfrm>
           <a:prstGeom prst="roundRect">
@@ -3934,7 +4377,7 @@
         </p:nvSpPr>
         <p:spPr>
           <a:xfrm>
-            <a:off x="1905988" y="4215734"/>
+            <a:off x="1905990" y="4215736"/>
             <a:ext cx="1413165" cy="605637"/>
           </a:xfrm>
           <a:prstGeom prst="roundRect">
@@ -3983,7 +4426,7 @@
         </p:nvSpPr>
         <p:spPr>
           <a:xfrm>
-            <a:off x="1905988" y="4963882"/>
+            <a:off x="1905990" y="4963884"/>
             <a:ext cx="1413165" cy="605637"/>
           </a:xfrm>
           <a:prstGeom prst="roundRect">
@@ -4032,7 +4475,7 @@
         </p:nvSpPr>
         <p:spPr>
           <a:xfrm>
-            <a:off x="1905988" y="5712031"/>
+            <a:off x="1905990" y="5712033"/>
             <a:ext cx="1413165" cy="605637"/>
           </a:xfrm>
           <a:prstGeom prst="roundRect">
@@ -4081,7 +4524,7 @@
         </p:nvSpPr>
         <p:spPr>
           <a:xfrm>
-            <a:off x="3604158" y="225629"/>
+            <a:off x="3604160" y="225629"/>
             <a:ext cx="3253839" cy="4180110"/>
           </a:xfrm>
           <a:prstGeom prst="roundRect">
@@ -4142,7 +4585,7 @@
         </p:nvSpPr>
         <p:spPr>
           <a:xfrm>
-            <a:off x="3746662" y="665016"/>
+            <a:off x="3746664" y="665018"/>
             <a:ext cx="1413165" cy="605637"/>
           </a:xfrm>
           <a:prstGeom prst="roundRect">
@@ -4191,7 +4634,7 @@
         </p:nvSpPr>
         <p:spPr>
           <a:xfrm>
-            <a:off x="3746662" y="1413164"/>
+            <a:off x="3746664" y="1413166"/>
             <a:ext cx="1413165" cy="605637"/>
           </a:xfrm>
           <a:prstGeom prst="roundRect">
@@ -4240,7 +4683,7 @@
         </p:nvSpPr>
         <p:spPr>
           <a:xfrm>
-            <a:off x="3746662" y="2161313"/>
+            <a:off x="3746664" y="2161315"/>
             <a:ext cx="1413165" cy="605637"/>
           </a:xfrm>
           <a:prstGeom prst="roundRect">
@@ -4289,7 +4732,7 @@
         </p:nvSpPr>
         <p:spPr>
           <a:xfrm>
-            <a:off x="5296390" y="665016"/>
+            <a:off x="5296392" y="665018"/>
             <a:ext cx="1413165" cy="605637"/>
           </a:xfrm>
           <a:prstGeom prst="roundRect">
@@ -4338,7 +4781,7 @@
         </p:nvSpPr>
         <p:spPr>
           <a:xfrm>
-            <a:off x="5296390" y="1413164"/>
+            <a:off x="5296392" y="1413166"/>
             <a:ext cx="1413165" cy="605637"/>
           </a:xfrm>
           <a:prstGeom prst="roundRect">
@@ -4387,7 +4830,7 @@
         </p:nvSpPr>
         <p:spPr>
           <a:xfrm>
-            <a:off x="5296390" y="2161313"/>
+            <a:off x="5296392" y="2161315"/>
             <a:ext cx="1413165" cy="605637"/>
           </a:xfrm>
           <a:prstGeom prst="roundRect">
@@ -4436,7 +4879,7 @@
         </p:nvSpPr>
         <p:spPr>
           <a:xfrm>
-            <a:off x="3746661" y="2909462"/>
+            <a:off x="3746663" y="2909464"/>
             <a:ext cx="1413165" cy="605637"/>
           </a:xfrm>
           <a:prstGeom prst="roundRect">
@@ -4485,7 +4928,7 @@
         </p:nvSpPr>
         <p:spPr>
           <a:xfrm>
-            <a:off x="5296389" y="2909462"/>
+            <a:off x="5296391" y="2909464"/>
             <a:ext cx="1413165" cy="605637"/>
           </a:xfrm>
           <a:prstGeom prst="roundRect">
@@ -4534,7 +4977,7 @@
         </p:nvSpPr>
         <p:spPr>
           <a:xfrm>
-            <a:off x="3746661" y="3681360"/>
+            <a:off x="3746663" y="3681362"/>
             <a:ext cx="1413165" cy="605637"/>
           </a:xfrm>
           <a:prstGeom prst="roundRect">
@@ -4644,7 +5087,7 @@
         </p:nvSpPr>
         <p:spPr>
           <a:xfrm>
-            <a:off x="7137064" y="665016"/>
+            <a:off x="7137066" y="665018"/>
             <a:ext cx="1413165" cy="605637"/>
           </a:xfrm>
           <a:prstGeom prst="roundRect">
@@ -4693,7 +5136,7 @@
         </p:nvSpPr>
         <p:spPr>
           <a:xfrm>
-            <a:off x="7137064" y="1413164"/>
+            <a:off x="7137066" y="1413166"/>
             <a:ext cx="1413165" cy="605637"/>
           </a:xfrm>
           <a:prstGeom prst="roundRect">
@@ -4742,7 +5185,7 @@
         </p:nvSpPr>
         <p:spPr>
           <a:xfrm>
-            <a:off x="7137064" y="2161313"/>
+            <a:off x="7137066" y="2161315"/>
             <a:ext cx="1413165" cy="605637"/>
           </a:xfrm>
           <a:prstGeom prst="roundRect">
@@ -4791,7 +5234,7 @@
         </p:nvSpPr>
         <p:spPr>
           <a:xfrm>
-            <a:off x="8686792" y="665016"/>
+            <a:off x="8686794" y="665018"/>
             <a:ext cx="1413165" cy="605637"/>
           </a:xfrm>
           <a:prstGeom prst="roundRect">
@@ -4840,7 +5283,7 @@
         </p:nvSpPr>
         <p:spPr>
           <a:xfrm>
-            <a:off x="8686792" y="1413164"/>
+            <a:off x="8686794" y="1413166"/>
             <a:ext cx="1413165" cy="605637"/>
           </a:xfrm>
           <a:prstGeom prst="roundRect">
@@ -4889,7 +5332,7 @@
         </p:nvSpPr>
         <p:spPr>
           <a:xfrm>
-            <a:off x="8686792" y="2161313"/>
+            <a:off x="8686794" y="2161315"/>
             <a:ext cx="1413165" cy="605637"/>
           </a:xfrm>
           <a:prstGeom prst="roundRect">
@@ -4938,7 +5381,7 @@
         </p:nvSpPr>
         <p:spPr>
           <a:xfrm>
-            <a:off x="10262262" y="665016"/>
+            <a:off x="10262264" y="665018"/>
             <a:ext cx="1413165" cy="605637"/>
           </a:xfrm>
           <a:prstGeom prst="roundRect">
@@ -4987,7 +5430,7 @@
         </p:nvSpPr>
         <p:spPr>
           <a:xfrm>
-            <a:off x="10262262" y="1413164"/>
+            <a:off x="10262264" y="1413166"/>
             <a:ext cx="1413165" cy="605637"/>
           </a:xfrm>
           <a:prstGeom prst="roundRect">
@@ -5036,7 +5479,7 @@
         </p:nvSpPr>
         <p:spPr>
           <a:xfrm>
-            <a:off x="10262262" y="2161313"/>
+            <a:off x="10262264" y="2161315"/>
             <a:ext cx="1413165" cy="605637"/>
           </a:xfrm>
           <a:prstGeom prst="roundRect">
@@ -5085,7 +5528,7 @@
         </p:nvSpPr>
         <p:spPr>
           <a:xfrm>
-            <a:off x="3590294" y="4548249"/>
+            <a:off x="3590296" y="4548251"/>
             <a:ext cx="8364199" cy="1911923"/>
           </a:xfrm>
           <a:prstGeom prst="roundRect">
@@ -5146,7 +5589,7 @@
         </p:nvSpPr>
         <p:spPr>
           <a:xfrm>
-            <a:off x="3732799" y="4987636"/>
+            <a:off x="3732801" y="4987638"/>
             <a:ext cx="1413165" cy="605637"/>
           </a:xfrm>
           <a:prstGeom prst="roundRect">
@@ -5195,7 +5638,7 @@
         </p:nvSpPr>
         <p:spPr>
           <a:xfrm>
-            <a:off x="3732799" y="5735784"/>
+            <a:off x="3732801" y="5735786"/>
             <a:ext cx="1413165" cy="605637"/>
           </a:xfrm>
           <a:prstGeom prst="roundRect">
@@ -5244,7 +5687,7 @@
         </p:nvSpPr>
         <p:spPr>
           <a:xfrm>
-            <a:off x="6832255" y="4987636"/>
+            <a:off x="6832257" y="4987638"/>
             <a:ext cx="1413165" cy="605637"/>
           </a:xfrm>
           <a:prstGeom prst="roundRect">
@@ -5293,7 +5736,7 @@
         </p:nvSpPr>
         <p:spPr>
           <a:xfrm>
-            <a:off x="5282527" y="4987636"/>
+            <a:off x="5282529" y="4987638"/>
             <a:ext cx="1413165" cy="605637"/>
           </a:xfrm>
           <a:prstGeom prst="roundRect">
@@ -5342,7 +5785,7 @@
         </p:nvSpPr>
         <p:spPr>
           <a:xfrm>
-            <a:off x="5282527" y="5735784"/>
+            <a:off x="5282529" y="5735786"/>
             <a:ext cx="1413165" cy="605637"/>
           </a:xfrm>
           <a:prstGeom prst="roundRect">
@@ -5391,7 +5834,7 @@
         </p:nvSpPr>
         <p:spPr>
           <a:xfrm>
-            <a:off x="8433467" y="4987636"/>
+            <a:off x="8433469" y="4987638"/>
             <a:ext cx="1413165" cy="605637"/>
           </a:xfrm>
           <a:prstGeom prst="roundRect">
@@ -5447,7 +5890,7 @@
         </p:nvSpPr>
         <p:spPr>
           <a:xfrm>
-            <a:off x="6857997" y="5735784"/>
+            <a:off x="6857999" y="5735786"/>
             <a:ext cx="1413165" cy="605637"/>
           </a:xfrm>
           <a:prstGeom prst="roundRect">
@@ -5496,7 +5939,7 @@
         </p:nvSpPr>
         <p:spPr>
           <a:xfrm>
-            <a:off x="7137064" y="2909462"/>
+            <a:off x="7137066" y="2909464"/>
             <a:ext cx="1413165" cy="605637"/>
           </a:xfrm>
           <a:prstGeom prst="roundRect">
@@ -5545,7 +5988,7 @@
         </p:nvSpPr>
         <p:spPr>
           <a:xfrm>
-            <a:off x="8686791" y="2909462"/>
+            <a:off x="8686793" y="2909464"/>
             <a:ext cx="1413165" cy="605637"/>
           </a:xfrm>
           <a:prstGeom prst="roundRect">
@@ -5594,7 +6037,7 @@
         </p:nvSpPr>
         <p:spPr>
           <a:xfrm>
-            <a:off x="10236519" y="2909462"/>
+            <a:off x="10236521" y="2909464"/>
             <a:ext cx="1413165" cy="605637"/>
           </a:xfrm>
           <a:prstGeom prst="roundRect">
@@ -5643,7 +6086,7 @@
         </p:nvSpPr>
         <p:spPr>
           <a:xfrm>
-            <a:off x="7137063" y="3645737"/>
+            <a:off x="7137065" y="3645739"/>
             <a:ext cx="1413165" cy="605637"/>
           </a:xfrm>
           <a:prstGeom prst="roundRect">
@@ -5692,7 +6135,7 @@
         </p:nvSpPr>
         <p:spPr>
           <a:xfrm>
-            <a:off x="8700654" y="3645737"/>
+            <a:off x="8700656" y="3645739"/>
             <a:ext cx="1413165" cy="605637"/>
           </a:xfrm>
           <a:prstGeom prst="roundRect">
@@ -5832,7 +6275,7 @@
         </p:nvSpPr>
         <p:spPr>
           <a:xfrm>
-            <a:off x="7482285" y="24460"/>
+            <a:off x="7482287" y="24462"/>
             <a:ext cx="2923611" cy="6383247"/>
           </a:xfrm>
           <a:prstGeom prst="roundRect">
@@ -5893,7 +6336,7 @@
         </p:nvGrpSpPr>
         <p:grpSpPr>
           <a:xfrm>
-            <a:off x="7606167" y="1369452"/>
+            <a:off x="7606169" y="1369452"/>
             <a:ext cx="2670771" cy="573336"/>
             <a:chOff x="7606167" y="1371887"/>
             <a:chExt cx="2670771" cy="573336"/>
@@ -6073,7 +6516,7 @@
         </p:nvGrpSpPr>
         <p:grpSpPr>
           <a:xfrm>
-            <a:off x="7606167" y="689401"/>
+            <a:off x="7606169" y="689401"/>
             <a:ext cx="2670771" cy="573336"/>
             <a:chOff x="7606167" y="689401"/>
             <a:chExt cx="2670771" cy="573336"/>
@@ -6975,7 +7418,7 @@
         </p:nvSpPr>
         <p:spPr>
           <a:xfrm>
-            <a:off x="3008747" y="24460"/>
+            <a:off x="3008749" y="24460"/>
             <a:ext cx="4397893" cy="3977168"/>
           </a:xfrm>
           <a:prstGeom prst="roundRect">
@@ -7036,7 +7479,7 @@
         </p:nvGrpSpPr>
         <p:grpSpPr>
           <a:xfrm>
-            <a:off x="7606167" y="2049503"/>
+            <a:off x="7606169" y="2049503"/>
             <a:ext cx="2670771" cy="573336"/>
             <a:chOff x="7606167" y="2052819"/>
             <a:chExt cx="2670771" cy="573336"/>
@@ -7517,7 +7960,7 @@
         </p:nvSpPr>
         <p:spPr>
           <a:xfrm>
-            <a:off x="7555884" y="4692007"/>
+            <a:off x="7555886" y="4692007"/>
             <a:ext cx="2788927" cy="1668954"/>
           </a:xfrm>
           <a:prstGeom prst="roundRect">
@@ -7774,7 +8217,7 @@
         </p:nvSpPr>
         <p:spPr>
           <a:xfrm>
-            <a:off x="6017164" y="2995763"/>
+            <a:off x="6017166" y="2995763"/>
             <a:ext cx="1309781" cy="944564"/>
           </a:xfrm>
           <a:prstGeom prst="roundRect">
@@ -9266,7 +9709,7 @@
         </p:nvSpPr>
         <p:spPr>
           <a:xfrm>
-            <a:off x="3008747" y="24460"/>
+            <a:off x="3008749" y="24462"/>
             <a:ext cx="4397893" cy="3743309"/>
           </a:xfrm>
           <a:prstGeom prst="roundRect">
@@ -9965,7 +10408,7 @@
         </p:nvSpPr>
         <p:spPr>
           <a:xfrm>
-            <a:off x="5966588" y="373861"/>
+            <a:off x="5966590" y="373863"/>
             <a:ext cx="1404781" cy="3316789"/>
           </a:xfrm>
           <a:prstGeom prst="roundRect">
@@ -10532,7 +10975,7 @@
         </p:nvSpPr>
         <p:spPr>
           <a:xfrm>
-            <a:off x="3055012" y="373861"/>
+            <a:off x="3055014" y="373863"/>
             <a:ext cx="1404781" cy="3316789"/>
           </a:xfrm>
           <a:prstGeom prst="roundRect">
@@ -10817,7 +11260,7 @@
         </p:nvSpPr>
         <p:spPr>
           <a:xfrm>
-            <a:off x="4510800" y="373861"/>
+            <a:off x="4510802" y="373863"/>
             <a:ext cx="1404781" cy="3316789"/>
           </a:xfrm>
           <a:prstGeom prst="roundRect">
@@ -11123,6 +11566,2675 @@
     <p:extLst>
       <p:ext uri="{BB962C8B-B14F-4D97-AF65-F5344CB8AC3E}">
         <p14:creationId xmlns:p14="http://schemas.microsoft.com/office/powerpoint/2010/main" val="3908372904"/>
+      </p:ext>
+    </p:extLst>
+  </p:cSld>
+  <p:clrMapOvr>
+    <a:masterClrMapping/>
+  </p:clrMapOvr>
+</p:sld>
+</file>
+
+<file path=ppt/slides/slide4.xml><?xml version="1.0" encoding="utf-8"?>
+<p:sld xmlns:a="http://schemas.openxmlformats.org/drawingml/2006/main" xmlns:r="http://schemas.openxmlformats.org/officeDocument/2006/relationships" xmlns:p="http://schemas.openxmlformats.org/presentationml/2006/main">
+  <p:cSld>
+    <p:spTree>
+      <p:nvGrpSpPr>
+        <p:cNvPr id="1" name=""/>
+        <p:cNvGrpSpPr/>
+        <p:nvPr/>
+      </p:nvGrpSpPr>
+      <p:grpSpPr>
+        <a:xfrm>
+          <a:off x="0" y="0"/>
+          <a:ext cx="0" cy="0"/>
+          <a:chOff x="0" y="0"/>
+          <a:chExt cx="0" cy="0"/>
+        </a:xfrm>
+      </p:grpSpPr>
+      <p:sp>
+        <p:nvSpPr>
+          <p:cNvPr id="4" name="Rounded Rectangle 3">
+            <a:extLst>
+              <a:ext uri="{FF2B5EF4-FFF2-40B4-BE49-F238E27FC236}">
+                <a16:creationId xmlns:a16="http://schemas.microsoft.com/office/drawing/2014/main" id="{7C48F387-C0FB-1744-A07B-DCFCA8ED2C34}"/>
+              </a:ext>
+            </a:extLst>
+          </p:cNvPr>
+          <p:cNvSpPr/>
+          <p:nvPr/>
+        </p:nvSpPr>
+        <p:spPr>
+          <a:xfrm>
+            <a:off x="30876" y="24461"/>
+            <a:ext cx="2884607" cy="3743310"/>
+          </a:xfrm>
+          <a:prstGeom prst="roundRect">
+            <a:avLst>
+              <a:gd name="adj" fmla="val 2100"/>
+            </a:avLst>
+          </a:prstGeom>
+          <a:solidFill>
+            <a:srgbClr val="A6A6A6"/>
+          </a:solidFill>
+        </p:spPr>
+        <p:style>
+          <a:lnRef idx="2">
+            <a:schemeClr val="accent1">
+              <a:shade val="50000"/>
+            </a:schemeClr>
+          </a:lnRef>
+          <a:fillRef idx="1">
+            <a:schemeClr val="accent1"/>
+          </a:fillRef>
+          <a:effectRef idx="0">
+            <a:schemeClr val="accent1"/>
+          </a:effectRef>
+          <a:fontRef idx="minor">
+            <a:schemeClr val="lt1"/>
+          </a:fontRef>
+        </p:style>
+        <p:txBody>
+          <a:bodyPr rtlCol="0" anchor="t"/>
+          <a:lstStyle/>
+          <a:p>
+            <a:pPr algn="ctr"/>
+            <a:r>
+              <a:rPr lang="nl-NL" sz="1600" dirty="0">
+                <a:solidFill>
+                  <a:sysClr val="windowText" lastClr="000000"/>
+                </a:solidFill>
+              </a:rPr>
+              <a:t>Registratie &amp; Gebruik</a:t>
+            </a:r>
+            <a:endParaRPr lang="en-NL" sz="1600" dirty="0">
+              <a:solidFill>
+                <a:sysClr val="windowText" lastClr="000000"/>
+              </a:solidFill>
+            </a:endParaRPr>
+          </a:p>
+        </p:txBody>
+      </p:sp>
+      <p:sp>
+        <p:nvSpPr>
+          <p:cNvPr id="38" name="Rounded Rectangle 37">
+            <a:extLst>
+              <a:ext uri="{FF2B5EF4-FFF2-40B4-BE49-F238E27FC236}">
+                <a16:creationId xmlns:a16="http://schemas.microsoft.com/office/drawing/2014/main" id="{64AB7C67-AF7C-4D40-A632-BC5D568267BD}"/>
+              </a:ext>
+            </a:extLst>
+          </p:cNvPr>
+          <p:cNvSpPr/>
+          <p:nvPr/>
+        </p:nvSpPr>
+        <p:spPr>
+          <a:xfrm>
+            <a:off x="30876" y="3885783"/>
+            <a:ext cx="7375764" cy="2961827"/>
+          </a:xfrm>
+          <a:prstGeom prst="roundRect">
+            <a:avLst>
+              <a:gd name="adj" fmla="val 2100"/>
+            </a:avLst>
+          </a:prstGeom>
+          <a:solidFill>
+            <a:srgbClr val="A6A6A6"/>
+          </a:solidFill>
+        </p:spPr>
+        <p:style>
+          <a:lnRef idx="2">
+            <a:schemeClr val="accent1">
+              <a:shade val="50000"/>
+            </a:schemeClr>
+          </a:lnRef>
+          <a:fillRef idx="1">
+            <a:schemeClr val="accent1"/>
+          </a:fillRef>
+          <a:effectRef idx="0">
+            <a:schemeClr val="accent1"/>
+          </a:effectRef>
+          <a:fontRef idx="minor">
+            <a:schemeClr val="lt1"/>
+          </a:fontRef>
+        </p:style>
+        <p:txBody>
+          <a:bodyPr rtlCol="0" anchor="t"/>
+          <a:lstStyle/>
+          <a:p>
+            <a:r>
+              <a:rPr lang="nl-NL" sz="1600" dirty="0">
+                <a:solidFill>
+                  <a:sysClr val="windowText" lastClr="000000"/>
+                </a:solidFill>
+              </a:rPr>
+              <a:t>Verkeersstroom beheer</a:t>
+            </a:r>
+            <a:endParaRPr lang="en-NL" sz="1600" dirty="0">
+              <a:solidFill>
+                <a:sysClr val="windowText" lastClr="000000"/>
+              </a:solidFill>
+            </a:endParaRPr>
+          </a:p>
+        </p:txBody>
+      </p:sp>
+      <p:sp>
+        <p:nvSpPr>
+          <p:cNvPr id="53" name="Rounded Rectangle 52">
+            <a:extLst>
+              <a:ext uri="{FF2B5EF4-FFF2-40B4-BE49-F238E27FC236}">
+                <a16:creationId xmlns:a16="http://schemas.microsoft.com/office/drawing/2014/main" id="{E852891F-751B-8F4E-8F16-061050A7EC0C}"/>
+              </a:ext>
+            </a:extLst>
+          </p:cNvPr>
+          <p:cNvSpPr/>
+          <p:nvPr/>
+        </p:nvSpPr>
+        <p:spPr>
+          <a:xfrm>
+            <a:off x="81828" y="1370481"/>
+            <a:ext cx="2777677" cy="2320170"/>
+          </a:xfrm>
+          <a:prstGeom prst="roundRect">
+            <a:avLst>
+              <a:gd name="adj" fmla="val 2100"/>
+            </a:avLst>
+          </a:prstGeom>
+          <a:solidFill>
+            <a:srgbClr val="D9D9D9"/>
+          </a:solidFill>
+        </p:spPr>
+        <p:style>
+          <a:lnRef idx="2">
+            <a:schemeClr val="accent1">
+              <a:shade val="50000"/>
+            </a:schemeClr>
+          </a:lnRef>
+          <a:fillRef idx="1">
+            <a:schemeClr val="accent1"/>
+          </a:fillRef>
+          <a:effectRef idx="0">
+            <a:schemeClr val="accent1"/>
+          </a:effectRef>
+          <a:fontRef idx="minor">
+            <a:schemeClr val="lt1"/>
+          </a:fontRef>
+        </p:style>
+        <p:txBody>
+          <a:bodyPr rtlCol="0" anchor="t"/>
+          <a:lstStyle/>
+          <a:p>
+            <a:pPr algn="ctr"/>
+            <a:r>
+              <a:rPr lang="en-NL" sz="1400" dirty="0">
+                <a:solidFill>
+                  <a:sysClr val="windowText" lastClr="000000"/>
+                </a:solidFill>
+              </a:rPr>
+              <a:t>Ontdekken</a:t>
+            </a:r>
+          </a:p>
+        </p:txBody>
+      </p:sp>
+      <p:sp>
+        <p:nvSpPr>
+          <p:cNvPr id="5" name="Rounded Rectangle 4">
+            <a:extLst>
+              <a:ext uri="{FF2B5EF4-FFF2-40B4-BE49-F238E27FC236}">
+                <a16:creationId xmlns:a16="http://schemas.microsoft.com/office/drawing/2014/main" id="{86E0E427-3389-D24A-9559-2F0767B28EF5}"/>
+              </a:ext>
+            </a:extLst>
+          </p:cNvPr>
+          <p:cNvSpPr/>
+          <p:nvPr/>
+        </p:nvSpPr>
+        <p:spPr>
+          <a:xfrm>
+            <a:off x="150929" y="1678272"/>
+            <a:ext cx="1299434" cy="573336"/>
+          </a:xfrm>
+          <a:prstGeom prst="roundRect">
+            <a:avLst/>
+          </a:prstGeom>
+          <a:solidFill>
+            <a:srgbClr val="3A4298"/>
+          </a:solidFill>
+        </p:spPr>
+        <p:style>
+          <a:lnRef idx="2">
+            <a:schemeClr val="accent1">
+              <a:shade val="50000"/>
+            </a:schemeClr>
+          </a:lnRef>
+          <a:fillRef idx="1">
+            <a:schemeClr val="accent1"/>
+          </a:fillRef>
+          <a:effectRef idx="0">
+            <a:schemeClr val="accent1"/>
+          </a:effectRef>
+          <a:fontRef idx="minor">
+            <a:schemeClr val="lt1"/>
+          </a:fontRef>
+        </p:style>
+        <p:txBody>
+          <a:bodyPr rtlCol="0" anchor="ctr"/>
+          <a:lstStyle/>
+          <a:p>
+            <a:pPr algn="ctr"/>
+            <a:r>
+              <a:rPr lang="en-NL" sz="1200" dirty="0">
+                <a:latin typeface="+mj-lt"/>
+              </a:rPr>
+              <a:t>API Discovery</a:t>
+            </a:r>
+          </a:p>
+        </p:txBody>
+      </p:sp>
+      <p:sp>
+        <p:nvSpPr>
+          <p:cNvPr id="6" name="Rounded Rectangle 5">
+            <a:extLst>
+              <a:ext uri="{FF2B5EF4-FFF2-40B4-BE49-F238E27FC236}">
+                <a16:creationId xmlns:a16="http://schemas.microsoft.com/office/drawing/2014/main" id="{F3DD20AC-5BB9-5041-A56A-B6C74D072F27}"/>
+              </a:ext>
+            </a:extLst>
+          </p:cNvPr>
+          <p:cNvSpPr/>
+          <p:nvPr/>
+        </p:nvSpPr>
+        <p:spPr>
+          <a:xfrm>
+            <a:off x="150929" y="2328162"/>
+            <a:ext cx="1299434" cy="573336"/>
+          </a:xfrm>
+          <a:prstGeom prst="roundRect">
+            <a:avLst/>
+          </a:prstGeom>
+          <a:solidFill>
+            <a:srgbClr val="3A4298"/>
+          </a:solidFill>
+        </p:spPr>
+        <p:style>
+          <a:lnRef idx="2">
+            <a:schemeClr val="accent1">
+              <a:shade val="50000"/>
+            </a:schemeClr>
+          </a:lnRef>
+          <a:fillRef idx="1">
+            <a:schemeClr val="accent1"/>
+          </a:fillRef>
+          <a:effectRef idx="0">
+            <a:schemeClr val="accent1"/>
+          </a:effectRef>
+          <a:fontRef idx="minor">
+            <a:schemeClr val="lt1"/>
+          </a:fontRef>
+        </p:style>
+        <p:txBody>
+          <a:bodyPr rtlCol="0" anchor="ctr"/>
+          <a:lstStyle/>
+          <a:p>
+            <a:pPr algn="ctr"/>
+            <a:r>
+              <a:rPr lang="nl-NL" sz="1200" dirty="0">
+                <a:latin typeface="+mj-lt"/>
+              </a:rPr>
+              <a:t>Proeftuin</a:t>
+            </a:r>
+            <a:endParaRPr lang="en-NL" sz="1200" dirty="0">
+              <a:latin typeface="+mj-lt"/>
+            </a:endParaRPr>
+          </a:p>
+        </p:txBody>
+      </p:sp>
+      <p:sp>
+        <p:nvSpPr>
+          <p:cNvPr id="7" name="Rounded Rectangle 6">
+            <a:extLst>
+              <a:ext uri="{FF2B5EF4-FFF2-40B4-BE49-F238E27FC236}">
+                <a16:creationId xmlns:a16="http://schemas.microsoft.com/office/drawing/2014/main" id="{EB123578-E907-044D-A528-9A262A27CD96}"/>
+              </a:ext>
+            </a:extLst>
+          </p:cNvPr>
+          <p:cNvSpPr/>
+          <p:nvPr/>
+        </p:nvSpPr>
+        <p:spPr>
+          <a:xfrm>
+            <a:off x="1508901" y="1678272"/>
+            <a:ext cx="1299434" cy="573336"/>
+          </a:xfrm>
+          <a:prstGeom prst="roundRect">
+            <a:avLst/>
+          </a:prstGeom>
+          <a:solidFill>
+            <a:srgbClr val="3A4298"/>
+          </a:solidFill>
+        </p:spPr>
+        <p:style>
+          <a:lnRef idx="2">
+            <a:schemeClr val="accent1">
+              <a:shade val="50000"/>
+            </a:schemeClr>
+          </a:lnRef>
+          <a:fillRef idx="1">
+            <a:schemeClr val="accent1"/>
+          </a:fillRef>
+          <a:effectRef idx="0">
+            <a:schemeClr val="accent1"/>
+          </a:effectRef>
+          <a:fontRef idx="minor">
+            <a:schemeClr val="lt1"/>
+          </a:fontRef>
+        </p:style>
+        <p:txBody>
+          <a:bodyPr rtlCol="0" anchor="ctr"/>
+          <a:lstStyle/>
+          <a:p>
+            <a:pPr algn="ctr"/>
+            <a:r>
+              <a:rPr lang="nl-NL" sz="1200" dirty="0">
+                <a:latin typeface="+mj-lt"/>
+              </a:rPr>
+              <a:t>Specificatie &amp; D</a:t>
+            </a:r>
+            <a:r>
+              <a:rPr lang="en-NL" sz="1200" dirty="0">
+                <a:latin typeface="+mj-lt"/>
+              </a:rPr>
+              <a:t>ocumentatie</a:t>
+            </a:r>
+          </a:p>
+        </p:txBody>
+      </p:sp>
+      <p:sp>
+        <p:nvSpPr>
+          <p:cNvPr id="59" name="Rounded Rectangle 58">
+            <a:extLst>
+              <a:ext uri="{FF2B5EF4-FFF2-40B4-BE49-F238E27FC236}">
+                <a16:creationId xmlns:a16="http://schemas.microsoft.com/office/drawing/2014/main" id="{A708E40B-C400-D749-86D0-3C375F29DA7D}"/>
+              </a:ext>
+            </a:extLst>
+          </p:cNvPr>
+          <p:cNvSpPr/>
+          <p:nvPr/>
+        </p:nvSpPr>
+        <p:spPr>
+          <a:xfrm>
+            <a:off x="1508901" y="2328162"/>
+            <a:ext cx="1299434" cy="573336"/>
+          </a:xfrm>
+          <a:prstGeom prst="roundRect">
+            <a:avLst/>
+          </a:prstGeom>
+          <a:solidFill>
+            <a:srgbClr val="3A4298"/>
+          </a:solidFill>
+        </p:spPr>
+        <p:style>
+          <a:lnRef idx="2">
+            <a:schemeClr val="accent1">
+              <a:shade val="50000"/>
+            </a:schemeClr>
+          </a:lnRef>
+          <a:fillRef idx="1">
+            <a:schemeClr val="accent1"/>
+          </a:fillRef>
+          <a:effectRef idx="0">
+            <a:schemeClr val="accent1"/>
+          </a:effectRef>
+          <a:fontRef idx="minor">
+            <a:schemeClr val="lt1"/>
+          </a:fontRef>
+        </p:style>
+        <p:txBody>
+          <a:bodyPr rtlCol="0" anchor="ctr"/>
+          <a:lstStyle/>
+          <a:p>
+            <a:pPr algn="ctr"/>
+            <a:r>
+              <a:rPr lang="nl-NL" sz="1200" dirty="0">
+                <a:latin typeface="+mj-lt"/>
+              </a:rPr>
+              <a:t>Code voorbeelden &amp; </a:t>
+            </a:r>
+            <a:r>
+              <a:rPr lang="en-NL" sz="1200" dirty="0">
+                <a:latin typeface="+mj-lt"/>
+              </a:rPr>
+              <a:t>SDK</a:t>
+            </a:r>
+          </a:p>
+        </p:txBody>
+      </p:sp>
+      <p:sp>
+        <p:nvSpPr>
+          <p:cNvPr id="54" name="Rounded Rectangle 53">
+            <a:extLst>
+              <a:ext uri="{FF2B5EF4-FFF2-40B4-BE49-F238E27FC236}">
+                <a16:creationId xmlns:a16="http://schemas.microsoft.com/office/drawing/2014/main" id="{F48D20D8-D6EB-2046-BD6E-53F25FB03E25}"/>
+              </a:ext>
+            </a:extLst>
+          </p:cNvPr>
+          <p:cNvSpPr/>
+          <p:nvPr/>
+        </p:nvSpPr>
+        <p:spPr>
+          <a:xfrm>
+            <a:off x="81828" y="373862"/>
+            <a:ext cx="2777677" cy="944564"/>
+          </a:xfrm>
+          <a:prstGeom prst="roundRect">
+            <a:avLst>
+              <a:gd name="adj" fmla="val 2100"/>
+            </a:avLst>
+          </a:prstGeom>
+          <a:solidFill>
+            <a:srgbClr val="D9D9D9"/>
+          </a:solidFill>
+        </p:spPr>
+        <p:style>
+          <a:lnRef idx="2">
+            <a:schemeClr val="accent1">
+              <a:shade val="50000"/>
+            </a:schemeClr>
+          </a:lnRef>
+          <a:fillRef idx="1">
+            <a:schemeClr val="accent1"/>
+          </a:fillRef>
+          <a:effectRef idx="0">
+            <a:schemeClr val="accent1"/>
+          </a:effectRef>
+          <a:fontRef idx="minor">
+            <a:schemeClr val="lt1"/>
+          </a:fontRef>
+        </p:style>
+        <p:txBody>
+          <a:bodyPr rtlCol="0" anchor="t"/>
+          <a:lstStyle/>
+          <a:p>
+            <a:pPr algn="ctr"/>
+            <a:r>
+              <a:rPr lang="en-NL" sz="1400" dirty="0">
+                <a:solidFill>
+                  <a:sysClr val="windowText" lastClr="000000"/>
+                </a:solidFill>
+              </a:rPr>
+              <a:t>Aanmelden &amp; Registratie</a:t>
+            </a:r>
+          </a:p>
+        </p:txBody>
+      </p:sp>
+      <p:sp>
+        <p:nvSpPr>
+          <p:cNvPr id="8" name="Rounded Rectangle 7">
+            <a:extLst>
+              <a:ext uri="{FF2B5EF4-FFF2-40B4-BE49-F238E27FC236}">
+                <a16:creationId xmlns:a16="http://schemas.microsoft.com/office/drawing/2014/main" id="{450200C0-5DD2-E343-AF7F-2AF4A72E5E60}"/>
+              </a:ext>
+            </a:extLst>
+          </p:cNvPr>
+          <p:cNvSpPr/>
+          <p:nvPr/>
+        </p:nvSpPr>
+        <p:spPr>
+          <a:xfrm>
+            <a:off x="1508901" y="689401"/>
+            <a:ext cx="1299434" cy="573336"/>
+          </a:xfrm>
+          <a:prstGeom prst="roundRect">
+            <a:avLst/>
+          </a:prstGeom>
+          <a:solidFill>
+            <a:srgbClr val="3A4298"/>
+          </a:solidFill>
+        </p:spPr>
+        <p:style>
+          <a:lnRef idx="2">
+            <a:schemeClr val="accent1">
+              <a:shade val="50000"/>
+            </a:schemeClr>
+          </a:lnRef>
+          <a:fillRef idx="1">
+            <a:schemeClr val="accent1"/>
+          </a:fillRef>
+          <a:effectRef idx="0">
+            <a:schemeClr val="accent1"/>
+          </a:effectRef>
+          <a:fontRef idx="minor">
+            <a:schemeClr val="lt1"/>
+          </a:fontRef>
+        </p:style>
+        <p:txBody>
+          <a:bodyPr rtlCol="0" anchor="ctr"/>
+          <a:lstStyle/>
+          <a:p>
+            <a:pPr algn="ctr"/>
+            <a:r>
+              <a:rPr lang="nl-NL" sz="1200" dirty="0">
+                <a:latin typeface="+mj-lt"/>
+              </a:rPr>
+              <a:t>Applicatie registratie</a:t>
+            </a:r>
+            <a:endParaRPr lang="en-NL" sz="1200" dirty="0">
+              <a:latin typeface="+mj-lt"/>
+            </a:endParaRPr>
+          </a:p>
+        </p:txBody>
+      </p:sp>
+      <p:sp>
+        <p:nvSpPr>
+          <p:cNvPr id="9" name="Rounded Rectangle 8">
+            <a:extLst>
+              <a:ext uri="{FF2B5EF4-FFF2-40B4-BE49-F238E27FC236}">
+                <a16:creationId xmlns:a16="http://schemas.microsoft.com/office/drawing/2014/main" id="{302CB914-8FCC-D94F-98D1-3FC184057CEF}"/>
+              </a:ext>
+            </a:extLst>
+          </p:cNvPr>
+          <p:cNvSpPr/>
+          <p:nvPr/>
+        </p:nvSpPr>
+        <p:spPr>
+          <a:xfrm>
+            <a:off x="150929" y="689401"/>
+            <a:ext cx="1299434" cy="573336"/>
+          </a:xfrm>
+          <a:prstGeom prst="roundRect">
+            <a:avLst/>
+          </a:prstGeom>
+          <a:solidFill>
+            <a:srgbClr val="3A4298"/>
+          </a:solidFill>
+        </p:spPr>
+        <p:style>
+          <a:lnRef idx="2">
+            <a:schemeClr val="accent1">
+              <a:shade val="50000"/>
+            </a:schemeClr>
+          </a:lnRef>
+          <a:fillRef idx="1">
+            <a:schemeClr val="accent1"/>
+          </a:fillRef>
+          <a:effectRef idx="0">
+            <a:schemeClr val="accent1"/>
+          </a:effectRef>
+          <a:fontRef idx="minor">
+            <a:schemeClr val="lt1"/>
+          </a:fontRef>
+        </p:style>
+        <p:txBody>
+          <a:bodyPr rtlCol="0" anchor="ctr"/>
+          <a:lstStyle/>
+          <a:p>
+            <a:pPr algn="ctr"/>
+            <a:r>
+              <a:rPr lang="en-NL" sz="1200" dirty="0">
+                <a:latin typeface="+mj-lt"/>
+              </a:rPr>
+              <a:t>Ontwikkelaar onboarding</a:t>
+            </a:r>
+          </a:p>
+        </p:txBody>
+      </p:sp>
+      <p:sp>
+        <p:nvSpPr>
+          <p:cNvPr id="61" name="Rounded Rectangle 60">
+            <a:extLst>
+              <a:ext uri="{FF2B5EF4-FFF2-40B4-BE49-F238E27FC236}">
+                <a16:creationId xmlns:a16="http://schemas.microsoft.com/office/drawing/2014/main" id="{1883E248-0E21-E74F-96F8-11BB739EA99C}"/>
+              </a:ext>
+            </a:extLst>
+          </p:cNvPr>
+          <p:cNvSpPr/>
+          <p:nvPr/>
+        </p:nvSpPr>
+        <p:spPr>
+          <a:xfrm>
+            <a:off x="3008749" y="24462"/>
+            <a:ext cx="4397893" cy="3743309"/>
+          </a:xfrm>
+          <a:prstGeom prst="roundRect">
+            <a:avLst>
+              <a:gd name="adj" fmla="val 2100"/>
+            </a:avLst>
+          </a:prstGeom>
+          <a:solidFill>
+            <a:srgbClr val="A6A6A6"/>
+          </a:solidFill>
+        </p:spPr>
+        <p:style>
+          <a:lnRef idx="2">
+            <a:schemeClr val="accent1">
+              <a:shade val="50000"/>
+            </a:schemeClr>
+          </a:lnRef>
+          <a:fillRef idx="1">
+            <a:schemeClr val="accent1"/>
+          </a:fillRef>
+          <a:effectRef idx="0">
+            <a:schemeClr val="accent1"/>
+          </a:effectRef>
+          <a:fontRef idx="minor">
+            <a:schemeClr val="lt1"/>
+          </a:fontRef>
+        </p:style>
+        <p:txBody>
+          <a:bodyPr rtlCol="0" anchor="t"/>
+          <a:lstStyle/>
+          <a:p>
+            <a:pPr algn="ctr"/>
+            <a:r>
+              <a:rPr lang="nl-NL" sz="1600" dirty="0">
+                <a:solidFill>
+                  <a:sysClr val="windowText" lastClr="000000"/>
+                </a:solidFill>
+              </a:rPr>
+              <a:t>Realisatie &amp; Beheer</a:t>
+            </a:r>
+            <a:endParaRPr lang="en-NL" sz="1600" dirty="0">
+              <a:solidFill>
+                <a:sysClr val="windowText" lastClr="000000"/>
+              </a:solidFill>
+            </a:endParaRPr>
+          </a:p>
+        </p:txBody>
+      </p:sp>
+      <p:sp>
+        <p:nvSpPr>
+          <p:cNvPr id="78" name="Rounded Rectangle 67">
+            <a:extLst>
+              <a:ext uri="{FF2B5EF4-FFF2-40B4-BE49-F238E27FC236}">
+                <a16:creationId xmlns:a16="http://schemas.microsoft.com/office/drawing/2014/main" id="{3C0DA008-AD6A-A34A-9972-251A08D5611E}"/>
+              </a:ext>
+            </a:extLst>
+          </p:cNvPr>
+          <p:cNvSpPr/>
+          <p:nvPr/>
+        </p:nvSpPr>
+        <p:spPr>
+          <a:xfrm>
+            <a:off x="5966590" y="373863"/>
+            <a:ext cx="1404781" cy="3316789"/>
+          </a:xfrm>
+          <a:prstGeom prst="roundRect">
+            <a:avLst>
+              <a:gd name="adj" fmla="val 2100"/>
+            </a:avLst>
+          </a:prstGeom>
+          <a:solidFill>
+            <a:srgbClr val="D9D9D9"/>
+          </a:solidFill>
+        </p:spPr>
+        <p:style>
+          <a:lnRef idx="2">
+            <a:schemeClr val="accent1">
+              <a:shade val="50000"/>
+            </a:schemeClr>
+          </a:lnRef>
+          <a:fillRef idx="1">
+            <a:schemeClr val="accent1"/>
+          </a:fillRef>
+          <a:effectRef idx="0">
+            <a:schemeClr val="accent1"/>
+          </a:effectRef>
+          <a:fontRef idx="minor">
+            <a:schemeClr val="lt1"/>
+          </a:fontRef>
+        </p:style>
+        <p:txBody>
+          <a:bodyPr rtlCol="0" anchor="t"/>
+          <a:lstStyle/>
+          <a:p>
+            <a:pPr algn="ctr"/>
+            <a:r>
+              <a:rPr lang="nl-NL" sz="1400" dirty="0">
+                <a:solidFill>
+                  <a:sysClr val="windowText" lastClr="000000"/>
+                </a:solidFill>
+              </a:rPr>
+              <a:t>Platform beheer</a:t>
+            </a:r>
+            <a:endParaRPr lang="en-NL" sz="1400" dirty="0">
+              <a:solidFill>
+                <a:sysClr val="windowText" lastClr="000000"/>
+              </a:solidFill>
+            </a:endParaRPr>
+          </a:p>
+        </p:txBody>
+      </p:sp>
+      <p:sp>
+        <p:nvSpPr>
+          <p:cNvPr id="64" name="Rounded Rectangle 38">
+            <a:extLst>
+              <a:ext uri="{FF2B5EF4-FFF2-40B4-BE49-F238E27FC236}">
+                <a16:creationId xmlns:a16="http://schemas.microsoft.com/office/drawing/2014/main" id="{E5C27DE2-CC0B-574B-A955-49A95A2F0DCB}"/>
+              </a:ext>
+            </a:extLst>
+          </p:cNvPr>
+          <p:cNvSpPr/>
+          <p:nvPr/>
+        </p:nvSpPr>
+        <p:spPr>
+          <a:xfrm>
+            <a:off x="6019261" y="2972174"/>
+            <a:ext cx="1299434" cy="573336"/>
+          </a:xfrm>
+          <a:prstGeom prst="roundRect">
+            <a:avLst/>
+          </a:prstGeom>
+          <a:solidFill>
+            <a:srgbClr val="3A4298"/>
+          </a:solidFill>
+        </p:spPr>
+        <p:style>
+          <a:lnRef idx="2">
+            <a:schemeClr val="accent1">
+              <a:shade val="50000"/>
+            </a:schemeClr>
+          </a:lnRef>
+          <a:fillRef idx="1">
+            <a:schemeClr val="accent1"/>
+          </a:fillRef>
+          <a:effectRef idx="0">
+            <a:schemeClr val="accent1"/>
+          </a:effectRef>
+          <a:fontRef idx="minor">
+            <a:schemeClr val="lt1"/>
+          </a:fontRef>
+        </p:style>
+        <p:txBody>
+          <a:bodyPr rtlCol="0" anchor="ctr"/>
+          <a:lstStyle/>
+          <a:p>
+            <a:pPr algn="ctr"/>
+            <a:r>
+              <a:rPr lang="nl-NL" sz="1200" dirty="0">
+                <a:latin typeface="+mj-lt"/>
+              </a:rPr>
+              <a:t>Sleutelbeheer</a:t>
+            </a:r>
+          </a:p>
+        </p:txBody>
+      </p:sp>
+      <p:sp>
+        <p:nvSpPr>
+          <p:cNvPr id="67" name="Rounded Rectangle 38">
+            <a:extLst>
+              <a:ext uri="{FF2B5EF4-FFF2-40B4-BE49-F238E27FC236}">
+                <a16:creationId xmlns:a16="http://schemas.microsoft.com/office/drawing/2014/main" id="{E5C27DE2-CC0B-574B-A955-49A95A2F0DCB}"/>
+              </a:ext>
+            </a:extLst>
+          </p:cNvPr>
+          <p:cNvSpPr/>
+          <p:nvPr/>
+        </p:nvSpPr>
+        <p:spPr>
+          <a:xfrm>
+            <a:off x="6019261" y="1661205"/>
+            <a:ext cx="1299434" cy="573336"/>
+          </a:xfrm>
+          <a:prstGeom prst="roundRect">
+            <a:avLst/>
+          </a:prstGeom>
+          <a:solidFill>
+            <a:srgbClr val="3A4298"/>
+          </a:solidFill>
+        </p:spPr>
+        <p:style>
+          <a:lnRef idx="2">
+            <a:schemeClr val="accent1">
+              <a:shade val="50000"/>
+            </a:schemeClr>
+          </a:lnRef>
+          <a:fillRef idx="1">
+            <a:schemeClr val="accent1"/>
+          </a:fillRef>
+          <a:effectRef idx="0">
+            <a:schemeClr val="accent1"/>
+          </a:effectRef>
+          <a:fontRef idx="minor">
+            <a:schemeClr val="lt1"/>
+          </a:fontRef>
+        </p:style>
+        <p:txBody>
+          <a:bodyPr rtlCol="0" anchor="ctr"/>
+          <a:lstStyle/>
+          <a:p>
+            <a:pPr algn="ctr"/>
+            <a:r>
+              <a:rPr lang="nl-NL" sz="1200" dirty="0">
+                <a:latin typeface="+mj-lt"/>
+              </a:rPr>
+              <a:t>Toegangsbeheer</a:t>
+            </a:r>
+            <a:endParaRPr lang="en-NL" sz="1200" dirty="0">
+              <a:latin typeface="+mj-lt"/>
+            </a:endParaRPr>
+          </a:p>
+        </p:txBody>
+      </p:sp>
+      <p:sp>
+        <p:nvSpPr>
+          <p:cNvPr id="70" name="Rounded Rectangle 38">
+            <a:extLst>
+              <a:ext uri="{FF2B5EF4-FFF2-40B4-BE49-F238E27FC236}">
+                <a16:creationId xmlns:a16="http://schemas.microsoft.com/office/drawing/2014/main" id="{E5C27DE2-CC0B-574B-A955-49A95A2F0DCB}"/>
+              </a:ext>
+            </a:extLst>
+          </p:cNvPr>
+          <p:cNvSpPr/>
+          <p:nvPr/>
+        </p:nvSpPr>
+        <p:spPr>
+          <a:xfrm>
+            <a:off x="6019261" y="2328162"/>
+            <a:ext cx="1299434" cy="573336"/>
+          </a:xfrm>
+          <a:prstGeom prst="roundRect">
+            <a:avLst/>
+          </a:prstGeom>
+          <a:solidFill>
+            <a:srgbClr val="3A4298"/>
+          </a:solidFill>
+        </p:spPr>
+        <p:style>
+          <a:lnRef idx="2">
+            <a:schemeClr val="accent1">
+              <a:shade val="50000"/>
+            </a:schemeClr>
+          </a:lnRef>
+          <a:fillRef idx="1">
+            <a:schemeClr val="accent1"/>
+          </a:fillRef>
+          <a:effectRef idx="0">
+            <a:schemeClr val="accent1"/>
+          </a:effectRef>
+          <a:fontRef idx="minor">
+            <a:schemeClr val="lt1"/>
+          </a:fontRef>
+        </p:style>
+        <p:txBody>
+          <a:bodyPr rtlCol="0" anchor="ctr"/>
+          <a:lstStyle/>
+          <a:p>
+            <a:pPr algn="ctr"/>
+            <a:r>
+              <a:rPr lang="nl-NL" sz="1200" dirty="0">
+                <a:latin typeface="+mj-lt"/>
+              </a:rPr>
+              <a:t>Gateway beheer</a:t>
+            </a:r>
+            <a:endParaRPr lang="en-NL" sz="1200" dirty="0">
+              <a:latin typeface="+mj-lt"/>
+            </a:endParaRPr>
+          </a:p>
+        </p:txBody>
+      </p:sp>
+      <p:sp>
+        <p:nvSpPr>
+          <p:cNvPr id="80" name="Rounded Rectangle 57">
+            <a:extLst>
+              <a:ext uri="{FF2B5EF4-FFF2-40B4-BE49-F238E27FC236}">
+                <a16:creationId xmlns:a16="http://schemas.microsoft.com/office/drawing/2014/main" id="{351800BB-D8F5-DD4E-B04D-EFCA44C52CF1}"/>
+              </a:ext>
+            </a:extLst>
+          </p:cNvPr>
+          <p:cNvSpPr/>
+          <p:nvPr/>
+        </p:nvSpPr>
+        <p:spPr>
+          <a:xfrm>
+            <a:off x="1518195" y="2978052"/>
+            <a:ext cx="1299434" cy="573336"/>
+          </a:xfrm>
+          <a:prstGeom prst="roundRect">
+            <a:avLst/>
+          </a:prstGeom>
+          <a:solidFill>
+            <a:srgbClr val="3A4298"/>
+          </a:solidFill>
+        </p:spPr>
+        <p:style>
+          <a:lnRef idx="2">
+            <a:schemeClr val="accent1">
+              <a:shade val="50000"/>
+            </a:schemeClr>
+          </a:lnRef>
+          <a:fillRef idx="1">
+            <a:schemeClr val="accent1"/>
+          </a:fillRef>
+          <a:effectRef idx="0">
+            <a:schemeClr val="accent1"/>
+          </a:effectRef>
+          <a:fontRef idx="minor">
+            <a:schemeClr val="lt1"/>
+          </a:fontRef>
+        </p:style>
+        <p:txBody>
+          <a:bodyPr rtlCol="0" anchor="ctr"/>
+          <a:lstStyle/>
+          <a:p>
+            <a:pPr algn="ctr"/>
+            <a:r>
+              <a:rPr lang="nl-NL" sz="1200" dirty="0">
+                <a:latin typeface="+mj-lt"/>
+              </a:rPr>
+              <a:t>Kennisdeling &amp; Ondersteuning</a:t>
+            </a:r>
+            <a:endParaRPr lang="en-NL" sz="1200" dirty="0">
+              <a:latin typeface="+mj-lt"/>
+            </a:endParaRPr>
+          </a:p>
+        </p:txBody>
+      </p:sp>
+      <p:sp>
+        <p:nvSpPr>
+          <p:cNvPr id="68" name="Rounded Rectangle 67">
+            <a:extLst>
+              <a:ext uri="{FF2B5EF4-FFF2-40B4-BE49-F238E27FC236}">
+                <a16:creationId xmlns:a16="http://schemas.microsoft.com/office/drawing/2014/main" id="{3C0DA008-AD6A-A34A-9972-251A08D5611E}"/>
+              </a:ext>
+            </a:extLst>
+          </p:cNvPr>
+          <p:cNvSpPr/>
+          <p:nvPr/>
+        </p:nvSpPr>
+        <p:spPr>
+          <a:xfrm>
+            <a:off x="3055014" y="373863"/>
+            <a:ext cx="1404781" cy="3316789"/>
+          </a:xfrm>
+          <a:prstGeom prst="roundRect">
+            <a:avLst>
+              <a:gd name="adj" fmla="val 2100"/>
+            </a:avLst>
+          </a:prstGeom>
+          <a:solidFill>
+            <a:srgbClr val="D9D9D9"/>
+          </a:solidFill>
+        </p:spPr>
+        <p:style>
+          <a:lnRef idx="2">
+            <a:schemeClr val="accent1">
+              <a:shade val="50000"/>
+            </a:schemeClr>
+          </a:lnRef>
+          <a:fillRef idx="1">
+            <a:schemeClr val="accent1"/>
+          </a:fillRef>
+          <a:effectRef idx="0">
+            <a:schemeClr val="accent1"/>
+          </a:effectRef>
+          <a:fontRef idx="minor">
+            <a:schemeClr val="lt1"/>
+          </a:fontRef>
+        </p:style>
+        <p:txBody>
+          <a:bodyPr rtlCol="0" anchor="t"/>
+          <a:lstStyle/>
+          <a:p>
+            <a:pPr algn="ctr"/>
+            <a:r>
+              <a:rPr lang="nl-NL" sz="1400" dirty="0">
+                <a:solidFill>
+                  <a:sysClr val="windowText" lastClr="000000"/>
+                </a:solidFill>
+              </a:rPr>
+              <a:t>Realisatie</a:t>
+            </a:r>
+            <a:endParaRPr lang="en-NL" sz="1400" dirty="0">
+              <a:solidFill>
+                <a:sysClr val="windowText" lastClr="000000"/>
+              </a:solidFill>
+            </a:endParaRPr>
+          </a:p>
+        </p:txBody>
+      </p:sp>
+      <p:sp>
+        <p:nvSpPr>
+          <p:cNvPr id="26" name="Rounded Rectangle 25">
+            <a:extLst>
+              <a:ext uri="{FF2B5EF4-FFF2-40B4-BE49-F238E27FC236}">
+                <a16:creationId xmlns:a16="http://schemas.microsoft.com/office/drawing/2014/main" id="{8F1B430A-C5D1-9346-B807-C0F1396288F3}"/>
+              </a:ext>
+            </a:extLst>
+          </p:cNvPr>
+          <p:cNvSpPr/>
+          <p:nvPr/>
+        </p:nvSpPr>
+        <p:spPr>
+          <a:xfrm>
+            <a:off x="3120513" y="1031758"/>
+            <a:ext cx="1299434" cy="573336"/>
+          </a:xfrm>
+          <a:prstGeom prst="roundRect">
+            <a:avLst/>
+          </a:prstGeom>
+          <a:solidFill>
+            <a:srgbClr val="3A4298"/>
+          </a:solidFill>
+        </p:spPr>
+        <p:style>
+          <a:lnRef idx="2">
+            <a:schemeClr val="accent1">
+              <a:shade val="50000"/>
+            </a:schemeClr>
+          </a:lnRef>
+          <a:fillRef idx="1">
+            <a:schemeClr val="accent1"/>
+          </a:fillRef>
+          <a:effectRef idx="0">
+            <a:schemeClr val="accent1"/>
+          </a:effectRef>
+          <a:fontRef idx="minor">
+            <a:schemeClr val="lt1"/>
+          </a:fontRef>
+        </p:style>
+        <p:txBody>
+          <a:bodyPr rtlCol="0" anchor="ctr"/>
+          <a:lstStyle/>
+          <a:p>
+            <a:pPr algn="ctr"/>
+            <a:r>
+              <a:rPr lang="en-NL" sz="1200" dirty="0">
+                <a:latin typeface="+mj-lt"/>
+              </a:rPr>
+              <a:t>Ontwerp</a:t>
+            </a:r>
+          </a:p>
+        </p:txBody>
+      </p:sp>
+      <p:sp>
+        <p:nvSpPr>
+          <p:cNvPr id="27" name="Rounded Rectangle 26">
+            <a:extLst>
+              <a:ext uri="{FF2B5EF4-FFF2-40B4-BE49-F238E27FC236}">
+                <a16:creationId xmlns:a16="http://schemas.microsoft.com/office/drawing/2014/main" id="{9AFD52BC-AB61-C443-8316-1ACBA1500810}"/>
+              </a:ext>
+            </a:extLst>
+          </p:cNvPr>
+          <p:cNvSpPr/>
+          <p:nvPr/>
+        </p:nvSpPr>
+        <p:spPr>
+          <a:xfrm>
+            <a:off x="3120513" y="1680523"/>
+            <a:ext cx="1299434" cy="573336"/>
+          </a:xfrm>
+          <a:prstGeom prst="roundRect">
+            <a:avLst/>
+          </a:prstGeom>
+          <a:solidFill>
+            <a:srgbClr val="3A4298"/>
+          </a:solidFill>
+        </p:spPr>
+        <p:style>
+          <a:lnRef idx="2">
+            <a:schemeClr val="accent1">
+              <a:shade val="50000"/>
+            </a:schemeClr>
+          </a:lnRef>
+          <a:fillRef idx="1">
+            <a:schemeClr val="accent1"/>
+          </a:fillRef>
+          <a:effectRef idx="0">
+            <a:schemeClr val="accent1"/>
+          </a:effectRef>
+          <a:fontRef idx="minor">
+            <a:schemeClr val="lt1"/>
+          </a:fontRef>
+        </p:style>
+        <p:txBody>
+          <a:bodyPr rtlCol="0" anchor="ctr"/>
+          <a:lstStyle/>
+          <a:p>
+            <a:pPr algn="ctr"/>
+            <a:r>
+              <a:rPr lang="nl-NL" sz="1200" dirty="0">
+                <a:latin typeface="+mj-lt"/>
+              </a:rPr>
+              <a:t>Ontwikkeling</a:t>
+            </a:r>
+            <a:endParaRPr lang="en-NL" sz="1200" dirty="0">
+              <a:latin typeface="+mj-lt"/>
+            </a:endParaRPr>
+          </a:p>
+        </p:txBody>
+      </p:sp>
+      <p:sp>
+        <p:nvSpPr>
+          <p:cNvPr id="39" name="Rounded Rectangle 38">
+            <a:extLst>
+              <a:ext uri="{FF2B5EF4-FFF2-40B4-BE49-F238E27FC236}">
+                <a16:creationId xmlns:a16="http://schemas.microsoft.com/office/drawing/2014/main" id="{E5C27DE2-CC0B-574B-A955-49A95A2F0DCB}"/>
+              </a:ext>
+            </a:extLst>
+          </p:cNvPr>
+          <p:cNvSpPr/>
+          <p:nvPr/>
+        </p:nvSpPr>
+        <p:spPr>
+          <a:xfrm>
+            <a:off x="3120513" y="2978052"/>
+            <a:ext cx="1299434" cy="573336"/>
+          </a:xfrm>
+          <a:prstGeom prst="roundRect">
+            <a:avLst/>
+          </a:prstGeom>
+          <a:solidFill>
+            <a:srgbClr val="3A4298"/>
+          </a:solidFill>
+        </p:spPr>
+        <p:style>
+          <a:lnRef idx="2">
+            <a:schemeClr val="accent1">
+              <a:shade val="50000"/>
+            </a:schemeClr>
+          </a:lnRef>
+          <a:fillRef idx="1">
+            <a:schemeClr val="accent1"/>
+          </a:fillRef>
+          <a:effectRef idx="0">
+            <a:schemeClr val="accent1"/>
+          </a:effectRef>
+          <a:fontRef idx="minor">
+            <a:schemeClr val="lt1"/>
+          </a:fontRef>
+        </p:style>
+        <p:txBody>
+          <a:bodyPr rtlCol="0" anchor="ctr"/>
+          <a:lstStyle/>
+          <a:p>
+            <a:pPr algn="ctr"/>
+            <a:r>
+              <a:rPr lang="en-NL" sz="1200" dirty="0">
+                <a:latin typeface="+mj-lt"/>
+              </a:rPr>
+              <a:t>Policy Definitie</a:t>
+            </a:r>
+          </a:p>
+        </p:txBody>
+      </p:sp>
+      <p:sp>
+        <p:nvSpPr>
+          <p:cNvPr id="43" name="Rounded Rectangle 26">
+            <a:extLst>
+              <a:ext uri="{FF2B5EF4-FFF2-40B4-BE49-F238E27FC236}">
+                <a16:creationId xmlns:a16="http://schemas.microsoft.com/office/drawing/2014/main" id="{9AFD52BC-AB61-C443-8316-1ACBA1500810}"/>
+              </a:ext>
+            </a:extLst>
+          </p:cNvPr>
+          <p:cNvSpPr/>
+          <p:nvPr/>
+        </p:nvSpPr>
+        <p:spPr>
+          <a:xfrm>
+            <a:off x="3120513" y="2329288"/>
+            <a:ext cx="1299434" cy="573336"/>
+          </a:xfrm>
+          <a:prstGeom prst="roundRect">
+            <a:avLst/>
+          </a:prstGeom>
+          <a:solidFill>
+            <a:srgbClr val="3A4298"/>
+          </a:solidFill>
+        </p:spPr>
+        <p:style>
+          <a:lnRef idx="2">
+            <a:schemeClr val="accent1">
+              <a:shade val="50000"/>
+            </a:schemeClr>
+          </a:lnRef>
+          <a:fillRef idx="1">
+            <a:schemeClr val="accent1"/>
+          </a:fillRef>
+          <a:effectRef idx="0">
+            <a:schemeClr val="accent1"/>
+          </a:effectRef>
+          <a:fontRef idx="minor">
+            <a:schemeClr val="lt1"/>
+          </a:fontRef>
+        </p:style>
+        <p:txBody>
+          <a:bodyPr rtlCol="0" anchor="ctr"/>
+          <a:lstStyle/>
+          <a:p>
+            <a:pPr algn="ctr"/>
+            <a:r>
+              <a:rPr lang="nl-NL" sz="1200" dirty="0">
+                <a:latin typeface="+mj-lt"/>
+              </a:rPr>
+              <a:t>Test</a:t>
+            </a:r>
+            <a:endParaRPr lang="en-NL" sz="1200" dirty="0">
+              <a:latin typeface="+mj-lt"/>
+            </a:endParaRPr>
+          </a:p>
+        </p:txBody>
+      </p:sp>
+      <p:sp>
+        <p:nvSpPr>
+          <p:cNvPr id="79" name="Rounded Rectangle 67">
+            <a:extLst>
+              <a:ext uri="{FF2B5EF4-FFF2-40B4-BE49-F238E27FC236}">
+                <a16:creationId xmlns:a16="http://schemas.microsoft.com/office/drawing/2014/main" id="{3C0DA008-AD6A-A34A-9972-251A08D5611E}"/>
+              </a:ext>
+            </a:extLst>
+          </p:cNvPr>
+          <p:cNvSpPr/>
+          <p:nvPr/>
+        </p:nvSpPr>
+        <p:spPr>
+          <a:xfrm>
+            <a:off x="4510802" y="1738322"/>
+            <a:ext cx="1404781" cy="1952329"/>
+          </a:xfrm>
+          <a:prstGeom prst="roundRect">
+            <a:avLst>
+              <a:gd name="adj" fmla="val 2100"/>
+            </a:avLst>
+          </a:prstGeom>
+          <a:solidFill>
+            <a:srgbClr val="D9D9D9"/>
+          </a:solidFill>
+        </p:spPr>
+        <p:style>
+          <a:lnRef idx="2">
+            <a:schemeClr val="accent1">
+              <a:shade val="50000"/>
+            </a:schemeClr>
+          </a:lnRef>
+          <a:fillRef idx="1">
+            <a:schemeClr val="accent1"/>
+          </a:fillRef>
+          <a:effectRef idx="0">
+            <a:schemeClr val="accent1"/>
+          </a:effectRef>
+          <a:fontRef idx="minor">
+            <a:schemeClr val="lt1"/>
+          </a:fontRef>
+        </p:style>
+        <p:txBody>
+          <a:bodyPr rtlCol="0" anchor="t"/>
+          <a:lstStyle/>
+          <a:p>
+            <a:pPr algn="ctr"/>
+            <a:r>
+              <a:rPr lang="nl-NL" sz="1400" dirty="0">
+                <a:solidFill>
+                  <a:sysClr val="windowText" lastClr="000000"/>
+                </a:solidFill>
+              </a:rPr>
+              <a:t>API </a:t>
+            </a:r>
+            <a:r>
+              <a:rPr lang="nl-NL" sz="1400" dirty="0" err="1">
+                <a:solidFill>
+                  <a:sysClr val="windowText" lastClr="000000"/>
+                </a:solidFill>
+              </a:rPr>
+              <a:t>Lifecycle</a:t>
+            </a:r>
+            <a:r>
+              <a:rPr lang="nl-NL" sz="1400" dirty="0">
+                <a:solidFill>
+                  <a:sysClr val="windowText" lastClr="000000"/>
+                </a:solidFill>
+              </a:rPr>
+              <a:t> beheer</a:t>
+            </a:r>
+            <a:endParaRPr lang="en-NL" sz="1400" dirty="0">
+              <a:solidFill>
+                <a:sysClr val="windowText" lastClr="000000"/>
+              </a:solidFill>
+            </a:endParaRPr>
+          </a:p>
+        </p:txBody>
+      </p:sp>
+      <p:sp>
+        <p:nvSpPr>
+          <p:cNvPr id="12" name="Rounded Rectangle 11">
+            <a:extLst>
+              <a:ext uri="{FF2B5EF4-FFF2-40B4-BE49-F238E27FC236}">
+                <a16:creationId xmlns:a16="http://schemas.microsoft.com/office/drawing/2014/main" id="{25BFF694-07BA-614A-BE59-5071E564B2A3}"/>
+              </a:ext>
+            </a:extLst>
+          </p:cNvPr>
+          <p:cNvSpPr/>
+          <p:nvPr/>
+        </p:nvSpPr>
+        <p:spPr>
+          <a:xfrm>
+            <a:off x="4563473" y="2978052"/>
+            <a:ext cx="1299434" cy="573336"/>
+          </a:xfrm>
+          <a:prstGeom prst="roundRect">
+            <a:avLst/>
+          </a:prstGeom>
+          <a:solidFill>
+            <a:srgbClr val="3A4298"/>
+          </a:solidFill>
+        </p:spPr>
+        <p:style>
+          <a:lnRef idx="2">
+            <a:schemeClr val="accent1">
+              <a:shade val="50000"/>
+            </a:schemeClr>
+          </a:lnRef>
+          <a:fillRef idx="1">
+            <a:schemeClr val="accent1"/>
+          </a:fillRef>
+          <a:effectRef idx="0">
+            <a:schemeClr val="accent1"/>
+          </a:effectRef>
+          <a:fontRef idx="minor">
+            <a:schemeClr val="lt1"/>
+          </a:fontRef>
+        </p:style>
+        <p:txBody>
+          <a:bodyPr rtlCol="0" anchor="ctr"/>
+          <a:lstStyle/>
+          <a:p>
+            <a:pPr algn="ctr"/>
+            <a:r>
+              <a:rPr lang="nl-NL" sz="1200" dirty="0" err="1">
+                <a:latin typeface="+mj-lt"/>
+              </a:rPr>
+              <a:t>Versionering</a:t>
+            </a:r>
+            <a:endParaRPr lang="en-NL" sz="1200" dirty="0">
+              <a:latin typeface="+mj-lt"/>
+            </a:endParaRPr>
+          </a:p>
+        </p:txBody>
+      </p:sp>
+      <p:sp>
+        <p:nvSpPr>
+          <p:cNvPr id="62" name="Rounded Rectangle 61">
+            <a:extLst>
+              <a:ext uri="{FF2B5EF4-FFF2-40B4-BE49-F238E27FC236}">
+                <a16:creationId xmlns:a16="http://schemas.microsoft.com/office/drawing/2014/main" id="{4131E2F9-4AFD-C64A-ACB3-397DDBCDF606}"/>
+              </a:ext>
+            </a:extLst>
+          </p:cNvPr>
+          <p:cNvSpPr/>
+          <p:nvPr/>
+        </p:nvSpPr>
+        <p:spPr>
+          <a:xfrm>
+            <a:off x="4563473" y="2319168"/>
+            <a:ext cx="1299434" cy="573336"/>
+          </a:xfrm>
+          <a:prstGeom prst="roundRect">
+            <a:avLst/>
+          </a:prstGeom>
+          <a:solidFill>
+            <a:srgbClr val="3A4298"/>
+          </a:solidFill>
+        </p:spPr>
+        <p:style>
+          <a:lnRef idx="2">
+            <a:schemeClr val="accent1">
+              <a:shade val="50000"/>
+            </a:schemeClr>
+          </a:lnRef>
+          <a:fillRef idx="1">
+            <a:schemeClr val="accent1"/>
+          </a:fillRef>
+          <a:effectRef idx="0">
+            <a:schemeClr val="accent1"/>
+          </a:effectRef>
+          <a:fontRef idx="minor">
+            <a:schemeClr val="lt1"/>
+          </a:fontRef>
+        </p:style>
+        <p:txBody>
+          <a:bodyPr rtlCol="0" anchor="ctr"/>
+          <a:lstStyle/>
+          <a:p>
+            <a:pPr algn="ctr"/>
+            <a:r>
+              <a:rPr lang="nl-NL" sz="1200" dirty="0">
+                <a:latin typeface="+mj-lt"/>
+              </a:rPr>
+              <a:t>API </a:t>
+            </a:r>
+            <a:r>
+              <a:rPr lang="nl-NL" sz="1200" dirty="0" err="1">
+                <a:latin typeface="+mj-lt"/>
+              </a:rPr>
+              <a:t>Lifecycle</a:t>
+            </a:r>
+            <a:r>
+              <a:rPr lang="nl-NL" sz="1200" dirty="0">
+                <a:latin typeface="+mj-lt"/>
+              </a:rPr>
+              <a:t> beheer</a:t>
+            </a:r>
+            <a:endParaRPr lang="en-NL" sz="1200" dirty="0">
+              <a:latin typeface="+mj-lt"/>
+            </a:endParaRPr>
+          </a:p>
+        </p:txBody>
+      </p:sp>
+      <p:sp>
+        <p:nvSpPr>
+          <p:cNvPr id="46" name="Rounded Rectangle 45">
+            <a:extLst>
+              <a:ext uri="{FF2B5EF4-FFF2-40B4-BE49-F238E27FC236}">
+                <a16:creationId xmlns:a16="http://schemas.microsoft.com/office/drawing/2014/main" id="{D4DBBAC5-FF20-DE49-94BD-345D6456E9CC}"/>
+              </a:ext>
+            </a:extLst>
+          </p:cNvPr>
+          <p:cNvSpPr/>
+          <p:nvPr/>
+        </p:nvSpPr>
+        <p:spPr>
+          <a:xfrm>
+            <a:off x="81828" y="4228508"/>
+            <a:ext cx="2777677" cy="2518457"/>
+          </a:xfrm>
+          <a:prstGeom prst="roundRect">
+            <a:avLst>
+              <a:gd name="adj" fmla="val 2100"/>
+            </a:avLst>
+          </a:prstGeom>
+          <a:solidFill>
+            <a:srgbClr val="D9D9D9"/>
+          </a:solidFill>
+        </p:spPr>
+        <p:style>
+          <a:lnRef idx="2">
+            <a:schemeClr val="accent1">
+              <a:shade val="50000"/>
+            </a:schemeClr>
+          </a:lnRef>
+          <a:fillRef idx="1">
+            <a:schemeClr val="accent1"/>
+          </a:fillRef>
+          <a:effectRef idx="0">
+            <a:schemeClr val="accent1"/>
+          </a:effectRef>
+          <a:fontRef idx="minor">
+            <a:schemeClr val="lt1"/>
+          </a:fontRef>
+        </p:style>
+        <p:txBody>
+          <a:bodyPr rtlCol="0" anchor="t"/>
+          <a:lstStyle/>
+          <a:p>
+            <a:pPr algn="ctr"/>
+            <a:r>
+              <a:rPr lang="en-NL" sz="1400" dirty="0">
+                <a:solidFill>
+                  <a:sysClr val="windowText" lastClr="000000"/>
+                </a:solidFill>
+              </a:rPr>
+              <a:t>Mediatie &amp; Orkestratie</a:t>
+            </a:r>
+          </a:p>
+        </p:txBody>
+      </p:sp>
+      <p:sp>
+        <p:nvSpPr>
+          <p:cNvPr id="47" name="Rounded Rectangle 46">
+            <a:extLst>
+              <a:ext uri="{FF2B5EF4-FFF2-40B4-BE49-F238E27FC236}">
+                <a16:creationId xmlns:a16="http://schemas.microsoft.com/office/drawing/2014/main" id="{86C16288-B110-BD46-9733-EF75F675AF35}"/>
+              </a:ext>
+            </a:extLst>
+          </p:cNvPr>
+          <p:cNvSpPr/>
+          <p:nvPr/>
+        </p:nvSpPr>
+        <p:spPr>
+          <a:xfrm>
+            <a:off x="2933040" y="4228509"/>
+            <a:ext cx="1486909" cy="2518456"/>
+          </a:xfrm>
+          <a:prstGeom prst="roundRect">
+            <a:avLst>
+              <a:gd name="adj" fmla="val 2100"/>
+            </a:avLst>
+          </a:prstGeom>
+          <a:solidFill>
+            <a:srgbClr val="D9D9D9"/>
+          </a:solidFill>
+        </p:spPr>
+        <p:style>
+          <a:lnRef idx="2">
+            <a:schemeClr val="accent1">
+              <a:shade val="50000"/>
+            </a:schemeClr>
+          </a:lnRef>
+          <a:fillRef idx="1">
+            <a:schemeClr val="accent1"/>
+          </a:fillRef>
+          <a:effectRef idx="0">
+            <a:schemeClr val="accent1"/>
+          </a:effectRef>
+          <a:fontRef idx="minor">
+            <a:schemeClr val="lt1"/>
+          </a:fontRef>
+        </p:style>
+        <p:txBody>
+          <a:bodyPr rtlCol="0" anchor="t"/>
+          <a:lstStyle/>
+          <a:p>
+            <a:pPr algn="ctr"/>
+            <a:r>
+              <a:rPr lang="en-NL" sz="1400" dirty="0">
+                <a:solidFill>
+                  <a:sysClr val="windowText" lastClr="000000"/>
+                </a:solidFill>
+              </a:rPr>
+              <a:t>Telemetrie &amp; Inzicht</a:t>
+            </a:r>
+          </a:p>
+        </p:txBody>
+      </p:sp>
+      <p:sp>
+        <p:nvSpPr>
+          <p:cNvPr id="42" name="Rounded Rectangle 41">
+            <a:extLst>
+              <a:ext uri="{FF2B5EF4-FFF2-40B4-BE49-F238E27FC236}">
+                <a16:creationId xmlns:a16="http://schemas.microsoft.com/office/drawing/2014/main" id="{A6AC3A0E-53C4-194D-B2E0-0325DE0D10B3}"/>
+              </a:ext>
+            </a:extLst>
+          </p:cNvPr>
+          <p:cNvSpPr/>
+          <p:nvPr/>
+        </p:nvSpPr>
+        <p:spPr>
+          <a:xfrm>
+            <a:off x="3026775" y="5458702"/>
+            <a:ext cx="1299434" cy="573336"/>
+          </a:xfrm>
+          <a:prstGeom prst="roundRect">
+            <a:avLst/>
+          </a:prstGeom>
+          <a:solidFill>
+            <a:srgbClr val="3A4298"/>
+          </a:solidFill>
+        </p:spPr>
+        <p:style>
+          <a:lnRef idx="2">
+            <a:schemeClr val="accent1">
+              <a:shade val="50000"/>
+            </a:schemeClr>
+          </a:lnRef>
+          <a:fillRef idx="1">
+            <a:schemeClr val="accent1"/>
+          </a:fillRef>
+          <a:effectRef idx="0">
+            <a:schemeClr val="accent1"/>
+          </a:effectRef>
+          <a:fontRef idx="minor">
+            <a:schemeClr val="lt1"/>
+          </a:fontRef>
+        </p:style>
+        <p:txBody>
+          <a:bodyPr rtlCol="0" anchor="ctr"/>
+          <a:lstStyle/>
+          <a:p>
+            <a:pPr algn="ctr"/>
+            <a:r>
+              <a:rPr lang="en-NL" sz="1200" dirty="0">
+                <a:latin typeface="+mj-lt"/>
+              </a:rPr>
+              <a:t>Monitoring &amp; Alerting</a:t>
+            </a:r>
+          </a:p>
+        </p:txBody>
+      </p:sp>
+      <p:sp>
+        <p:nvSpPr>
+          <p:cNvPr id="35" name="Rounded Rectangle 34">
+            <a:extLst>
+              <a:ext uri="{FF2B5EF4-FFF2-40B4-BE49-F238E27FC236}">
+                <a16:creationId xmlns:a16="http://schemas.microsoft.com/office/drawing/2014/main" id="{23700455-5CF1-084B-93E4-CE7E87E87DD4}"/>
+              </a:ext>
+            </a:extLst>
+          </p:cNvPr>
+          <p:cNvSpPr/>
+          <p:nvPr/>
+        </p:nvSpPr>
+        <p:spPr>
+          <a:xfrm>
+            <a:off x="3026775" y="4800191"/>
+            <a:ext cx="1299434" cy="573336"/>
+          </a:xfrm>
+          <a:prstGeom prst="roundRect">
+            <a:avLst/>
+          </a:prstGeom>
+          <a:solidFill>
+            <a:srgbClr val="3A4298"/>
+          </a:solidFill>
+        </p:spPr>
+        <p:style>
+          <a:lnRef idx="2">
+            <a:schemeClr val="accent1">
+              <a:shade val="50000"/>
+            </a:schemeClr>
+          </a:lnRef>
+          <a:fillRef idx="1">
+            <a:schemeClr val="accent1"/>
+          </a:fillRef>
+          <a:effectRef idx="0">
+            <a:schemeClr val="accent1"/>
+          </a:effectRef>
+          <a:fontRef idx="minor">
+            <a:schemeClr val="lt1"/>
+          </a:fontRef>
+        </p:style>
+        <p:txBody>
+          <a:bodyPr rtlCol="0" anchor="ctr"/>
+          <a:lstStyle/>
+          <a:p>
+            <a:pPr algn="ctr"/>
+            <a:r>
+              <a:rPr lang="en-NL" sz="1200" dirty="0">
+                <a:latin typeface="+mj-lt"/>
+              </a:rPr>
+              <a:t>Logging </a:t>
+            </a:r>
+            <a:r>
+              <a:rPr lang="nl-NL" sz="1200" dirty="0">
+                <a:latin typeface="+mj-lt"/>
+              </a:rPr>
+              <a:t>&amp;</a:t>
+            </a:r>
+            <a:r>
+              <a:rPr lang="en-NL" sz="1200" dirty="0">
+                <a:latin typeface="+mj-lt"/>
+              </a:rPr>
+              <a:t> Audit Trail</a:t>
+            </a:r>
+          </a:p>
+        </p:txBody>
+      </p:sp>
+      <p:sp>
+        <p:nvSpPr>
+          <p:cNvPr id="77" name="Rounded Rectangle 34">
+            <a:extLst>
+              <a:ext uri="{FF2B5EF4-FFF2-40B4-BE49-F238E27FC236}">
+                <a16:creationId xmlns:a16="http://schemas.microsoft.com/office/drawing/2014/main" id="{23700455-5CF1-084B-93E4-CE7E87E87DD4}"/>
+              </a:ext>
+            </a:extLst>
+          </p:cNvPr>
+          <p:cNvSpPr/>
+          <p:nvPr/>
+        </p:nvSpPr>
+        <p:spPr>
+          <a:xfrm>
+            <a:off x="3026775" y="6104858"/>
+            <a:ext cx="1299434" cy="573336"/>
+          </a:xfrm>
+          <a:prstGeom prst="roundRect">
+            <a:avLst/>
+          </a:prstGeom>
+          <a:solidFill>
+            <a:srgbClr val="3A4298"/>
+          </a:solidFill>
+        </p:spPr>
+        <p:style>
+          <a:lnRef idx="2">
+            <a:schemeClr val="accent1">
+              <a:shade val="50000"/>
+            </a:schemeClr>
+          </a:lnRef>
+          <a:fillRef idx="1">
+            <a:schemeClr val="accent1"/>
+          </a:fillRef>
+          <a:effectRef idx="0">
+            <a:schemeClr val="accent1"/>
+          </a:effectRef>
+          <a:fontRef idx="minor">
+            <a:schemeClr val="lt1"/>
+          </a:fontRef>
+        </p:style>
+        <p:txBody>
+          <a:bodyPr rtlCol="0" anchor="ctr"/>
+          <a:lstStyle/>
+          <a:p>
+            <a:pPr algn="ctr"/>
+            <a:r>
+              <a:rPr lang="nl-NL" sz="1200" dirty="0">
+                <a:latin typeface="+mj-lt"/>
+              </a:rPr>
+              <a:t>Analytics &amp; Dashboarding</a:t>
+            </a:r>
+            <a:endParaRPr lang="en-NL" sz="1200" dirty="0">
+              <a:latin typeface="+mj-lt"/>
+            </a:endParaRPr>
+          </a:p>
+        </p:txBody>
+      </p:sp>
+      <p:sp>
+        <p:nvSpPr>
+          <p:cNvPr id="44" name="Rounded Rectangle 43">
+            <a:extLst>
+              <a:ext uri="{FF2B5EF4-FFF2-40B4-BE49-F238E27FC236}">
+                <a16:creationId xmlns:a16="http://schemas.microsoft.com/office/drawing/2014/main" id="{B62883E1-8D45-F147-988F-B25B6ADC8673}"/>
+              </a:ext>
+            </a:extLst>
+          </p:cNvPr>
+          <p:cNvSpPr/>
+          <p:nvPr/>
+        </p:nvSpPr>
+        <p:spPr>
+          <a:xfrm>
+            <a:off x="1518195" y="4800191"/>
+            <a:ext cx="1299434" cy="573336"/>
+          </a:xfrm>
+          <a:prstGeom prst="roundRect">
+            <a:avLst/>
+          </a:prstGeom>
+          <a:solidFill>
+            <a:srgbClr val="3A4298"/>
+          </a:solidFill>
+        </p:spPr>
+        <p:style>
+          <a:lnRef idx="2">
+            <a:schemeClr val="accent1">
+              <a:shade val="50000"/>
+            </a:schemeClr>
+          </a:lnRef>
+          <a:fillRef idx="1">
+            <a:schemeClr val="accent1"/>
+          </a:fillRef>
+          <a:effectRef idx="0">
+            <a:schemeClr val="accent1"/>
+          </a:effectRef>
+          <a:fontRef idx="minor">
+            <a:schemeClr val="lt1"/>
+          </a:fontRef>
+        </p:style>
+        <p:txBody>
+          <a:bodyPr rtlCol="0" anchor="ctr"/>
+          <a:lstStyle/>
+          <a:p>
+            <a:pPr algn="ctr"/>
+            <a:r>
+              <a:rPr lang="en-NL" sz="1200" dirty="0">
+                <a:latin typeface="+mj-lt"/>
+              </a:rPr>
+              <a:t>Fout</a:t>
+            </a:r>
+          </a:p>
+          <a:p>
+            <a:pPr algn="ctr"/>
+            <a:r>
+              <a:rPr lang="en-NL" sz="1200" dirty="0">
+                <a:latin typeface="+mj-lt"/>
+              </a:rPr>
+              <a:t>afhandeling</a:t>
+            </a:r>
+          </a:p>
+        </p:txBody>
+      </p:sp>
+      <p:sp>
+        <p:nvSpPr>
+          <p:cNvPr id="52" name="Rounded Rectangle 51">
+            <a:extLst>
+              <a:ext uri="{FF2B5EF4-FFF2-40B4-BE49-F238E27FC236}">
+                <a16:creationId xmlns:a16="http://schemas.microsoft.com/office/drawing/2014/main" id="{31F77BE2-76C8-274C-8AB1-E4A9F2D9242E}"/>
+              </a:ext>
+            </a:extLst>
+          </p:cNvPr>
+          <p:cNvSpPr/>
+          <p:nvPr/>
+        </p:nvSpPr>
+        <p:spPr>
+          <a:xfrm>
+            <a:off x="149672" y="5458702"/>
+            <a:ext cx="1299434" cy="573336"/>
+          </a:xfrm>
+          <a:prstGeom prst="roundRect">
+            <a:avLst/>
+          </a:prstGeom>
+          <a:solidFill>
+            <a:srgbClr val="3A4298"/>
+          </a:solidFill>
+        </p:spPr>
+        <p:style>
+          <a:lnRef idx="2">
+            <a:schemeClr val="accent1">
+              <a:shade val="50000"/>
+            </a:schemeClr>
+          </a:lnRef>
+          <a:fillRef idx="1">
+            <a:schemeClr val="accent1"/>
+          </a:fillRef>
+          <a:effectRef idx="0">
+            <a:schemeClr val="accent1"/>
+          </a:effectRef>
+          <a:fontRef idx="minor">
+            <a:schemeClr val="lt1"/>
+          </a:fontRef>
+        </p:style>
+        <p:txBody>
+          <a:bodyPr rtlCol="0" anchor="ctr"/>
+          <a:lstStyle/>
+          <a:p>
+            <a:pPr algn="ctr"/>
+            <a:r>
+              <a:rPr lang="en-NL" sz="1200" dirty="0">
+                <a:latin typeface="+mj-lt"/>
+              </a:rPr>
+              <a:t>Rout</a:t>
+            </a:r>
+            <a:r>
+              <a:rPr lang="nl-NL" sz="1200" dirty="0">
+                <a:latin typeface="+mj-lt"/>
+              </a:rPr>
+              <a:t>er</a:t>
+            </a:r>
+            <a:r>
+              <a:rPr lang="en-NL" sz="1200" dirty="0">
+                <a:latin typeface="+mj-lt"/>
+              </a:rPr>
+              <a:t>ing</a:t>
+            </a:r>
+          </a:p>
+        </p:txBody>
+      </p:sp>
+      <p:sp>
+        <p:nvSpPr>
+          <p:cNvPr id="34" name="Rounded Rectangle 33">
+            <a:extLst>
+              <a:ext uri="{FF2B5EF4-FFF2-40B4-BE49-F238E27FC236}">
+                <a16:creationId xmlns:a16="http://schemas.microsoft.com/office/drawing/2014/main" id="{20D509D5-40A9-B142-BCA3-8243E162AFD8}"/>
+              </a:ext>
+            </a:extLst>
+          </p:cNvPr>
+          <p:cNvSpPr/>
+          <p:nvPr/>
+        </p:nvSpPr>
+        <p:spPr>
+          <a:xfrm>
+            <a:off x="1518195" y="6104858"/>
+            <a:ext cx="1299434" cy="573336"/>
+          </a:xfrm>
+          <a:prstGeom prst="roundRect">
+            <a:avLst/>
+          </a:prstGeom>
+          <a:solidFill>
+            <a:srgbClr val="3A4298"/>
+          </a:solidFill>
+        </p:spPr>
+        <p:style>
+          <a:lnRef idx="2">
+            <a:schemeClr val="accent1">
+              <a:shade val="50000"/>
+            </a:schemeClr>
+          </a:lnRef>
+          <a:fillRef idx="1">
+            <a:schemeClr val="accent1"/>
+          </a:fillRef>
+          <a:effectRef idx="0">
+            <a:schemeClr val="accent1"/>
+          </a:effectRef>
+          <a:fontRef idx="minor">
+            <a:schemeClr val="lt1"/>
+          </a:fontRef>
+        </p:style>
+        <p:txBody>
+          <a:bodyPr rtlCol="0" anchor="ctr"/>
+          <a:lstStyle/>
+          <a:p>
+            <a:pPr algn="ctr"/>
+            <a:r>
+              <a:rPr lang="en-NL" sz="1200" dirty="0">
+                <a:latin typeface="+mj-lt"/>
+              </a:rPr>
+              <a:t>Protocol conversies</a:t>
+            </a:r>
+          </a:p>
+        </p:txBody>
+      </p:sp>
+      <p:sp>
+        <p:nvSpPr>
+          <p:cNvPr id="29" name="Rounded Rectangle 28">
+            <a:extLst>
+              <a:ext uri="{FF2B5EF4-FFF2-40B4-BE49-F238E27FC236}">
+                <a16:creationId xmlns:a16="http://schemas.microsoft.com/office/drawing/2014/main" id="{D5B13440-F73D-C041-8C5E-EC28670620D2}"/>
+              </a:ext>
+            </a:extLst>
+          </p:cNvPr>
+          <p:cNvSpPr/>
+          <p:nvPr/>
+        </p:nvSpPr>
+        <p:spPr>
+          <a:xfrm>
+            <a:off x="149672" y="6104858"/>
+            <a:ext cx="1299434" cy="573336"/>
+          </a:xfrm>
+          <a:prstGeom prst="roundRect">
+            <a:avLst/>
+          </a:prstGeom>
+          <a:solidFill>
+            <a:srgbClr val="3A4298"/>
+          </a:solidFill>
+        </p:spPr>
+        <p:style>
+          <a:lnRef idx="2">
+            <a:schemeClr val="accent1">
+              <a:shade val="50000"/>
+            </a:schemeClr>
+          </a:lnRef>
+          <a:fillRef idx="1">
+            <a:schemeClr val="accent1"/>
+          </a:fillRef>
+          <a:effectRef idx="0">
+            <a:schemeClr val="accent1"/>
+          </a:effectRef>
+          <a:fontRef idx="minor">
+            <a:schemeClr val="lt1"/>
+          </a:fontRef>
+        </p:style>
+        <p:txBody>
+          <a:bodyPr rtlCol="0" anchor="ctr"/>
+          <a:lstStyle/>
+          <a:p>
+            <a:pPr algn="ctr"/>
+            <a:r>
+              <a:rPr lang="en-NL" sz="1200" dirty="0">
+                <a:latin typeface="+mj-lt"/>
+              </a:rPr>
+              <a:t>Data Transformaties</a:t>
+            </a:r>
+          </a:p>
+        </p:txBody>
+      </p:sp>
+      <p:sp>
+        <p:nvSpPr>
+          <p:cNvPr id="31" name="Rounded Rectangle 30">
+            <a:extLst>
+              <a:ext uri="{FF2B5EF4-FFF2-40B4-BE49-F238E27FC236}">
+                <a16:creationId xmlns:a16="http://schemas.microsoft.com/office/drawing/2014/main" id="{08360BF1-2669-444B-BED0-3D9411C66508}"/>
+              </a:ext>
+            </a:extLst>
+          </p:cNvPr>
+          <p:cNvSpPr/>
+          <p:nvPr/>
+        </p:nvSpPr>
+        <p:spPr>
+          <a:xfrm>
+            <a:off x="1518195" y="5458702"/>
+            <a:ext cx="1299434" cy="573336"/>
+          </a:xfrm>
+          <a:prstGeom prst="roundRect">
+            <a:avLst/>
+          </a:prstGeom>
+          <a:solidFill>
+            <a:srgbClr val="3A4298"/>
+          </a:solidFill>
+        </p:spPr>
+        <p:style>
+          <a:lnRef idx="2">
+            <a:schemeClr val="accent1">
+              <a:shade val="50000"/>
+            </a:schemeClr>
+          </a:lnRef>
+          <a:fillRef idx="1">
+            <a:schemeClr val="accent1"/>
+          </a:fillRef>
+          <a:effectRef idx="0">
+            <a:schemeClr val="accent1"/>
+          </a:effectRef>
+          <a:fontRef idx="minor">
+            <a:schemeClr val="lt1"/>
+          </a:fontRef>
+        </p:style>
+        <p:txBody>
+          <a:bodyPr rtlCol="0" anchor="ctr"/>
+          <a:lstStyle/>
+          <a:p>
+            <a:pPr algn="ctr"/>
+            <a:r>
+              <a:rPr lang="en-NL" sz="1200" dirty="0">
+                <a:latin typeface="+mj-lt"/>
+              </a:rPr>
+              <a:t>Caching</a:t>
+            </a:r>
+          </a:p>
+        </p:txBody>
+      </p:sp>
+      <p:sp>
+        <p:nvSpPr>
+          <p:cNvPr id="30" name="Rounded Rectangle 29">
+            <a:extLst>
+              <a:ext uri="{FF2B5EF4-FFF2-40B4-BE49-F238E27FC236}">
+                <a16:creationId xmlns:a16="http://schemas.microsoft.com/office/drawing/2014/main" id="{1D962EEE-DB89-944D-9623-088B18156BBE}"/>
+              </a:ext>
+            </a:extLst>
+          </p:cNvPr>
+          <p:cNvSpPr/>
+          <p:nvPr/>
+        </p:nvSpPr>
+        <p:spPr>
+          <a:xfrm>
+            <a:off x="149672" y="4800191"/>
+            <a:ext cx="1299434" cy="573336"/>
+          </a:xfrm>
+          <a:prstGeom prst="roundRect">
+            <a:avLst/>
+          </a:prstGeom>
+          <a:solidFill>
+            <a:srgbClr val="3A4298"/>
+          </a:solidFill>
+        </p:spPr>
+        <p:style>
+          <a:lnRef idx="2">
+            <a:schemeClr val="accent1">
+              <a:shade val="50000"/>
+            </a:schemeClr>
+          </a:lnRef>
+          <a:fillRef idx="1">
+            <a:schemeClr val="accent1"/>
+          </a:fillRef>
+          <a:effectRef idx="0">
+            <a:schemeClr val="accent1"/>
+          </a:effectRef>
+          <a:fontRef idx="minor">
+            <a:schemeClr val="lt1"/>
+          </a:fontRef>
+        </p:style>
+        <p:txBody>
+          <a:bodyPr rtlCol="0" anchor="ctr"/>
+          <a:lstStyle/>
+          <a:p>
+            <a:pPr algn="ctr"/>
+            <a:r>
+              <a:rPr lang="en-NL" sz="1200" dirty="0">
+                <a:latin typeface="+mj-lt"/>
+              </a:rPr>
+              <a:t>Mediatie / Orkestratie</a:t>
+            </a:r>
+          </a:p>
+        </p:txBody>
+      </p:sp>
+      <p:sp>
+        <p:nvSpPr>
+          <p:cNvPr id="48" name="Rounded Rectangle 47">
+            <a:extLst>
+              <a:ext uri="{FF2B5EF4-FFF2-40B4-BE49-F238E27FC236}">
+                <a16:creationId xmlns:a16="http://schemas.microsoft.com/office/drawing/2014/main" id="{AA311A09-63F1-C445-9D02-79BA5CF7C5BE}"/>
+              </a:ext>
+            </a:extLst>
+          </p:cNvPr>
+          <p:cNvSpPr/>
+          <p:nvPr/>
+        </p:nvSpPr>
+        <p:spPr>
+          <a:xfrm>
+            <a:off x="4479679" y="4019867"/>
+            <a:ext cx="2839016" cy="994405"/>
+          </a:xfrm>
+          <a:prstGeom prst="roundRect">
+            <a:avLst>
+              <a:gd name="adj" fmla="val 2100"/>
+            </a:avLst>
+          </a:prstGeom>
+          <a:solidFill>
+            <a:srgbClr val="D9D9D9"/>
+          </a:solidFill>
+        </p:spPr>
+        <p:style>
+          <a:lnRef idx="2">
+            <a:schemeClr val="accent1">
+              <a:shade val="50000"/>
+            </a:schemeClr>
+          </a:lnRef>
+          <a:fillRef idx="1">
+            <a:schemeClr val="accent1"/>
+          </a:fillRef>
+          <a:effectRef idx="0">
+            <a:schemeClr val="accent1"/>
+          </a:effectRef>
+          <a:fontRef idx="minor">
+            <a:schemeClr val="lt1"/>
+          </a:fontRef>
+        </p:style>
+        <p:txBody>
+          <a:bodyPr rtlCol="0" anchor="t"/>
+          <a:lstStyle/>
+          <a:p>
+            <a:pPr algn="ctr"/>
+            <a:r>
+              <a:rPr lang="en-NL" sz="1400" dirty="0">
+                <a:solidFill>
+                  <a:sysClr val="windowText" lastClr="000000"/>
+                </a:solidFill>
+              </a:rPr>
+              <a:t>Servicelevel beheer</a:t>
+            </a:r>
+          </a:p>
+        </p:txBody>
+      </p:sp>
+      <p:sp>
+        <p:nvSpPr>
+          <p:cNvPr id="14" name="Rounded Rectangle 13">
+            <a:extLst>
+              <a:ext uri="{FF2B5EF4-FFF2-40B4-BE49-F238E27FC236}">
+                <a16:creationId xmlns:a16="http://schemas.microsoft.com/office/drawing/2014/main" id="{96046C79-0F25-7644-89C7-A5FE98CA8823}"/>
+              </a:ext>
+            </a:extLst>
+          </p:cNvPr>
+          <p:cNvSpPr/>
+          <p:nvPr/>
+        </p:nvSpPr>
+        <p:spPr>
+          <a:xfrm>
+            <a:off x="5941084" y="4358408"/>
+            <a:ext cx="1299434" cy="573336"/>
+          </a:xfrm>
+          <a:prstGeom prst="roundRect">
+            <a:avLst/>
+          </a:prstGeom>
+          <a:solidFill>
+            <a:srgbClr val="3A4298"/>
+          </a:solidFill>
+        </p:spPr>
+        <p:style>
+          <a:lnRef idx="2">
+            <a:schemeClr val="accent1">
+              <a:shade val="50000"/>
+            </a:schemeClr>
+          </a:lnRef>
+          <a:fillRef idx="1">
+            <a:schemeClr val="accent1"/>
+          </a:fillRef>
+          <a:effectRef idx="0">
+            <a:schemeClr val="accent1"/>
+          </a:effectRef>
+          <a:fontRef idx="minor">
+            <a:schemeClr val="lt1"/>
+          </a:fontRef>
+        </p:style>
+        <p:txBody>
+          <a:bodyPr rtlCol="0" anchor="ctr"/>
+          <a:lstStyle/>
+          <a:p>
+            <a:pPr algn="ctr"/>
+            <a:r>
+              <a:rPr lang="en-NL" sz="1200" dirty="0">
+                <a:latin typeface="+mj-lt"/>
+              </a:rPr>
+              <a:t>Doorbelasting</a:t>
+            </a:r>
+          </a:p>
+        </p:txBody>
+      </p:sp>
+      <p:sp>
+        <p:nvSpPr>
+          <p:cNvPr id="50" name="Rounded Rectangle 49">
+            <a:extLst>
+              <a:ext uri="{FF2B5EF4-FFF2-40B4-BE49-F238E27FC236}">
+                <a16:creationId xmlns:a16="http://schemas.microsoft.com/office/drawing/2014/main" id="{5C32873E-79ED-634E-B7C3-871442944345}"/>
+              </a:ext>
+            </a:extLst>
+          </p:cNvPr>
+          <p:cNvSpPr/>
+          <p:nvPr/>
+        </p:nvSpPr>
+        <p:spPr>
+          <a:xfrm>
+            <a:off x="4553705" y="4358408"/>
+            <a:ext cx="1299434" cy="573336"/>
+          </a:xfrm>
+          <a:prstGeom prst="roundRect">
+            <a:avLst/>
+          </a:prstGeom>
+          <a:solidFill>
+            <a:srgbClr val="3A4298"/>
+          </a:solidFill>
+        </p:spPr>
+        <p:style>
+          <a:lnRef idx="2">
+            <a:schemeClr val="accent1">
+              <a:shade val="50000"/>
+            </a:schemeClr>
+          </a:lnRef>
+          <a:fillRef idx="1">
+            <a:schemeClr val="accent1"/>
+          </a:fillRef>
+          <a:effectRef idx="0">
+            <a:schemeClr val="accent1"/>
+          </a:effectRef>
+          <a:fontRef idx="minor">
+            <a:schemeClr val="lt1"/>
+          </a:fontRef>
+        </p:style>
+        <p:txBody>
+          <a:bodyPr rtlCol="0" anchor="ctr"/>
+          <a:lstStyle/>
+          <a:p>
+            <a:pPr algn="ctr"/>
+            <a:r>
+              <a:rPr lang="en-NL" sz="1200" dirty="0">
+                <a:latin typeface="+mj-lt"/>
+              </a:rPr>
+              <a:t>Rate Limiting / Throttling</a:t>
+            </a:r>
+          </a:p>
+        </p:txBody>
+      </p:sp>
+      <p:sp>
+        <p:nvSpPr>
+          <p:cNvPr id="49" name="Rounded Rectangle 48">
+            <a:extLst>
+              <a:ext uri="{FF2B5EF4-FFF2-40B4-BE49-F238E27FC236}">
+                <a16:creationId xmlns:a16="http://schemas.microsoft.com/office/drawing/2014/main" id="{1CF67D8A-3B4B-1443-88F7-0BBBFBB54CDA}"/>
+              </a:ext>
+            </a:extLst>
+          </p:cNvPr>
+          <p:cNvSpPr/>
+          <p:nvPr/>
+        </p:nvSpPr>
+        <p:spPr>
+          <a:xfrm>
+            <a:off x="4479679" y="5080330"/>
+            <a:ext cx="2839016" cy="1666638"/>
+          </a:xfrm>
+          <a:prstGeom prst="roundRect">
+            <a:avLst>
+              <a:gd name="adj" fmla="val 2100"/>
+            </a:avLst>
+          </a:prstGeom>
+          <a:solidFill>
+            <a:srgbClr val="D9D9D9"/>
+          </a:solidFill>
+        </p:spPr>
+        <p:style>
+          <a:lnRef idx="2">
+            <a:schemeClr val="accent1">
+              <a:shade val="50000"/>
+            </a:schemeClr>
+          </a:lnRef>
+          <a:fillRef idx="1">
+            <a:schemeClr val="accent1"/>
+          </a:fillRef>
+          <a:effectRef idx="0">
+            <a:schemeClr val="accent1"/>
+          </a:effectRef>
+          <a:fontRef idx="minor">
+            <a:schemeClr val="lt1"/>
+          </a:fontRef>
+        </p:style>
+        <p:txBody>
+          <a:bodyPr rtlCol="0" anchor="t"/>
+          <a:lstStyle/>
+          <a:p>
+            <a:pPr algn="ctr"/>
+            <a:r>
+              <a:rPr lang="en-NL" sz="1400" dirty="0">
+                <a:solidFill>
+                  <a:sysClr val="windowText" lastClr="000000"/>
+                </a:solidFill>
+              </a:rPr>
+              <a:t>Beveiliging</a:t>
+            </a:r>
+          </a:p>
+        </p:txBody>
+      </p:sp>
+      <p:sp>
+        <p:nvSpPr>
+          <p:cNvPr id="41" name="Rounded Rectangle 40">
+            <a:extLst>
+              <a:ext uri="{FF2B5EF4-FFF2-40B4-BE49-F238E27FC236}">
+                <a16:creationId xmlns:a16="http://schemas.microsoft.com/office/drawing/2014/main" id="{BEFA111F-B4F9-AC4D-8085-BC6A063166CB}"/>
+              </a:ext>
+            </a:extLst>
+          </p:cNvPr>
+          <p:cNvSpPr/>
+          <p:nvPr/>
+        </p:nvSpPr>
+        <p:spPr>
+          <a:xfrm>
+            <a:off x="4563473" y="5458702"/>
+            <a:ext cx="1299434" cy="573336"/>
+          </a:xfrm>
+          <a:prstGeom prst="roundRect">
+            <a:avLst/>
+          </a:prstGeom>
+          <a:solidFill>
+            <a:srgbClr val="3A4298"/>
+          </a:solidFill>
+        </p:spPr>
+        <p:style>
+          <a:lnRef idx="2">
+            <a:schemeClr val="accent1">
+              <a:shade val="50000"/>
+            </a:schemeClr>
+          </a:lnRef>
+          <a:fillRef idx="1">
+            <a:schemeClr val="accent1"/>
+          </a:fillRef>
+          <a:effectRef idx="0">
+            <a:schemeClr val="accent1"/>
+          </a:effectRef>
+          <a:fontRef idx="minor">
+            <a:schemeClr val="lt1"/>
+          </a:fontRef>
+        </p:style>
+        <p:txBody>
+          <a:bodyPr rtlCol="0" anchor="ctr"/>
+          <a:lstStyle/>
+          <a:p>
+            <a:pPr algn="ctr"/>
+            <a:r>
+              <a:rPr lang="nl-NL" sz="1200" dirty="0">
+                <a:latin typeface="+mj-lt"/>
+              </a:rPr>
+              <a:t>Identificatie &amp; Authenticatie</a:t>
+            </a:r>
+            <a:endParaRPr lang="en-NL" sz="1200" dirty="0">
+              <a:latin typeface="+mj-lt"/>
+            </a:endParaRPr>
+          </a:p>
+        </p:txBody>
+      </p:sp>
+      <p:sp>
+        <p:nvSpPr>
+          <p:cNvPr id="76" name="Rounded Rectangle 40">
+            <a:extLst>
+              <a:ext uri="{FF2B5EF4-FFF2-40B4-BE49-F238E27FC236}">
+                <a16:creationId xmlns:a16="http://schemas.microsoft.com/office/drawing/2014/main" id="{BEFA111F-B4F9-AC4D-8085-BC6A063166CB}"/>
+              </a:ext>
+            </a:extLst>
+          </p:cNvPr>
+          <p:cNvSpPr/>
+          <p:nvPr/>
+        </p:nvSpPr>
+        <p:spPr>
+          <a:xfrm>
+            <a:off x="5922639" y="5458702"/>
+            <a:ext cx="1299434" cy="573336"/>
+          </a:xfrm>
+          <a:prstGeom prst="roundRect">
+            <a:avLst/>
+          </a:prstGeom>
+          <a:solidFill>
+            <a:srgbClr val="3A4298"/>
+          </a:solidFill>
+        </p:spPr>
+        <p:style>
+          <a:lnRef idx="2">
+            <a:schemeClr val="accent1">
+              <a:shade val="50000"/>
+            </a:schemeClr>
+          </a:lnRef>
+          <a:fillRef idx="1">
+            <a:schemeClr val="accent1"/>
+          </a:fillRef>
+          <a:effectRef idx="0">
+            <a:schemeClr val="accent1"/>
+          </a:effectRef>
+          <a:fontRef idx="minor">
+            <a:schemeClr val="lt1"/>
+          </a:fontRef>
+        </p:style>
+        <p:txBody>
+          <a:bodyPr rtlCol="0" anchor="ctr"/>
+          <a:lstStyle/>
+          <a:p>
+            <a:pPr algn="ctr"/>
+            <a:r>
+              <a:rPr lang="nl-NL" sz="1200" dirty="0">
+                <a:latin typeface="+mj-lt"/>
+              </a:rPr>
+              <a:t>Autorisatie</a:t>
+            </a:r>
+            <a:endParaRPr lang="en-NL" sz="1200" dirty="0">
+              <a:latin typeface="+mj-lt"/>
+            </a:endParaRPr>
+          </a:p>
+        </p:txBody>
+      </p:sp>
+      <p:sp>
+        <p:nvSpPr>
+          <p:cNvPr id="36" name="Rounded Rectangle 35">
+            <a:extLst>
+              <a:ext uri="{FF2B5EF4-FFF2-40B4-BE49-F238E27FC236}">
+                <a16:creationId xmlns:a16="http://schemas.microsoft.com/office/drawing/2014/main" id="{3E8BA4F3-561C-D948-BE94-F344EA45A459}"/>
+              </a:ext>
+            </a:extLst>
+          </p:cNvPr>
+          <p:cNvSpPr/>
+          <p:nvPr/>
+        </p:nvSpPr>
+        <p:spPr>
+          <a:xfrm>
+            <a:off x="4553705" y="6104858"/>
+            <a:ext cx="1299434" cy="573336"/>
+          </a:xfrm>
+          <a:prstGeom prst="roundRect">
+            <a:avLst/>
+          </a:prstGeom>
+          <a:solidFill>
+            <a:srgbClr val="3A4298"/>
+          </a:solidFill>
+        </p:spPr>
+        <p:style>
+          <a:lnRef idx="2">
+            <a:schemeClr val="accent1">
+              <a:shade val="50000"/>
+            </a:schemeClr>
+          </a:lnRef>
+          <a:fillRef idx="1">
+            <a:schemeClr val="accent1"/>
+          </a:fillRef>
+          <a:effectRef idx="0">
+            <a:schemeClr val="accent1"/>
+          </a:effectRef>
+          <a:fontRef idx="minor">
+            <a:schemeClr val="lt1"/>
+          </a:fontRef>
+        </p:style>
+        <p:txBody>
+          <a:bodyPr rtlCol="0" anchor="ctr"/>
+          <a:lstStyle/>
+          <a:p>
+            <a:pPr algn="ctr"/>
+            <a:r>
+              <a:rPr lang="en-NL" sz="1200" dirty="0">
+                <a:latin typeface="+mj-lt"/>
+              </a:rPr>
+              <a:t>Policy handhaving</a:t>
+            </a:r>
+          </a:p>
+        </p:txBody>
+      </p:sp>
+      <p:sp>
+        <p:nvSpPr>
+          <p:cNvPr id="55" name="Rounded Rectangle 67">
+            <a:extLst>
+              <a:ext uri="{FF2B5EF4-FFF2-40B4-BE49-F238E27FC236}">
+                <a16:creationId xmlns:a16="http://schemas.microsoft.com/office/drawing/2014/main" id="{449DCC98-6C27-7346-B888-A2845F5B79AF}"/>
+              </a:ext>
+            </a:extLst>
+          </p:cNvPr>
+          <p:cNvSpPr/>
+          <p:nvPr/>
+        </p:nvSpPr>
+        <p:spPr>
+          <a:xfrm>
+            <a:off x="4510802" y="375833"/>
+            <a:ext cx="1404781" cy="1302439"/>
+          </a:xfrm>
+          <a:prstGeom prst="roundRect">
+            <a:avLst>
+              <a:gd name="adj" fmla="val 2100"/>
+            </a:avLst>
+          </a:prstGeom>
+          <a:solidFill>
+            <a:srgbClr val="D9D9D9"/>
+          </a:solidFill>
+        </p:spPr>
+        <p:style>
+          <a:lnRef idx="2">
+            <a:schemeClr val="accent1">
+              <a:shade val="50000"/>
+            </a:schemeClr>
+          </a:lnRef>
+          <a:fillRef idx="1">
+            <a:schemeClr val="accent1"/>
+          </a:fillRef>
+          <a:effectRef idx="0">
+            <a:schemeClr val="accent1"/>
+          </a:effectRef>
+          <a:fontRef idx="minor">
+            <a:schemeClr val="lt1"/>
+          </a:fontRef>
+        </p:style>
+        <p:txBody>
+          <a:bodyPr rtlCol="0" anchor="t"/>
+          <a:lstStyle/>
+          <a:p>
+            <a:pPr algn="ctr"/>
+            <a:r>
+              <a:rPr lang="nl-NL" sz="1400" dirty="0">
+                <a:solidFill>
+                  <a:sysClr val="windowText" lastClr="000000"/>
+                </a:solidFill>
+              </a:rPr>
+              <a:t>API </a:t>
+            </a:r>
+            <a:r>
+              <a:rPr lang="nl-NL" sz="1400" dirty="0" err="1">
+                <a:solidFill>
+                  <a:sysClr val="windowText" lastClr="000000"/>
+                </a:solidFill>
+              </a:rPr>
+              <a:t>Governance</a:t>
+            </a:r>
+            <a:endParaRPr lang="en-NL" sz="1400" dirty="0">
+              <a:solidFill>
+                <a:sysClr val="windowText" lastClr="000000"/>
+              </a:solidFill>
+            </a:endParaRPr>
+          </a:p>
+        </p:txBody>
+      </p:sp>
+      <p:sp>
+        <p:nvSpPr>
+          <p:cNvPr id="81" name="Rounded Rectangle 33">
+            <a:extLst>
+              <a:ext uri="{FF2B5EF4-FFF2-40B4-BE49-F238E27FC236}">
+                <a16:creationId xmlns:a16="http://schemas.microsoft.com/office/drawing/2014/main" id="{20D509D5-40A9-B142-BCA3-8243E162AFD8}"/>
+              </a:ext>
+            </a:extLst>
+          </p:cNvPr>
+          <p:cNvSpPr/>
+          <p:nvPr/>
+        </p:nvSpPr>
+        <p:spPr>
+          <a:xfrm>
+            <a:off x="5912871" y="6104858"/>
+            <a:ext cx="1299434" cy="573336"/>
+          </a:xfrm>
+          <a:prstGeom prst="roundRect">
+            <a:avLst/>
+          </a:prstGeom>
+          <a:solidFill>
+            <a:srgbClr val="3A4298"/>
+          </a:solidFill>
+        </p:spPr>
+        <p:style>
+          <a:lnRef idx="2">
+            <a:schemeClr val="accent1">
+              <a:shade val="50000"/>
+            </a:schemeClr>
+          </a:lnRef>
+          <a:fillRef idx="1">
+            <a:schemeClr val="accent1"/>
+          </a:fillRef>
+          <a:effectRef idx="0">
+            <a:schemeClr val="accent1"/>
+          </a:effectRef>
+          <a:fontRef idx="minor">
+            <a:schemeClr val="lt1"/>
+          </a:fontRef>
+        </p:style>
+        <p:txBody>
+          <a:bodyPr rtlCol="0" anchor="ctr"/>
+          <a:lstStyle/>
+          <a:p>
+            <a:pPr algn="ctr"/>
+            <a:r>
+              <a:rPr lang="nl-NL" sz="1200" dirty="0">
+                <a:latin typeface="+mj-lt"/>
+              </a:rPr>
+              <a:t>Anomalie detectie</a:t>
+            </a:r>
+            <a:endParaRPr lang="en-NL" sz="1200" dirty="0">
+              <a:latin typeface="+mj-lt"/>
+            </a:endParaRPr>
+          </a:p>
+        </p:txBody>
+      </p:sp>
+      <p:sp>
+        <p:nvSpPr>
+          <p:cNvPr id="57" name="Rounded Rectangle 38">
+            <a:extLst>
+              <a:ext uri="{FF2B5EF4-FFF2-40B4-BE49-F238E27FC236}">
+                <a16:creationId xmlns:a16="http://schemas.microsoft.com/office/drawing/2014/main" id="{E5C27DE2-CC0B-574B-A955-49A95A2F0DCB}"/>
+              </a:ext>
+            </a:extLst>
+          </p:cNvPr>
+          <p:cNvSpPr/>
+          <p:nvPr/>
+        </p:nvSpPr>
+        <p:spPr>
+          <a:xfrm>
+            <a:off x="4563473" y="1030903"/>
+            <a:ext cx="1299434" cy="573336"/>
+          </a:xfrm>
+          <a:prstGeom prst="roundRect">
+            <a:avLst/>
+          </a:prstGeom>
+          <a:solidFill>
+            <a:srgbClr val="3A4298"/>
+          </a:solidFill>
+        </p:spPr>
+        <p:style>
+          <a:lnRef idx="2">
+            <a:schemeClr val="accent1">
+              <a:shade val="50000"/>
+            </a:schemeClr>
+          </a:lnRef>
+          <a:fillRef idx="1">
+            <a:schemeClr val="accent1"/>
+          </a:fillRef>
+          <a:effectRef idx="0">
+            <a:schemeClr val="accent1"/>
+          </a:effectRef>
+          <a:fontRef idx="minor">
+            <a:schemeClr val="lt1"/>
+          </a:fontRef>
+        </p:style>
+        <p:txBody>
+          <a:bodyPr rtlCol="0" anchor="ctr"/>
+          <a:lstStyle/>
+          <a:p>
+            <a:pPr algn="ctr"/>
+            <a:r>
+              <a:rPr lang="nl-NL" sz="1200" dirty="0">
+                <a:latin typeface="+mj-lt"/>
+              </a:rPr>
+              <a:t>Afspraken, Standaarden &amp; Richtlijnen</a:t>
+            </a:r>
+            <a:endParaRPr lang="en-NL" sz="1200" dirty="0">
+              <a:latin typeface="+mj-lt"/>
+            </a:endParaRPr>
+          </a:p>
+        </p:txBody>
+      </p:sp>
+    </p:spTree>
+    <p:extLst>
+      <p:ext uri="{BB962C8B-B14F-4D97-AF65-F5344CB8AC3E}">
+        <p14:creationId xmlns:p14="http://schemas.microsoft.com/office/powerpoint/2010/main" val="3373394754"/>
       </p:ext>
     </p:extLst>
   </p:cSld>
@@ -11425,4 +14537,299 @@
     </a:ext>
   </a:extLst>
 </a:theme>
+</file>
+
+<file path=ppt/theme/theme2.xml><?xml version="1.0" encoding="utf-8"?>
+<a:theme xmlns:a="http://schemas.openxmlformats.org/drawingml/2006/main" name="Office Theme">
+  <a:themeElements>
+    <a:clrScheme name="Office">
+      <a:dk1>
+        <a:sysClr val="windowText" lastClr="000000"/>
+      </a:dk1>
+      <a:lt1>
+        <a:sysClr val="window" lastClr="FFFFFF"/>
+      </a:lt1>
+      <a:dk2>
+        <a:srgbClr val="44546A"/>
+      </a:dk2>
+      <a:lt2>
+        <a:srgbClr val="E7E6E6"/>
+      </a:lt2>
+      <a:accent1>
+        <a:srgbClr val="4472C4"/>
+      </a:accent1>
+      <a:accent2>
+        <a:srgbClr val="ED7D31"/>
+      </a:accent2>
+      <a:accent3>
+        <a:srgbClr val="A5A5A5"/>
+      </a:accent3>
+      <a:accent4>
+        <a:srgbClr val="FFC000"/>
+      </a:accent4>
+      <a:accent5>
+        <a:srgbClr val="5B9BD5"/>
+      </a:accent5>
+      <a:accent6>
+        <a:srgbClr val="70AD47"/>
+      </a:accent6>
+      <a:hlink>
+        <a:srgbClr val="0563C1"/>
+      </a:hlink>
+      <a:folHlink>
+        <a:srgbClr val="954F72"/>
+      </a:folHlink>
+    </a:clrScheme>
+    <a:fontScheme name="Office">
+      <a:majorFont>
+        <a:latin typeface="Calibri Light" panose="020F0302020204030204"/>
+        <a:ea typeface=""/>
+        <a:cs typeface=""/>
+        <a:font script="Jpan" typeface="游ゴシック Light"/>
+        <a:font script="Hang" typeface="맑은 고딕"/>
+        <a:font script="Hans" typeface="等线 Light"/>
+        <a:font script="Hant" typeface="新細明體"/>
+        <a:font script="Arab" typeface="Times New Roman"/>
+        <a:font script="Hebr" typeface="Times New Roman"/>
+        <a:font script="Thai" typeface="Angsana New"/>
+        <a:font script="Ethi" typeface="Nyala"/>
+        <a:font script="Beng" typeface="Vrinda"/>
+        <a:font script="Gujr" typeface="Shruti"/>
+        <a:font script="Khmr" typeface="MoolBoran"/>
+        <a:font script="Knda" typeface="Tunga"/>
+        <a:font script="Guru" typeface="Raavi"/>
+        <a:font script="Cans" typeface="Euphemia"/>
+        <a:font script="Cher" typeface="Plantagenet Cherokee"/>
+        <a:font script="Yiii" typeface="Microsoft Yi Baiti"/>
+        <a:font script="Tibt" typeface="Microsoft Himalaya"/>
+        <a:font script="Thaa" typeface="MV Boli"/>
+        <a:font script="Deva" typeface="Mangal"/>
+        <a:font script="Telu" typeface="Gautami"/>
+        <a:font script="Taml" typeface="Latha"/>
+        <a:font script="Syrc" typeface="Estrangelo Edessa"/>
+        <a:font script="Orya" typeface="Kalinga"/>
+        <a:font script="Mlym" typeface="Kartika"/>
+        <a:font script="Laoo" typeface="DokChampa"/>
+        <a:font script="Sinh" typeface="Iskoola Pota"/>
+        <a:font script="Mong" typeface="Mongolian Baiti"/>
+        <a:font script="Viet" typeface="Times New Roman"/>
+        <a:font script="Uigh" typeface="Microsoft Uighur"/>
+        <a:font script="Geor" typeface="Sylfaen"/>
+        <a:font script="Armn" typeface="Arial"/>
+        <a:font script="Bugi" typeface="Leelawadee UI"/>
+        <a:font script="Bopo" typeface="Microsoft JhengHei"/>
+        <a:font script="Java" typeface="Javanese Text"/>
+        <a:font script="Lisu" typeface="Segoe UI"/>
+        <a:font script="Mymr" typeface="Myanmar Text"/>
+        <a:font script="Nkoo" typeface="Ebrima"/>
+        <a:font script="Olck" typeface="Nirmala UI"/>
+        <a:font script="Osma" typeface="Ebrima"/>
+        <a:font script="Phag" typeface="Phagspa"/>
+        <a:font script="Syrn" typeface="Estrangelo Edessa"/>
+        <a:font script="Syrj" typeface="Estrangelo Edessa"/>
+        <a:font script="Syre" typeface="Estrangelo Edessa"/>
+        <a:font script="Sora" typeface="Nirmala UI"/>
+        <a:font script="Tale" typeface="Microsoft Tai Le"/>
+        <a:font script="Talu" typeface="Microsoft New Tai Lue"/>
+        <a:font script="Tfng" typeface="Ebrima"/>
+      </a:majorFont>
+      <a:minorFont>
+        <a:latin typeface="Calibri" panose="020F0502020204030204"/>
+        <a:ea typeface=""/>
+        <a:cs typeface=""/>
+        <a:font script="Jpan" typeface="游ゴシック"/>
+        <a:font script="Hang" typeface="맑은 고딕"/>
+        <a:font script="Hans" typeface="等线"/>
+        <a:font script="Hant" typeface="新細明體"/>
+        <a:font script="Arab" typeface="Arial"/>
+        <a:font script="Hebr" typeface="Arial"/>
+        <a:font script="Thai" typeface="Cordia New"/>
+        <a:font script="Ethi" typeface="Nyala"/>
+        <a:font script="Beng" typeface="Vrinda"/>
+        <a:font script="Gujr" typeface="Shruti"/>
+        <a:font script="Khmr" typeface="DaunPenh"/>
+        <a:font script="Knda" typeface="Tunga"/>
+        <a:font script="Guru" typeface="Raavi"/>
+        <a:font script="Cans" typeface="Euphemia"/>
+        <a:font script="Cher" typeface="Plantagenet Cherokee"/>
+        <a:font script="Yiii" typeface="Microsoft Yi Baiti"/>
+        <a:font script="Tibt" typeface="Microsoft Himalaya"/>
+        <a:font script="Thaa" typeface="MV Boli"/>
+        <a:font script="Deva" typeface="Mangal"/>
+        <a:font script="Telu" typeface="Gautami"/>
+        <a:font script="Taml" typeface="Latha"/>
+        <a:font script="Syrc" typeface="Estrangelo Edessa"/>
+        <a:font script="Orya" typeface="Kalinga"/>
+        <a:font script="Mlym" typeface="Kartika"/>
+        <a:font script="Laoo" typeface="DokChampa"/>
+        <a:font script="Sinh" typeface="Iskoola Pota"/>
+        <a:font script="Mong" typeface="Mongolian Baiti"/>
+        <a:font script="Viet" typeface="Arial"/>
+        <a:font script="Uigh" typeface="Microsoft Uighur"/>
+        <a:font script="Geor" typeface="Sylfaen"/>
+        <a:font script="Armn" typeface="Arial"/>
+        <a:font script="Bugi" typeface="Leelawadee UI"/>
+        <a:font script="Bopo" typeface="Microsoft JhengHei"/>
+        <a:font script="Java" typeface="Javanese Text"/>
+        <a:font script="Lisu" typeface="Segoe UI"/>
+        <a:font script="Mymr" typeface="Myanmar Text"/>
+        <a:font script="Nkoo" typeface="Ebrima"/>
+        <a:font script="Olck" typeface="Nirmala UI"/>
+        <a:font script="Osma" typeface="Ebrima"/>
+        <a:font script="Phag" typeface="Phagspa"/>
+        <a:font script="Syrn" typeface="Estrangelo Edessa"/>
+        <a:font script="Syrj" typeface="Estrangelo Edessa"/>
+        <a:font script="Syre" typeface="Estrangelo Edessa"/>
+        <a:font script="Sora" typeface="Nirmala UI"/>
+        <a:font script="Tale" typeface="Microsoft Tai Le"/>
+        <a:font script="Talu" typeface="Microsoft New Tai Lue"/>
+        <a:font script="Tfng" typeface="Ebrima"/>
+      </a:minorFont>
+    </a:fontScheme>
+    <a:fmtScheme name="Office">
+      <a:fillStyleLst>
+        <a:solidFill>
+          <a:schemeClr val="phClr"/>
+        </a:solidFill>
+        <a:gradFill rotWithShape="1">
+          <a:gsLst>
+            <a:gs pos="0">
+              <a:schemeClr val="phClr">
+                <a:lumMod val="110000"/>
+                <a:satMod val="105000"/>
+                <a:tint val="67000"/>
+              </a:schemeClr>
+            </a:gs>
+            <a:gs pos="50000">
+              <a:schemeClr val="phClr">
+                <a:lumMod val="105000"/>
+                <a:satMod val="103000"/>
+                <a:tint val="73000"/>
+              </a:schemeClr>
+            </a:gs>
+            <a:gs pos="100000">
+              <a:schemeClr val="phClr">
+                <a:lumMod val="105000"/>
+                <a:satMod val="109000"/>
+                <a:tint val="81000"/>
+              </a:schemeClr>
+            </a:gs>
+          </a:gsLst>
+          <a:lin ang="5400000" scaled="0"/>
+        </a:gradFill>
+        <a:gradFill rotWithShape="1">
+          <a:gsLst>
+            <a:gs pos="0">
+              <a:schemeClr val="phClr">
+                <a:satMod val="103000"/>
+                <a:lumMod val="102000"/>
+                <a:tint val="94000"/>
+              </a:schemeClr>
+            </a:gs>
+            <a:gs pos="50000">
+              <a:schemeClr val="phClr">
+                <a:satMod val="110000"/>
+                <a:lumMod val="100000"/>
+                <a:shade val="100000"/>
+              </a:schemeClr>
+            </a:gs>
+            <a:gs pos="100000">
+              <a:schemeClr val="phClr">
+                <a:lumMod val="99000"/>
+                <a:satMod val="120000"/>
+                <a:shade val="78000"/>
+              </a:schemeClr>
+            </a:gs>
+          </a:gsLst>
+          <a:lin ang="5400000" scaled="0"/>
+        </a:gradFill>
+      </a:fillStyleLst>
+      <a:lnStyleLst>
+        <a:ln w="6350" cap="flat" cmpd="sng" algn="ctr">
+          <a:solidFill>
+            <a:schemeClr val="phClr"/>
+          </a:solidFill>
+          <a:prstDash val="solid"/>
+          <a:miter lim="800000"/>
+        </a:ln>
+        <a:ln w="12700" cap="flat" cmpd="sng" algn="ctr">
+          <a:solidFill>
+            <a:schemeClr val="phClr"/>
+          </a:solidFill>
+          <a:prstDash val="solid"/>
+          <a:miter lim="800000"/>
+        </a:ln>
+        <a:ln w="19050" cap="flat" cmpd="sng" algn="ctr">
+          <a:solidFill>
+            <a:schemeClr val="phClr"/>
+          </a:solidFill>
+          <a:prstDash val="solid"/>
+          <a:miter lim="800000"/>
+        </a:ln>
+      </a:lnStyleLst>
+      <a:effectStyleLst>
+        <a:effectStyle>
+          <a:effectLst/>
+        </a:effectStyle>
+        <a:effectStyle>
+          <a:effectLst/>
+        </a:effectStyle>
+        <a:effectStyle>
+          <a:effectLst>
+            <a:outerShdw blurRad="57150" dist="19050" dir="5400000" algn="ctr" rotWithShape="0">
+              <a:srgbClr val="000000">
+                <a:alpha val="63000"/>
+              </a:srgbClr>
+            </a:outerShdw>
+          </a:effectLst>
+        </a:effectStyle>
+      </a:effectStyleLst>
+      <a:bgFillStyleLst>
+        <a:solidFill>
+          <a:schemeClr val="phClr"/>
+        </a:solidFill>
+        <a:solidFill>
+          <a:schemeClr val="phClr">
+            <a:tint val="95000"/>
+            <a:satMod val="170000"/>
+          </a:schemeClr>
+        </a:solidFill>
+        <a:gradFill rotWithShape="1">
+          <a:gsLst>
+            <a:gs pos="0">
+              <a:schemeClr val="phClr">
+                <a:tint val="93000"/>
+                <a:satMod val="150000"/>
+                <a:shade val="98000"/>
+                <a:lumMod val="102000"/>
+              </a:schemeClr>
+            </a:gs>
+            <a:gs pos="50000">
+              <a:schemeClr val="phClr">
+                <a:tint val="98000"/>
+                <a:satMod val="130000"/>
+                <a:shade val="90000"/>
+                <a:lumMod val="103000"/>
+              </a:schemeClr>
+            </a:gs>
+            <a:gs pos="100000">
+              <a:schemeClr val="phClr">
+                <a:shade val="63000"/>
+                <a:satMod val="120000"/>
+              </a:schemeClr>
+            </a:gs>
+          </a:gsLst>
+          <a:lin ang="5400000" scaled="0"/>
+        </a:gradFill>
+      </a:bgFillStyleLst>
+    </a:fmtScheme>
+  </a:themeElements>
+  <a:objectDefaults/>
+  <a:extraClrSchemeLst/>
+  <a:extLst>
+    <a:ext uri="{05A4C25C-085E-4340-85A3-A5531E510DB2}">
+      <thm15:themeFamily xmlns:thm15="http://schemas.microsoft.com/office/thememl/2012/main" name="Office Theme" id="{62F939B6-93AF-4DB8-9C6B-D6C7DFDC589F}" vid="{4A3C46E8-61CC-4603-A589-7422A47A8E4A}"/>
+    </a:ext>
+  </a:extLst>
+</a:theme>
 </file>
</xml_diff>

<commit_message>
Added Vovernance policy handhaving capability
</commit_message>
<xml_diff>
--- a/Werkgroep API architectuur/uitwerkingen/media/API Capabilities.pptx
+++ b/Werkgroep API architectuur/uitwerkingen/media/API Capabilities.pptx
@@ -5,13 +5,14 @@
     <p:sldMasterId id="2147483648" r:id="rId1"/>
   </p:sldMasterIdLst>
   <p:notesMasterIdLst>
-    <p:notesMasterId r:id="rId6"/>
+    <p:notesMasterId r:id="rId7"/>
   </p:notesMasterIdLst>
   <p:sldIdLst>
     <p:sldId id="256" r:id="rId2"/>
     <p:sldId id="257" r:id="rId3"/>
     <p:sldId id="258" r:id="rId4"/>
     <p:sldId id="259" r:id="rId5"/>
+    <p:sldId id="260" r:id="rId6"/>
   </p:sldIdLst>
   <p:sldSz cx="12192000" cy="6858000"/>
   <p:notesSz cx="6858000" cy="9144000"/>
@@ -208,7 +209,7 @@
           <a:p>
             <a:fld id="{C74F389D-EBBB-934F-B4E0-C9D666754445}" type="datetimeFigureOut">
               <a:rPr lang="en-NL" smtClean="0"/>
-              <a:t>26/05/2021</a:t>
+              <a:t>11/10/2021</a:t>
             </a:fld>
             <a:endParaRPr lang="en-NL"/>
           </a:p>
@@ -565,6 +566,95 @@
 </p:notes>
 </file>
 
+<file path=ppt/notesSlides/notesSlide2.xml><?xml version="1.0" encoding="utf-8"?>
+<p:notes xmlns:a="http://schemas.openxmlformats.org/drawingml/2006/main" xmlns:r="http://schemas.openxmlformats.org/officeDocument/2006/relationships" xmlns:p="http://schemas.openxmlformats.org/presentationml/2006/main">
+  <p:cSld>
+    <p:spTree>
+      <p:nvGrpSpPr>
+        <p:cNvPr id="1" name=""/>
+        <p:cNvGrpSpPr/>
+        <p:nvPr/>
+      </p:nvGrpSpPr>
+      <p:grpSpPr>
+        <a:xfrm>
+          <a:off x="0" y="0"/>
+          <a:ext cx="0" cy="0"/>
+          <a:chOff x="0" y="0"/>
+          <a:chExt cx="0" cy="0"/>
+        </a:xfrm>
+      </p:grpSpPr>
+      <p:sp>
+        <p:nvSpPr>
+          <p:cNvPr id="2" name="Slide Image Placeholder 1"/>
+          <p:cNvSpPr>
+            <a:spLocks noGrp="1" noRot="1" noChangeAspect="1"/>
+          </p:cNvSpPr>
+          <p:nvPr>
+            <p:ph type="sldImg"/>
+          </p:nvPr>
+        </p:nvSpPr>
+        <p:spPr>
+          <a:xfrm>
+            <a:off x="685800" y="1143000"/>
+            <a:ext cx="5486400" cy="3086100"/>
+          </a:xfrm>
+        </p:spPr>
+      </p:sp>
+      <p:sp>
+        <p:nvSpPr>
+          <p:cNvPr id="3" name="Notes Placeholder 2"/>
+          <p:cNvSpPr>
+            <a:spLocks noGrp="1"/>
+          </p:cNvSpPr>
+          <p:nvPr>
+            <p:ph type="body" idx="1"/>
+          </p:nvPr>
+        </p:nvSpPr>
+        <p:spPr/>
+        <p:txBody>
+          <a:bodyPr/>
+          <a:lstStyle/>
+          <a:p>
+            <a:endParaRPr lang="en-NL" dirty="0"/>
+          </a:p>
+        </p:txBody>
+      </p:sp>
+      <p:sp>
+        <p:nvSpPr>
+          <p:cNvPr id="4" name="Slide Number Placeholder 3"/>
+          <p:cNvSpPr>
+            <a:spLocks noGrp="1"/>
+          </p:cNvSpPr>
+          <p:nvPr>
+            <p:ph type="sldNum" sz="quarter" idx="5"/>
+          </p:nvPr>
+        </p:nvSpPr>
+        <p:spPr/>
+        <p:txBody>
+          <a:bodyPr/>
+          <a:lstStyle/>
+          <a:p>
+            <a:fld id="{F1E1357B-3B64-7648-A5E1-35E13923AA70}" type="slidenum">
+              <a:rPr lang="en-NL" smtClean="0"/>
+              <a:t>5</a:t>
+            </a:fld>
+            <a:endParaRPr lang="en-NL"/>
+          </a:p>
+        </p:txBody>
+      </p:sp>
+    </p:spTree>
+    <p:extLst>
+      <p:ext uri="{BB962C8B-B14F-4D97-AF65-F5344CB8AC3E}">
+        <p14:creationId xmlns:p14="http://schemas.microsoft.com/office/powerpoint/2010/main" val="287159074"/>
+      </p:ext>
+    </p:extLst>
+  </p:cSld>
+  <p:clrMapOvr>
+    <a:masterClrMapping/>
+  </p:clrMapOvr>
+</p:notes>
+</file>
+
 <file path=ppt/slideLayouts/slideLayout1.xml><?xml version="1.0" encoding="utf-8"?>
 <p:sldLayout xmlns:a="http://schemas.openxmlformats.org/drawingml/2006/main" xmlns:r="http://schemas.openxmlformats.org/officeDocument/2006/relationships" xmlns:p="http://schemas.openxmlformats.org/presentationml/2006/main" type="title" preserve="1">
   <p:cSld name="Title Slide">
@@ -714,7 +804,7 @@
           <a:p>
             <a:fld id="{9C27045A-4E63-2949-8A05-DA4D85C37A94}" type="datetimeFigureOut">
               <a:rPr lang="en-NL" smtClean="0"/>
-              <a:t>26/05/2021</a:t>
+              <a:t>11/10/2021</a:t>
             </a:fld>
             <a:endParaRPr lang="en-NL"/>
           </a:p>
@@ -914,7 +1004,7 @@
           <a:p>
             <a:fld id="{9C27045A-4E63-2949-8A05-DA4D85C37A94}" type="datetimeFigureOut">
               <a:rPr lang="en-NL" smtClean="0"/>
-              <a:t>26/05/2021</a:t>
+              <a:t>11/10/2021</a:t>
             </a:fld>
             <a:endParaRPr lang="en-NL"/>
           </a:p>
@@ -1124,7 +1214,7 @@
           <a:p>
             <a:fld id="{9C27045A-4E63-2949-8A05-DA4D85C37A94}" type="datetimeFigureOut">
               <a:rPr lang="en-NL" smtClean="0"/>
-              <a:t>26/05/2021</a:t>
+              <a:t>11/10/2021</a:t>
             </a:fld>
             <a:endParaRPr lang="en-NL"/>
           </a:p>
@@ -1324,7 +1414,7 @@
           <a:p>
             <a:fld id="{9C27045A-4E63-2949-8A05-DA4D85C37A94}" type="datetimeFigureOut">
               <a:rPr lang="en-NL" smtClean="0"/>
-              <a:t>26/05/2021</a:t>
+              <a:t>11/10/2021</a:t>
             </a:fld>
             <a:endParaRPr lang="en-NL"/>
           </a:p>
@@ -1600,7 +1690,7 @@
           <a:p>
             <a:fld id="{9C27045A-4E63-2949-8A05-DA4D85C37A94}" type="datetimeFigureOut">
               <a:rPr lang="en-NL" smtClean="0"/>
-              <a:t>26/05/2021</a:t>
+              <a:t>11/10/2021</a:t>
             </a:fld>
             <a:endParaRPr lang="en-NL"/>
           </a:p>
@@ -1868,7 +1958,7 @@
           <a:p>
             <a:fld id="{9C27045A-4E63-2949-8A05-DA4D85C37A94}" type="datetimeFigureOut">
               <a:rPr lang="en-NL" smtClean="0"/>
-              <a:t>26/05/2021</a:t>
+              <a:t>11/10/2021</a:t>
             </a:fld>
             <a:endParaRPr lang="en-NL"/>
           </a:p>
@@ -2283,7 +2373,7 @@
           <a:p>
             <a:fld id="{9C27045A-4E63-2949-8A05-DA4D85C37A94}" type="datetimeFigureOut">
               <a:rPr lang="en-NL" smtClean="0"/>
-              <a:t>26/05/2021</a:t>
+              <a:t>11/10/2021</a:t>
             </a:fld>
             <a:endParaRPr lang="en-NL"/>
           </a:p>
@@ -2425,7 +2515,7 @@
           <a:p>
             <a:fld id="{9C27045A-4E63-2949-8A05-DA4D85C37A94}" type="datetimeFigureOut">
               <a:rPr lang="en-NL" smtClean="0"/>
-              <a:t>26/05/2021</a:t>
+              <a:t>11/10/2021</a:t>
             </a:fld>
             <a:endParaRPr lang="en-NL"/>
           </a:p>
@@ -2538,7 +2628,7 @@
           <a:p>
             <a:fld id="{9C27045A-4E63-2949-8A05-DA4D85C37A94}" type="datetimeFigureOut">
               <a:rPr lang="en-NL" smtClean="0"/>
-              <a:t>26/05/2021</a:t>
+              <a:t>11/10/2021</a:t>
             </a:fld>
             <a:endParaRPr lang="en-NL"/>
           </a:p>
@@ -2851,7 +2941,7 @@
           <a:p>
             <a:fld id="{9C27045A-4E63-2949-8A05-DA4D85C37A94}" type="datetimeFigureOut">
               <a:rPr lang="en-NL" smtClean="0"/>
-              <a:t>26/05/2021</a:t>
+              <a:t>11/10/2021</a:t>
             </a:fld>
             <a:endParaRPr lang="en-NL"/>
           </a:p>
@@ -3140,7 +3230,7 @@
           <a:p>
             <a:fld id="{9C27045A-4E63-2949-8A05-DA4D85C37A94}" type="datetimeFigureOut">
               <a:rPr lang="en-NL" smtClean="0"/>
-              <a:t>26/05/2021</a:t>
+              <a:t>11/10/2021</a:t>
             </a:fld>
             <a:endParaRPr lang="en-NL"/>
           </a:p>
@@ -3383,7 +3473,7 @@
           <a:p>
             <a:fld id="{9C27045A-4E63-2949-8A05-DA4D85C37A94}" type="datetimeFigureOut">
               <a:rPr lang="en-NL" smtClean="0"/>
-              <a:t>26/05/2021</a:t>
+              <a:t>11/10/2021</a:t>
             </a:fld>
             <a:endParaRPr lang="en-NL"/>
           </a:p>
@@ -14235,6 +14325,2916 @@
     <p:extLst>
       <p:ext uri="{BB962C8B-B14F-4D97-AF65-F5344CB8AC3E}">
         <p14:creationId xmlns:p14="http://schemas.microsoft.com/office/powerpoint/2010/main" val="3373394754"/>
+      </p:ext>
+    </p:extLst>
+  </p:cSld>
+  <p:clrMapOvr>
+    <a:masterClrMapping/>
+  </p:clrMapOvr>
+</p:sld>
+</file>
+
+<file path=ppt/slides/slide5.xml><?xml version="1.0" encoding="utf-8"?>
+<p:sld xmlns:a="http://schemas.openxmlformats.org/drawingml/2006/main" xmlns:r="http://schemas.openxmlformats.org/officeDocument/2006/relationships" xmlns:p="http://schemas.openxmlformats.org/presentationml/2006/main">
+  <p:cSld>
+    <p:spTree>
+      <p:nvGrpSpPr>
+        <p:cNvPr id="1" name=""/>
+        <p:cNvGrpSpPr/>
+        <p:nvPr/>
+      </p:nvGrpSpPr>
+      <p:grpSpPr>
+        <a:xfrm>
+          <a:off x="0" y="0"/>
+          <a:ext cx="0" cy="0"/>
+          <a:chOff x="0" y="0"/>
+          <a:chExt cx="0" cy="0"/>
+        </a:xfrm>
+      </p:grpSpPr>
+      <p:sp>
+        <p:nvSpPr>
+          <p:cNvPr id="4" name="Rounded Rectangle 3">
+            <a:extLst>
+              <a:ext uri="{FF2B5EF4-FFF2-40B4-BE49-F238E27FC236}">
+                <a16:creationId xmlns:a16="http://schemas.microsoft.com/office/drawing/2014/main" id="{7C48F387-C0FB-1744-A07B-DCFCA8ED2C34}"/>
+              </a:ext>
+            </a:extLst>
+          </p:cNvPr>
+          <p:cNvSpPr/>
+          <p:nvPr/>
+        </p:nvSpPr>
+        <p:spPr>
+          <a:xfrm>
+            <a:off x="30876" y="24461"/>
+            <a:ext cx="2884607" cy="3743310"/>
+          </a:xfrm>
+          <a:prstGeom prst="roundRect">
+            <a:avLst>
+              <a:gd name="adj" fmla="val 2100"/>
+            </a:avLst>
+          </a:prstGeom>
+          <a:solidFill>
+            <a:srgbClr val="A6A6A6"/>
+          </a:solidFill>
+        </p:spPr>
+        <p:style>
+          <a:lnRef idx="2">
+            <a:schemeClr val="accent1">
+              <a:shade val="50000"/>
+            </a:schemeClr>
+          </a:lnRef>
+          <a:fillRef idx="1">
+            <a:schemeClr val="accent1"/>
+          </a:fillRef>
+          <a:effectRef idx="0">
+            <a:schemeClr val="accent1"/>
+          </a:effectRef>
+          <a:fontRef idx="minor">
+            <a:schemeClr val="lt1"/>
+          </a:fontRef>
+        </p:style>
+        <p:txBody>
+          <a:bodyPr rtlCol="0" anchor="t"/>
+          <a:lstStyle/>
+          <a:p>
+            <a:pPr algn="ctr"/>
+            <a:r>
+              <a:rPr lang="nl-NL" sz="1600" dirty="0">
+                <a:solidFill>
+                  <a:sysClr val="windowText" lastClr="000000"/>
+                </a:solidFill>
+              </a:rPr>
+              <a:t>Registratie &amp; Gebruik</a:t>
+            </a:r>
+            <a:endParaRPr lang="en-NL" sz="1600" dirty="0">
+              <a:solidFill>
+                <a:sysClr val="windowText" lastClr="000000"/>
+              </a:solidFill>
+            </a:endParaRPr>
+          </a:p>
+        </p:txBody>
+      </p:sp>
+      <p:sp>
+        <p:nvSpPr>
+          <p:cNvPr id="38" name="Rounded Rectangle 37">
+            <a:extLst>
+              <a:ext uri="{FF2B5EF4-FFF2-40B4-BE49-F238E27FC236}">
+                <a16:creationId xmlns:a16="http://schemas.microsoft.com/office/drawing/2014/main" id="{64AB7C67-AF7C-4D40-A632-BC5D568267BD}"/>
+              </a:ext>
+            </a:extLst>
+          </p:cNvPr>
+          <p:cNvSpPr/>
+          <p:nvPr/>
+        </p:nvSpPr>
+        <p:spPr>
+          <a:xfrm>
+            <a:off x="30876" y="3885783"/>
+            <a:ext cx="7375764" cy="2961827"/>
+          </a:xfrm>
+          <a:prstGeom prst="roundRect">
+            <a:avLst>
+              <a:gd name="adj" fmla="val 2100"/>
+            </a:avLst>
+          </a:prstGeom>
+          <a:solidFill>
+            <a:srgbClr val="A6A6A6"/>
+          </a:solidFill>
+        </p:spPr>
+        <p:style>
+          <a:lnRef idx="2">
+            <a:schemeClr val="accent1">
+              <a:shade val="50000"/>
+            </a:schemeClr>
+          </a:lnRef>
+          <a:fillRef idx="1">
+            <a:schemeClr val="accent1"/>
+          </a:fillRef>
+          <a:effectRef idx="0">
+            <a:schemeClr val="accent1"/>
+          </a:effectRef>
+          <a:fontRef idx="minor">
+            <a:schemeClr val="lt1"/>
+          </a:fontRef>
+        </p:style>
+        <p:txBody>
+          <a:bodyPr rtlCol="0" anchor="t"/>
+          <a:lstStyle/>
+          <a:p>
+            <a:r>
+              <a:rPr lang="nl-NL" sz="1600" dirty="0">
+                <a:solidFill>
+                  <a:sysClr val="windowText" lastClr="000000"/>
+                </a:solidFill>
+              </a:rPr>
+              <a:t>Verkeersstroom beheer</a:t>
+            </a:r>
+            <a:endParaRPr lang="en-NL" sz="1600" dirty="0">
+              <a:solidFill>
+                <a:sysClr val="windowText" lastClr="000000"/>
+              </a:solidFill>
+            </a:endParaRPr>
+          </a:p>
+        </p:txBody>
+      </p:sp>
+      <p:sp>
+        <p:nvSpPr>
+          <p:cNvPr id="53" name="Rounded Rectangle 52">
+            <a:extLst>
+              <a:ext uri="{FF2B5EF4-FFF2-40B4-BE49-F238E27FC236}">
+                <a16:creationId xmlns:a16="http://schemas.microsoft.com/office/drawing/2014/main" id="{E852891F-751B-8F4E-8F16-061050A7EC0C}"/>
+              </a:ext>
+            </a:extLst>
+          </p:cNvPr>
+          <p:cNvSpPr/>
+          <p:nvPr/>
+        </p:nvSpPr>
+        <p:spPr>
+          <a:xfrm>
+            <a:off x="81828" y="1370481"/>
+            <a:ext cx="2777677" cy="2320170"/>
+          </a:xfrm>
+          <a:prstGeom prst="roundRect">
+            <a:avLst>
+              <a:gd name="adj" fmla="val 2100"/>
+            </a:avLst>
+          </a:prstGeom>
+          <a:solidFill>
+            <a:srgbClr val="D9D9D9"/>
+          </a:solidFill>
+        </p:spPr>
+        <p:style>
+          <a:lnRef idx="2">
+            <a:schemeClr val="accent1">
+              <a:shade val="50000"/>
+            </a:schemeClr>
+          </a:lnRef>
+          <a:fillRef idx="1">
+            <a:schemeClr val="accent1"/>
+          </a:fillRef>
+          <a:effectRef idx="0">
+            <a:schemeClr val="accent1"/>
+          </a:effectRef>
+          <a:fontRef idx="minor">
+            <a:schemeClr val="lt1"/>
+          </a:fontRef>
+        </p:style>
+        <p:txBody>
+          <a:bodyPr rtlCol="0" anchor="t"/>
+          <a:lstStyle/>
+          <a:p>
+            <a:pPr algn="ctr"/>
+            <a:r>
+              <a:rPr lang="en-NL" sz="1400" dirty="0">
+                <a:solidFill>
+                  <a:sysClr val="windowText" lastClr="000000"/>
+                </a:solidFill>
+              </a:rPr>
+              <a:t>Ontdekken</a:t>
+            </a:r>
+          </a:p>
+        </p:txBody>
+      </p:sp>
+      <p:sp>
+        <p:nvSpPr>
+          <p:cNvPr id="5" name="Rounded Rectangle 4">
+            <a:extLst>
+              <a:ext uri="{FF2B5EF4-FFF2-40B4-BE49-F238E27FC236}">
+                <a16:creationId xmlns:a16="http://schemas.microsoft.com/office/drawing/2014/main" id="{86E0E427-3389-D24A-9559-2F0767B28EF5}"/>
+              </a:ext>
+            </a:extLst>
+          </p:cNvPr>
+          <p:cNvSpPr/>
+          <p:nvPr/>
+        </p:nvSpPr>
+        <p:spPr>
+          <a:xfrm>
+            <a:off x="150929" y="1678272"/>
+            <a:ext cx="1299434" cy="573336"/>
+          </a:xfrm>
+          <a:prstGeom prst="roundRect">
+            <a:avLst/>
+          </a:prstGeom>
+          <a:solidFill>
+            <a:srgbClr val="3A4298"/>
+          </a:solidFill>
+        </p:spPr>
+        <p:style>
+          <a:lnRef idx="2">
+            <a:schemeClr val="accent1">
+              <a:shade val="50000"/>
+            </a:schemeClr>
+          </a:lnRef>
+          <a:fillRef idx="1">
+            <a:schemeClr val="accent1"/>
+          </a:fillRef>
+          <a:effectRef idx="0">
+            <a:schemeClr val="accent1"/>
+          </a:effectRef>
+          <a:fontRef idx="minor">
+            <a:schemeClr val="lt1"/>
+          </a:fontRef>
+        </p:style>
+        <p:txBody>
+          <a:bodyPr rtlCol="0" anchor="ctr"/>
+          <a:lstStyle/>
+          <a:p>
+            <a:pPr algn="ctr"/>
+            <a:r>
+              <a:rPr lang="en-NL" sz="1200" dirty="0">
+                <a:latin typeface="+mj-lt"/>
+              </a:rPr>
+              <a:t>API Discovery</a:t>
+            </a:r>
+          </a:p>
+        </p:txBody>
+      </p:sp>
+      <p:sp>
+        <p:nvSpPr>
+          <p:cNvPr id="6" name="Rounded Rectangle 5">
+            <a:extLst>
+              <a:ext uri="{FF2B5EF4-FFF2-40B4-BE49-F238E27FC236}">
+                <a16:creationId xmlns:a16="http://schemas.microsoft.com/office/drawing/2014/main" id="{F3DD20AC-5BB9-5041-A56A-B6C74D072F27}"/>
+              </a:ext>
+            </a:extLst>
+          </p:cNvPr>
+          <p:cNvSpPr/>
+          <p:nvPr/>
+        </p:nvSpPr>
+        <p:spPr>
+          <a:xfrm>
+            <a:off x="150929" y="2328162"/>
+            <a:ext cx="1299434" cy="573336"/>
+          </a:xfrm>
+          <a:prstGeom prst="roundRect">
+            <a:avLst/>
+          </a:prstGeom>
+          <a:solidFill>
+            <a:srgbClr val="3A4298"/>
+          </a:solidFill>
+        </p:spPr>
+        <p:style>
+          <a:lnRef idx="2">
+            <a:schemeClr val="accent1">
+              <a:shade val="50000"/>
+            </a:schemeClr>
+          </a:lnRef>
+          <a:fillRef idx="1">
+            <a:schemeClr val="accent1"/>
+          </a:fillRef>
+          <a:effectRef idx="0">
+            <a:schemeClr val="accent1"/>
+          </a:effectRef>
+          <a:fontRef idx="minor">
+            <a:schemeClr val="lt1"/>
+          </a:fontRef>
+        </p:style>
+        <p:txBody>
+          <a:bodyPr rtlCol="0" anchor="ctr"/>
+          <a:lstStyle/>
+          <a:p>
+            <a:pPr algn="ctr"/>
+            <a:r>
+              <a:rPr lang="nl-NL" sz="1200" dirty="0">
+                <a:latin typeface="+mj-lt"/>
+              </a:rPr>
+              <a:t>Proeftuin / </a:t>
+            </a:r>
+            <a:r>
+              <a:rPr lang="nl-NL" sz="1200" dirty="0" err="1">
+                <a:latin typeface="+mj-lt"/>
+              </a:rPr>
+              <a:t>Sandbox</a:t>
+            </a:r>
+            <a:endParaRPr lang="en-NL" sz="1200" dirty="0">
+              <a:latin typeface="+mj-lt"/>
+            </a:endParaRPr>
+          </a:p>
+        </p:txBody>
+      </p:sp>
+      <p:sp>
+        <p:nvSpPr>
+          <p:cNvPr id="7" name="Rounded Rectangle 6">
+            <a:extLst>
+              <a:ext uri="{FF2B5EF4-FFF2-40B4-BE49-F238E27FC236}">
+                <a16:creationId xmlns:a16="http://schemas.microsoft.com/office/drawing/2014/main" id="{EB123578-E907-044D-A528-9A262A27CD96}"/>
+              </a:ext>
+            </a:extLst>
+          </p:cNvPr>
+          <p:cNvSpPr/>
+          <p:nvPr/>
+        </p:nvSpPr>
+        <p:spPr>
+          <a:xfrm>
+            <a:off x="1508901" y="1678272"/>
+            <a:ext cx="1299434" cy="573336"/>
+          </a:xfrm>
+          <a:prstGeom prst="roundRect">
+            <a:avLst/>
+          </a:prstGeom>
+          <a:solidFill>
+            <a:srgbClr val="3A4298"/>
+          </a:solidFill>
+        </p:spPr>
+        <p:style>
+          <a:lnRef idx="2">
+            <a:schemeClr val="accent1">
+              <a:shade val="50000"/>
+            </a:schemeClr>
+          </a:lnRef>
+          <a:fillRef idx="1">
+            <a:schemeClr val="accent1"/>
+          </a:fillRef>
+          <a:effectRef idx="0">
+            <a:schemeClr val="accent1"/>
+          </a:effectRef>
+          <a:fontRef idx="minor">
+            <a:schemeClr val="lt1"/>
+          </a:fontRef>
+        </p:style>
+        <p:txBody>
+          <a:bodyPr rtlCol="0" anchor="ctr"/>
+          <a:lstStyle/>
+          <a:p>
+            <a:pPr algn="ctr"/>
+            <a:r>
+              <a:rPr lang="nl-NL" sz="1200" dirty="0">
+                <a:latin typeface="+mj-lt"/>
+              </a:rPr>
+              <a:t>Specificatie &amp; D</a:t>
+            </a:r>
+            <a:r>
+              <a:rPr lang="en-NL" sz="1200" dirty="0">
+                <a:latin typeface="+mj-lt"/>
+              </a:rPr>
+              <a:t>ocumentatie</a:t>
+            </a:r>
+          </a:p>
+        </p:txBody>
+      </p:sp>
+      <p:sp>
+        <p:nvSpPr>
+          <p:cNvPr id="59" name="Rounded Rectangle 58">
+            <a:extLst>
+              <a:ext uri="{FF2B5EF4-FFF2-40B4-BE49-F238E27FC236}">
+                <a16:creationId xmlns:a16="http://schemas.microsoft.com/office/drawing/2014/main" id="{A708E40B-C400-D749-86D0-3C375F29DA7D}"/>
+              </a:ext>
+            </a:extLst>
+          </p:cNvPr>
+          <p:cNvSpPr/>
+          <p:nvPr/>
+        </p:nvSpPr>
+        <p:spPr>
+          <a:xfrm>
+            <a:off x="1508901" y="2328162"/>
+            <a:ext cx="1299434" cy="573336"/>
+          </a:xfrm>
+          <a:prstGeom prst="roundRect">
+            <a:avLst/>
+          </a:prstGeom>
+          <a:solidFill>
+            <a:srgbClr val="3A4298"/>
+          </a:solidFill>
+        </p:spPr>
+        <p:style>
+          <a:lnRef idx="2">
+            <a:schemeClr val="accent1">
+              <a:shade val="50000"/>
+            </a:schemeClr>
+          </a:lnRef>
+          <a:fillRef idx="1">
+            <a:schemeClr val="accent1"/>
+          </a:fillRef>
+          <a:effectRef idx="0">
+            <a:schemeClr val="accent1"/>
+          </a:effectRef>
+          <a:fontRef idx="minor">
+            <a:schemeClr val="lt1"/>
+          </a:fontRef>
+        </p:style>
+        <p:txBody>
+          <a:bodyPr rtlCol="0" anchor="ctr"/>
+          <a:lstStyle/>
+          <a:p>
+            <a:pPr algn="ctr"/>
+            <a:r>
+              <a:rPr lang="nl-NL" sz="1200" dirty="0">
+                <a:latin typeface="+mj-lt"/>
+              </a:rPr>
+              <a:t>Code voorbeelden &amp; </a:t>
+            </a:r>
+            <a:r>
+              <a:rPr lang="en-NL" sz="1200" dirty="0">
+                <a:latin typeface="+mj-lt"/>
+              </a:rPr>
+              <a:t>SDK</a:t>
+            </a:r>
+          </a:p>
+        </p:txBody>
+      </p:sp>
+      <p:sp>
+        <p:nvSpPr>
+          <p:cNvPr id="54" name="Rounded Rectangle 53">
+            <a:extLst>
+              <a:ext uri="{FF2B5EF4-FFF2-40B4-BE49-F238E27FC236}">
+                <a16:creationId xmlns:a16="http://schemas.microsoft.com/office/drawing/2014/main" id="{F48D20D8-D6EB-2046-BD6E-53F25FB03E25}"/>
+              </a:ext>
+            </a:extLst>
+          </p:cNvPr>
+          <p:cNvSpPr/>
+          <p:nvPr/>
+        </p:nvSpPr>
+        <p:spPr>
+          <a:xfrm>
+            <a:off x="81828" y="373862"/>
+            <a:ext cx="2777677" cy="944564"/>
+          </a:xfrm>
+          <a:prstGeom prst="roundRect">
+            <a:avLst>
+              <a:gd name="adj" fmla="val 2100"/>
+            </a:avLst>
+          </a:prstGeom>
+          <a:solidFill>
+            <a:srgbClr val="D9D9D9"/>
+          </a:solidFill>
+        </p:spPr>
+        <p:style>
+          <a:lnRef idx="2">
+            <a:schemeClr val="accent1">
+              <a:shade val="50000"/>
+            </a:schemeClr>
+          </a:lnRef>
+          <a:fillRef idx="1">
+            <a:schemeClr val="accent1"/>
+          </a:fillRef>
+          <a:effectRef idx="0">
+            <a:schemeClr val="accent1"/>
+          </a:effectRef>
+          <a:fontRef idx="minor">
+            <a:schemeClr val="lt1"/>
+          </a:fontRef>
+        </p:style>
+        <p:txBody>
+          <a:bodyPr rtlCol="0" anchor="t"/>
+          <a:lstStyle/>
+          <a:p>
+            <a:pPr algn="ctr"/>
+            <a:r>
+              <a:rPr lang="en-NL" sz="1400" dirty="0">
+                <a:solidFill>
+                  <a:sysClr val="windowText" lastClr="000000"/>
+                </a:solidFill>
+              </a:rPr>
+              <a:t>Aanmelden &amp; Registratie</a:t>
+            </a:r>
+          </a:p>
+        </p:txBody>
+      </p:sp>
+      <p:sp>
+        <p:nvSpPr>
+          <p:cNvPr id="8" name="Rounded Rectangle 7">
+            <a:extLst>
+              <a:ext uri="{FF2B5EF4-FFF2-40B4-BE49-F238E27FC236}">
+                <a16:creationId xmlns:a16="http://schemas.microsoft.com/office/drawing/2014/main" id="{450200C0-5DD2-E343-AF7F-2AF4A72E5E60}"/>
+              </a:ext>
+            </a:extLst>
+          </p:cNvPr>
+          <p:cNvSpPr/>
+          <p:nvPr/>
+        </p:nvSpPr>
+        <p:spPr>
+          <a:xfrm>
+            <a:off x="1508901" y="689401"/>
+            <a:ext cx="1299434" cy="573336"/>
+          </a:xfrm>
+          <a:prstGeom prst="roundRect">
+            <a:avLst/>
+          </a:prstGeom>
+          <a:solidFill>
+            <a:srgbClr val="3A4298"/>
+          </a:solidFill>
+        </p:spPr>
+        <p:style>
+          <a:lnRef idx="2">
+            <a:schemeClr val="accent1">
+              <a:shade val="50000"/>
+            </a:schemeClr>
+          </a:lnRef>
+          <a:fillRef idx="1">
+            <a:schemeClr val="accent1"/>
+          </a:fillRef>
+          <a:effectRef idx="0">
+            <a:schemeClr val="accent1"/>
+          </a:effectRef>
+          <a:fontRef idx="minor">
+            <a:schemeClr val="lt1"/>
+          </a:fontRef>
+        </p:style>
+        <p:txBody>
+          <a:bodyPr rtlCol="0" anchor="ctr"/>
+          <a:lstStyle/>
+          <a:p>
+            <a:pPr algn="ctr"/>
+            <a:r>
+              <a:rPr lang="nl-NL" sz="1200" dirty="0">
+                <a:latin typeface="+mj-lt"/>
+              </a:rPr>
+              <a:t>Applicatie registratie</a:t>
+            </a:r>
+            <a:endParaRPr lang="en-NL" sz="1200" dirty="0">
+              <a:latin typeface="+mj-lt"/>
+            </a:endParaRPr>
+          </a:p>
+        </p:txBody>
+      </p:sp>
+      <p:sp>
+        <p:nvSpPr>
+          <p:cNvPr id="9" name="Rounded Rectangle 8">
+            <a:extLst>
+              <a:ext uri="{FF2B5EF4-FFF2-40B4-BE49-F238E27FC236}">
+                <a16:creationId xmlns:a16="http://schemas.microsoft.com/office/drawing/2014/main" id="{302CB914-8FCC-D94F-98D1-3FC184057CEF}"/>
+              </a:ext>
+            </a:extLst>
+          </p:cNvPr>
+          <p:cNvSpPr/>
+          <p:nvPr/>
+        </p:nvSpPr>
+        <p:spPr>
+          <a:xfrm>
+            <a:off x="150929" y="689401"/>
+            <a:ext cx="1299434" cy="573336"/>
+          </a:xfrm>
+          <a:prstGeom prst="roundRect">
+            <a:avLst/>
+          </a:prstGeom>
+          <a:solidFill>
+            <a:srgbClr val="3A4298"/>
+          </a:solidFill>
+        </p:spPr>
+        <p:style>
+          <a:lnRef idx="2">
+            <a:schemeClr val="accent1">
+              <a:shade val="50000"/>
+            </a:schemeClr>
+          </a:lnRef>
+          <a:fillRef idx="1">
+            <a:schemeClr val="accent1"/>
+          </a:fillRef>
+          <a:effectRef idx="0">
+            <a:schemeClr val="accent1"/>
+          </a:effectRef>
+          <a:fontRef idx="minor">
+            <a:schemeClr val="lt1"/>
+          </a:fontRef>
+        </p:style>
+        <p:txBody>
+          <a:bodyPr rtlCol="0" anchor="ctr"/>
+          <a:lstStyle/>
+          <a:p>
+            <a:pPr algn="ctr"/>
+            <a:r>
+              <a:rPr lang="en-NL" sz="1200" dirty="0">
+                <a:latin typeface="+mj-lt"/>
+              </a:rPr>
+              <a:t>Ontwikkelaar onboarding</a:t>
+            </a:r>
+          </a:p>
+        </p:txBody>
+      </p:sp>
+      <p:sp>
+        <p:nvSpPr>
+          <p:cNvPr id="61" name="Rounded Rectangle 60">
+            <a:extLst>
+              <a:ext uri="{FF2B5EF4-FFF2-40B4-BE49-F238E27FC236}">
+                <a16:creationId xmlns:a16="http://schemas.microsoft.com/office/drawing/2014/main" id="{1883E248-0E21-E74F-96F8-11BB739EA99C}"/>
+              </a:ext>
+            </a:extLst>
+          </p:cNvPr>
+          <p:cNvSpPr/>
+          <p:nvPr/>
+        </p:nvSpPr>
+        <p:spPr>
+          <a:xfrm>
+            <a:off x="3008749" y="24462"/>
+            <a:ext cx="4397893" cy="3743309"/>
+          </a:xfrm>
+          <a:prstGeom prst="roundRect">
+            <a:avLst>
+              <a:gd name="adj" fmla="val 2100"/>
+            </a:avLst>
+          </a:prstGeom>
+          <a:solidFill>
+            <a:srgbClr val="A6A6A6"/>
+          </a:solidFill>
+        </p:spPr>
+        <p:style>
+          <a:lnRef idx="2">
+            <a:schemeClr val="accent1">
+              <a:shade val="50000"/>
+            </a:schemeClr>
+          </a:lnRef>
+          <a:fillRef idx="1">
+            <a:schemeClr val="accent1"/>
+          </a:fillRef>
+          <a:effectRef idx="0">
+            <a:schemeClr val="accent1"/>
+          </a:effectRef>
+          <a:fontRef idx="minor">
+            <a:schemeClr val="lt1"/>
+          </a:fontRef>
+        </p:style>
+        <p:txBody>
+          <a:bodyPr rtlCol="0" anchor="t"/>
+          <a:lstStyle/>
+          <a:p>
+            <a:pPr algn="ctr"/>
+            <a:r>
+              <a:rPr lang="nl-NL" sz="1600" dirty="0">
+                <a:solidFill>
+                  <a:sysClr val="windowText" lastClr="000000"/>
+                </a:solidFill>
+              </a:rPr>
+              <a:t>Realisatie &amp; Beheer</a:t>
+            </a:r>
+            <a:endParaRPr lang="en-NL" sz="1600" dirty="0">
+              <a:solidFill>
+                <a:sysClr val="windowText" lastClr="000000"/>
+              </a:solidFill>
+            </a:endParaRPr>
+          </a:p>
+        </p:txBody>
+      </p:sp>
+      <p:sp>
+        <p:nvSpPr>
+          <p:cNvPr id="78" name="Rounded Rectangle 67">
+            <a:extLst>
+              <a:ext uri="{FF2B5EF4-FFF2-40B4-BE49-F238E27FC236}">
+                <a16:creationId xmlns:a16="http://schemas.microsoft.com/office/drawing/2014/main" id="{3C0DA008-AD6A-A34A-9972-251A08D5611E}"/>
+              </a:ext>
+            </a:extLst>
+          </p:cNvPr>
+          <p:cNvSpPr/>
+          <p:nvPr/>
+        </p:nvSpPr>
+        <p:spPr>
+          <a:xfrm>
+            <a:off x="5966590" y="373864"/>
+            <a:ext cx="1404781" cy="2580666"/>
+          </a:xfrm>
+          <a:prstGeom prst="roundRect">
+            <a:avLst>
+              <a:gd name="adj" fmla="val 2100"/>
+            </a:avLst>
+          </a:prstGeom>
+          <a:solidFill>
+            <a:srgbClr val="D9D9D9"/>
+          </a:solidFill>
+        </p:spPr>
+        <p:style>
+          <a:lnRef idx="2">
+            <a:schemeClr val="accent1">
+              <a:shade val="50000"/>
+            </a:schemeClr>
+          </a:lnRef>
+          <a:fillRef idx="1">
+            <a:schemeClr val="accent1"/>
+          </a:fillRef>
+          <a:effectRef idx="0">
+            <a:schemeClr val="accent1"/>
+          </a:effectRef>
+          <a:fontRef idx="minor">
+            <a:schemeClr val="lt1"/>
+          </a:fontRef>
+        </p:style>
+        <p:txBody>
+          <a:bodyPr rtlCol="0" anchor="t"/>
+          <a:lstStyle/>
+          <a:p>
+            <a:pPr algn="ctr"/>
+            <a:r>
+              <a:rPr lang="nl-NL" sz="1400" dirty="0">
+                <a:solidFill>
+                  <a:sysClr val="windowText" lastClr="000000"/>
+                </a:solidFill>
+              </a:rPr>
+              <a:t>Platform beheer</a:t>
+            </a:r>
+            <a:endParaRPr lang="en-NL" sz="1400" dirty="0">
+              <a:solidFill>
+                <a:sysClr val="windowText" lastClr="000000"/>
+              </a:solidFill>
+            </a:endParaRPr>
+          </a:p>
+        </p:txBody>
+      </p:sp>
+      <p:sp>
+        <p:nvSpPr>
+          <p:cNvPr id="64" name="Rounded Rectangle 38">
+            <a:extLst>
+              <a:ext uri="{FF2B5EF4-FFF2-40B4-BE49-F238E27FC236}">
+                <a16:creationId xmlns:a16="http://schemas.microsoft.com/office/drawing/2014/main" id="{E5C27DE2-CC0B-574B-A955-49A95A2F0DCB}"/>
+              </a:ext>
+            </a:extLst>
+          </p:cNvPr>
+          <p:cNvSpPr/>
+          <p:nvPr/>
+        </p:nvSpPr>
+        <p:spPr>
+          <a:xfrm>
+            <a:off x="6019261" y="2342727"/>
+            <a:ext cx="1299434" cy="573336"/>
+          </a:xfrm>
+          <a:prstGeom prst="roundRect">
+            <a:avLst/>
+          </a:prstGeom>
+          <a:solidFill>
+            <a:srgbClr val="3A4298"/>
+          </a:solidFill>
+        </p:spPr>
+        <p:style>
+          <a:lnRef idx="2">
+            <a:schemeClr val="accent1">
+              <a:shade val="50000"/>
+            </a:schemeClr>
+          </a:lnRef>
+          <a:fillRef idx="1">
+            <a:schemeClr val="accent1"/>
+          </a:fillRef>
+          <a:effectRef idx="0">
+            <a:schemeClr val="accent1"/>
+          </a:effectRef>
+          <a:fontRef idx="minor">
+            <a:schemeClr val="lt1"/>
+          </a:fontRef>
+        </p:style>
+        <p:txBody>
+          <a:bodyPr rtlCol="0" anchor="ctr"/>
+          <a:lstStyle/>
+          <a:p>
+            <a:pPr algn="ctr"/>
+            <a:r>
+              <a:rPr lang="nl-NL" sz="1200" dirty="0">
+                <a:latin typeface="+mj-lt"/>
+              </a:rPr>
+              <a:t>Sleutelbeheer</a:t>
+            </a:r>
+          </a:p>
+        </p:txBody>
+      </p:sp>
+      <p:sp>
+        <p:nvSpPr>
+          <p:cNvPr id="67" name="Rounded Rectangle 38">
+            <a:extLst>
+              <a:ext uri="{FF2B5EF4-FFF2-40B4-BE49-F238E27FC236}">
+                <a16:creationId xmlns:a16="http://schemas.microsoft.com/office/drawing/2014/main" id="{E5C27DE2-CC0B-574B-A955-49A95A2F0DCB}"/>
+              </a:ext>
+            </a:extLst>
+          </p:cNvPr>
+          <p:cNvSpPr/>
+          <p:nvPr/>
+        </p:nvSpPr>
+        <p:spPr>
+          <a:xfrm>
+            <a:off x="6019261" y="1031758"/>
+            <a:ext cx="1299434" cy="573336"/>
+          </a:xfrm>
+          <a:prstGeom prst="roundRect">
+            <a:avLst/>
+          </a:prstGeom>
+          <a:solidFill>
+            <a:srgbClr val="3A4298"/>
+          </a:solidFill>
+        </p:spPr>
+        <p:style>
+          <a:lnRef idx="2">
+            <a:schemeClr val="accent1">
+              <a:shade val="50000"/>
+            </a:schemeClr>
+          </a:lnRef>
+          <a:fillRef idx="1">
+            <a:schemeClr val="accent1"/>
+          </a:fillRef>
+          <a:effectRef idx="0">
+            <a:schemeClr val="accent1"/>
+          </a:effectRef>
+          <a:fontRef idx="minor">
+            <a:schemeClr val="lt1"/>
+          </a:fontRef>
+        </p:style>
+        <p:txBody>
+          <a:bodyPr rtlCol="0" anchor="ctr"/>
+          <a:lstStyle/>
+          <a:p>
+            <a:pPr algn="ctr"/>
+            <a:r>
+              <a:rPr lang="nl-NL" sz="1200" dirty="0">
+                <a:latin typeface="+mj-lt"/>
+              </a:rPr>
+              <a:t>Toegangsbeheer</a:t>
+            </a:r>
+            <a:endParaRPr lang="en-NL" sz="1200" dirty="0">
+              <a:latin typeface="+mj-lt"/>
+            </a:endParaRPr>
+          </a:p>
+        </p:txBody>
+      </p:sp>
+      <p:sp>
+        <p:nvSpPr>
+          <p:cNvPr id="70" name="Rounded Rectangle 38">
+            <a:extLst>
+              <a:ext uri="{FF2B5EF4-FFF2-40B4-BE49-F238E27FC236}">
+                <a16:creationId xmlns:a16="http://schemas.microsoft.com/office/drawing/2014/main" id="{E5C27DE2-CC0B-574B-A955-49A95A2F0DCB}"/>
+              </a:ext>
+            </a:extLst>
+          </p:cNvPr>
+          <p:cNvSpPr/>
+          <p:nvPr/>
+        </p:nvSpPr>
+        <p:spPr>
+          <a:xfrm>
+            <a:off x="6019261" y="1698715"/>
+            <a:ext cx="1299434" cy="573336"/>
+          </a:xfrm>
+          <a:prstGeom prst="roundRect">
+            <a:avLst/>
+          </a:prstGeom>
+          <a:solidFill>
+            <a:srgbClr val="3A4298"/>
+          </a:solidFill>
+        </p:spPr>
+        <p:style>
+          <a:lnRef idx="2">
+            <a:schemeClr val="accent1">
+              <a:shade val="50000"/>
+            </a:schemeClr>
+          </a:lnRef>
+          <a:fillRef idx="1">
+            <a:schemeClr val="accent1"/>
+          </a:fillRef>
+          <a:effectRef idx="0">
+            <a:schemeClr val="accent1"/>
+          </a:effectRef>
+          <a:fontRef idx="minor">
+            <a:schemeClr val="lt1"/>
+          </a:fontRef>
+        </p:style>
+        <p:txBody>
+          <a:bodyPr rtlCol="0" anchor="ctr"/>
+          <a:lstStyle/>
+          <a:p>
+            <a:pPr algn="ctr"/>
+            <a:r>
+              <a:rPr lang="nl-NL" sz="1200" dirty="0">
+                <a:latin typeface="+mj-lt"/>
+              </a:rPr>
+              <a:t>Gateway beheer</a:t>
+            </a:r>
+            <a:endParaRPr lang="en-NL" sz="1200" dirty="0">
+              <a:latin typeface="+mj-lt"/>
+            </a:endParaRPr>
+          </a:p>
+        </p:txBody>
+      </p:sp>
+      <p:sp>
+        <p:nvSpPr>
+          <p:cNvPr id="80" name="Rounded Rectangle 57">
+            <a:extLst>
+              <a:ext uri="{FF2B5EF4-FFF2-40B4-BE49-F238E27FC236}">
+                <a16:creationId xmlns:a16="http://schemas.microsoft.com/office/drawing/2014/main" id="{351800BB-D8F5-DD4E-B04D-EFCA44C52CF1}"/>
+              </a:ext>
+            </a:extLst>
+          </p:cNvPr>
+          <p:cNvSpPr/>
+          <p:nvPr/>
+        </p:nvSpPr>
+        <p:spPr>
+          <a:xfrm>
+            <a:off x="1518195" y="3055171"/>
+            <a:ext cx="1299434" cy="573336"/>
+          </a:xfrm>
+          <a:prstGeom prst="roundRect">
+            <a:avLst/>
+          </a:prstGeom>
+          <a:solidFill>
+            <a:srgbClr val="3A4298"/>
+          </a:solidFill>
+        </p:spPr>
+        <p:style>
+          <a:lnRef idx="2">
+            <a:schemeClr val="accent1">
+              <a:shade val="50000"/>
+            </a:schemeClr>
+          </a:lnRef>
+          <a:fillRef idx="1">
+            <a:schemeClr val="accent1"/>
+          </a:fillRef>
+          <a:effectRef idx="0">
+            <a:schemeClr val="accent1"/>
+          </a:effectRef>
+          <a:fontRef idx="minor">
+            <a:schemeClr val="lt1"/>
+          </a:fontRef>
+        </p:style>
+        <p:txBody>
+          <a:bodyPr rtlCol="0" anchor="ctr"/>
+          <a:lstStyle/>
+          <a:p>
+            <a:pPr algn="ctr"/>
+            <a:r>
+              <a:rPr lang="nl-NL" sz="1200" dirty="0">
+                <a:latin typeface="+mj-lt"/>
+              </a:rPr>
+              <a:t>Kennisdeling &amp; Ondersteuning</a:t>
+            </a:r>
+            <a:endParaRPr lang="en-NL" sz="1200" dirty="0">
+              <a:latin typeface="+mj-lt"/>
+            </a:endParaRPr>
+          </a:p>
+        </p:txBody>
+      </p:sp>
+      <p:sp>
+        <p:nvSpPr>
+          <p:cNvPr id="68" name="Rounded Rectangle 67">
+            <a:extLst>
+              <a:ext uri="{FF2B5EF4-FFF2-40B4-BE49-F238E27FC236}">
+                <a16:creationId xmlns:a16="http://schemas.microsoft.com/office/drawing/2014/main" id="{3C0DA008-AD6A-A34A-9972-251A08D5611E}"/>
+              </a:ext>
+            </a:extLst>
+          </p:cNvPr>
+          <p:cNvSpPr/>
+          <p:nvPr/>
+        </p:nvSpPr>
+        <p:spPr>
+          <a:xfrm>
+            <a:off x="3055014" y="373863"/>
+            <a:ext cx="1404781" cy="3316789"/>
+          </a:xfrm>
+          <a:prstGeom prst="roundRect">
+            <a:avLst>
+              <a:gd name="adj" fmla="val 2100"/>
+            </a:avLst>
+          </a:prstGeom>
+          <a:solidFill>
+            <a:srgbClr val="D9D9D9"/>
+          </a:solidFill>
+        </p:spPr>
+        <p:style>
+          <a:lnRef idx="2">
+            <a:schemeClr val="accent1">
+              <a:shade val="50000"/>
+            </a:schemeClr>
+          </a:lnRef>
+          <a:fillRef idx="1">
+            <a:schemeClr val="accent1"/>
+          </a:fillRef>
+          <a:effectRef idx="0">
+            <a:schemeClr val="accent1"/>
+          </a:effectRef>
+          <a:fontRef idx="minor">
+            <a:schemeClr val="lt1"/>
+          </a:fontRef>
+        </p:style>
+        <p:txBody>
+          <a:bodyPr rtlCol="0" anchor="t"/>
+          <a:lstStyle/>
+          <a:p>
+            <a:pPr algn="ctr"/>
+            <a:r>
+              <a:rPr lang="nl-NL" sz="1400" dirty="0">
+                <a:solidFill>
+                  <a:sysClr val="windowText" lastClr="000000"/>
+                </a:solidFill>
+              </a:rPr>
+              <a:t>Realisatie</a:t>
+            </a:r>
+            <a:endParaRPr lang="en-NL" sz="1400" dirty="0">
+              <a:solidFill>
+                <a:sysClr val="windowText" lastClr="000000"/>
+              </a:solidFill>
+            </a:endParaRPr>
+          </a:p>
+        </p:txBody>
+      </p:sp>
+      <p:sp>
+        <p:nvSpPr>
+          <p:cNvPr id="26" name="Rounded Rectangle 25">
+            <a:extLst>
+              <a:ext uri="{FF2B5EF4-FFF2-40B4-BE49-F238E27FC236}">
+                <a16:creationId xmlns:a16="http://schemas.microsoft.com/office/drawing/2014/main" id="{8F1B430A-C5D1-9346-B807-C0F1396288F3}"/>
+              </a:ext>
+            </a:extLst>
+          </p:cNvPr>
+          <p:cNvSpPr/>
+          <p:nvPr/>
+        </p:nvSpPr>
+        <p:spPr>
+          <a:xfrm>
+            <a:off x="3120513" y="1031758"/>
+            <a:ext cx="1299434" cy="573336"/>
+          </a:xfrm>
+          <a:prstGeom prst="roundRect">
+            <a:avLst/>
+          </a:prstGeom>
+          <a:solidFill>
+            <a:srgbClr val="3A4298"/>
+          </a:solidFill>
+        </p:spPr>
+        <p:style>
+          <a:lnRef idx="2">
+            <a:schemeClr val="accent1">
+              <a:shade val="50000"/>
+            </a:schemeClr>
+          </a:lnRef>
+          <a:fillRef idx="1">
+            <a:schemeClr val="accent1"/>
+          </a:fillRef>
+          <a:effectRef idx="0">
+            <a:schemeClr val="accent1"/>
+          </a:effectRef>
+          <a:fontRef idx="minor">
+            <a:schemeClr val="lt1"/>
+          </a:fontRef>
+        </p:style>
+        <p:txBody>
+          <a:bodyPr rtlCol="0" anchor="ctr"/>
+          <a:lstStyle/>
+          <a:p>
+            <a:pPr algn="ctr"/>
+            <a:r>
+              <a:rPr lang="en-NL" sz="1200" dirty="0">
+                <a:latin typeface="+mj-lt"/>
+              </a:rPr>
+              <a:t>Ontwerp</a:t>
+            </a:r>
+          </a:p>
+        </p:txBody>
+      </p:sp>
+      <p:sp>
+        <p:nvSpPr>
+          <p:cNvPr id="27" name="Rounded Rectangle 26">
+            <a:extLst>
+              <a:ext uri="{FF2B5EF4-FFF2-40B4-BE49-F238E27FC236}">
+                <a16:creationId xmlns:a16="http://schemas.microsoft.com/office/drawing/2014/main" id="{9AFD52BC-AB61-C443-8316-1ACBA1500810}"/>
+              </a:ext>
+            </a:extLst>
+          </p:cNvPr>
+          <p:cNvSpPr/>
+          <p:nvPr/>
+        </p:nvSpPr>
+        <p:spPr>
+          <a:xfrm>
+            <a:off x="3120513" y="1680523"/>
+            <a:ext cx="1299434" cy="573336"/>
+          </a:xfrm>
+          <a:prstGeom prst="roundRect">
+            <a:avLst/>
+          </a:prstGeom>
+          <a:solidFill>
+            <a:srgbClr val="3A4298"/>
+          </a:solidFill>
+        </p:spPr>
+        <p:style>
+          <a:lnRef idx="2">
+            <a:schemeClr val="accent1">
+              <a:shade val="50000"/>
+            </a:schemeClr>
+          </a:lnRef>
+          <a:fillRef idx="1">
+            <a:schemeClr val="accent1"/>
+          </a:fillRef>
+          <a:effectRef idx="0">
+            <a:schemeClr val="accent1"/>
+          </a:effectRef>
+          <a:fontRef idx="minor">
+            <a:schemeClr val="lt1"/>
+          </a:fontRef>
+        </p:style>
+        <p:txBody>
+          <a:bodyPr rtlCol="0" anchor="ctr"/>
+          <a:lstStyle/>
+          <a:p>
+            <a:pPr algn="ctr"/>
+            <a:r>
+              <a:rPr lang="nl-NL" sz="1200" dirty="0">
+                <a:latin typeface="+mj-lt"/>
+              </a:rPr>
+              <a:t>Ontwikkeling</a:t>
+            </a:r>
+            <a:endParaRPr lang="en-NL" sz="1200" dirty="0">
+              <a:latin typeface="+mj-lt"/>
+            </a:endParaRPr>
+          </a:p>
+        </p:txBody>
+      </p:sp>
+      <p:sp>
+        <p:nvSpPr>
+          <p:cNvPr id="39" name="Rounded Rectangle 38">
+            <a:extLst>
+              <a:ext uri="{FF2B5EF4-FFF2-40B4-BE49-F238E27FC236}">
+                <a16:creationId xmlns:a16="http://schemas.microsoft.com/office/drawing/2014/main" id="{E5C27DE2-CC0B-574B-A955-49A95A2F0DCB}"/>
+              </a:ext>
+            </a:extLst>
+          </p:cNvPr>
+          <p:cNvSpPr/>
+          <p:nvPr/>
+        </p:nvSpPr>
+        <p:spPr>
+          <a:xfrm>
+            <a:off x="3120513" y="3055171"/>
+            <a:ext cx="1299434" cy="573336"/>
+          </a:xfrm>
+          <a:prstGeom prst="roundRect">
+            <a:avLst/>
+          </a:prstGeom>
+          <a:solidFill>
+            <a:srgbClr val="3A4298"/>
+          </a:solidFill>
+        </p:spPr>
+        <p:style>
+          <a:lnRef idx="2">
+            <a:schemeClr val="accent1">
+              <a:shade val="50000"/>
+            </a:schemeClr>
+          </a:lnRef>
+          <a:fillRef idx="1">
+            <a:schemeClr val="accent1"/>
+          </a:fillRef>
+          <a:effectRef idx="0">
+            <a:schemeClr val="accent1"/>
+          </a:effectRef>
+          <a:fontRef idx="minor">
+            <a:schemeClr val="lt1"/>
+          </a:fontRef>
+        </p:style>
+        <p:txBody>
+          <a:bodyPr rtlCol="0" anchor="ctr"/>
+          <a:lstStyle/>
+          <a:p>
+            <a:pPr algn="ctr"/>
+            <a:r>
+              <a:rPr lang="en-NL" sz="1200" dirty="0">
+                <a:latin typeface="+mj-lt"/>
+              </a:rPr>
+              <a:t>Policy Definitie</a:t>
+            </a:r>
+          </a:p>
+        </p:txBody>
+      </p:sp>
+      <p:sp>
+        <p:nvSpPr>
+          <p:cNvPr id="43" name="Rounded Rectangle 26">
+            <a:extLst>
+              <a:ext uri="{FF2B5EF4-FFF2-40B4-BE49-F238E27FC236}">
+                <a16:creationId xmlns:a16="http://schemas.microsoft.com/office/drawing/2014/main" id="{9AFD52BC-AB61-C443-8316-1ACBA1500810}"/>
+              </a:ext>
+            </a:extLst>
+          </p:cNvPr>
+          <p:cNvSpPr/>
+          <p:nvPr/>
+        </p:nvSpPr>
+        <p:spPr>
+          <a:xfrm>
+            <a:off x="3120513" y="2329288"/>
+            <a:ext cx="1299434" cy="573336"/>
+          </a:xfrm>
+          <a:prstGeom prst="roundRect">
+            <a:avLst/>
+          </a:prstGeom>
+          <a:solidFill>
+            <a:srgbClr val="3A4298"/>
+          </a:solidFill>
+        </p:spPr>
+        <p:style>
+          <a:lnRef idx="2">
+            <a:schemeClr val="accent1">
+              <a:shade val="50000"/>
+            </a:schemeClr>
+          </a:lnRef>
+          <a:fillRef idx="1">
+            <a:schemeClr val="accent1"/>
+          </a:fillRef>
+          <a:effectRef idx="0">
+            <a:schemeClr val="accent1"/>
+          </a:effectRef>
+          <a:fontRef idx="minor">
+            <a:schemeClr val="lt1"/>
+          </a:fontRef>
+        </p:style>
+        <p:txBody>
+          <a:bodyPr rtlCol="0" anchor="ctr"/>
+          <a:lstStyle/>
+          <a:p>
+            <a:pPr algn="ctr"/>
+            <a:r>
+              <a:rPr lang="nl-NL" sz="1200" dirty="0">
+                <a:latin typeface="+mj-lt"/>
+              </a:rPr>
+              <a:t>Test</a:t>
+            </a:r>
+            <a:endParaRPr lang="en-NL" sz="1200" dirty="0">
+              <a:latin typeface="+mj-lt"/>
+            </a:endParaRPr>
+          </a:p>
+        </p:txBody>
+      </p:sp>
+      <p:sp>
+        <p:nvSpPr>
+          <p:cNvPr id="56" name="Vrije vorm 55">
+            <a:extLst>
+              <a:ext uri="{FF2B5EF4-FFF2-40B4-BE49-F238E27FC236}">
+                <a16:creationId xmlns:a16="http://schemas.microsoft.com/office/drawing/2014/main" id="{3C0DA008-AD6A-A34A-9972-251A08D5611E}"/>
+              </a:ext>
+            </a:extLst>
+          </p:cNvPr>
+          <p:cNvSpPr/>
+          <p:nvPr/>
+        </p:nvSpPr>
+        <p:spPr>
+          <a:xfrm>
+            <a:off x="4510801" y="2445745"/>
+            <a:ext cx="2858900" cy="1244906"/>
+          </a:xfrm>
+          <a:custGeom>
+            <a:avLst/>
+            <a:gdLst>
+              <a:gd name="connsiteX0" fmla="*/ 26143 w 2858900"/>
+              <a:gd name="connsiteY0" fmla="*/ 0 h 1244906"/>
+              <a:gd name="connsiteX1" fmla="*/ 1378638 w 2858900"/>
+              <a:gd name="connsiteY1" fmla="*/ 0 h 1244906"/>
+              <a:gd name="connsiteX2" fmla="*/ 1404781 w 2858900"/>
+              <a:gd name="connsiteY2" fmla="*/ 26143 h 1244906"/>
+              <a:gd name="connsiteX3" fmla="*/ 1404781 w 2858900"/>
+              <a:gd name="connsiteY3" fmla="*/ 532307 h 1244906"/>
+              <a:gd name="connsiteX4" fmla="*/ 2843935 w 2858900"/>
+              <a:gd name="connsiteY4" fmla="*/ 532307 h 1244906"/>
+              <a:gd name="connsiteX5" fmla="*/ 2858900 w 2858900"/>
+              <a:gd name="connsiteY5" fmla="*/ 547272 h 1244906"/>
+              <a:gd name="connsiteX6" fmla="*/ 2858900 w 2858900"/>
+              <a:gd name="connsiteY6" fmla="*/ 1229941 h 1244906"/>
+              <a:gd name="connsiteX7" fmla="*/ 2843935 w 2858900"/>
+              <a:gd name="connsiteY7" fmla="*/ 1244906 h 1244906"/>
+              <a:gd name="connsiteX8" fmla="*/ 1378638 w 2858900"/>
+              <a:gd name="connsiteY8" fmla="*/ 1244906 h 1244906"/>
+              <a:gd name="connsiteX9" fmla="*/ 67636 w 2858900"/>
+              <a:gd name="connsiteY9" fmla="*/ 1244906 h 1244906"/>
+              <a:gd name="connsiteX10" fmla="*/ 26143 w 2858900"/>
+              <a:gd name="connsiteY10" fmla="*/ 1244906 h 1244906"/>
+              <a:gd name="connsiteX11" fmla="*/ 0 w 2858900"/>
+              <a:gd name="connsiteY11" fmla="*/ 1218763 h 1244906"/>
+              <a:gd name="connsiteX12" fmla="*/ 0 w 2858900"/>
+              <a:gd name="connsiteY12" fmla="*/ 26143 h 1244906"/>
+              <a:gd name="connsiteX13" fmla="*/ 26143 w 2858900"/>
+              <a:gd name="connsiteY13" fmla="*/ 0 h 1244906"/>
+            </a:gdLst>
+            <a:ahLst/>
+            <a:cxnLst>
+              <a:cxn ang="0">
+                <a:pos x="connsiteX0" y="connsiteY0"/>
+              </a:cxn>
+              <a:cxn ang="0">
+                <a:pos x="connsiteX1" y="connsiteY1"/>
+              </a:cxn>
+              <a:cxn ang="0">
+                <a:pos x="connsiteX2" y="connsiteY2"/>
+              </a:cxn>
+              <a:cxn ang="0">
+                <a:pos x="connsiteX3" y="connsiteY3"/>
+              </a:cxn>
+              <a:cxn ang="0">
+                <a:pos x="connsiteX4" y="connsiteY4"/>
+              </a:cxn>
+              <a:cxn ang="0">
+                <a:pos x="connsiteX5" y="connsiteY5"/>
+              </a:cxn>
+              <a:cxn ang="0">
+                <a:pos x="connsiteX6" y="connsiteY6"/>
+              </a:cxn>
+              <a:cxn ang="0">
+                <a:pos x="connsiteX7" y="connsiteY7"/>
+              </a:cxn>
+              <a:cxn ang="0">
+                <a:pos x="connsiteX8" y="connsiteY8"/>
+              </a:cxn>
+              <a:cxn ang="0">
+                <a:pos x="connsiteX9" y="connsiteY9"/>
+              </a:cxn>
+              <a:cxn ang="0">
+                <a:pos x="connsiteX10" y="connsiteY10"/>
+              </a:cxn>
+              <a:cxn ang="0">
+                <a:pos x="connsiteX11" y="connsiteY11"/>
+              </a:cxn>
+              <a:cxn ang="0">
+                <a:pos x="connsiteX12" y="connsiteY12"/>
+              </a:cxn>
+              <a:cxn ang="0">
+                <a:pos x="connsiteX13" y="connsiteY13"/>
+              </a:cxn>
+            </a:cxnLst>
+            <a:rect l="l" t="t" r="r" b="b"/>
+            <a:pathLst>
+              <a:path w="2858900" h="1244906">
+                <a:moveTo>
+                  <a:pt x="26143" y="0"/>
+                </a:moveTo>
+                <a:lnTo>
+                  <a:pt x="1378638" y="0"/>
+                </a:lnTo>
+                <a:cubicBezTo>
+                  <a:pt x="1393076" y="0"/>
+                  <a:pt x="1404781" y="11705"/>
+                  <a:pt x="1404781" y="26143"/>
+                </a:cubicBezTo>
+                <a:lnTo>
+                  <a:pt x="1404781" y="532307"/>
+                </a:lnTo>
+                <a:lnTo>
+                  <a:pt x="2843935" y="532307"/>
+                </a:lnTo>
+                <a:cubicBezTo>
+                  <a:pt x="2852200" y="532307"/>
+                  <a:pt x="2858900" y="539007"/>
+                  <a:pt x="2858900" y="547272"/>
+                </a:cubicBezTo>
+                <a:lnTo>
+                  <a:pt x="2858900" y="1229941"/>
+                </a:lnTo>
+                <a:cubicBezTo>
+                  <a:pt x="2858900" y="1238206"/>
+                  <a:pt x="2852200" y="1244906"/>
+                  <a:pt x="2843935" y="1244906"/>
+                </a:cubicBezTo>
+                <a:lnTo>
+                  <a:pt x="1378638" y="1244906"/>
+                </a:lnTo>
+                <a:lnTo>
+                  <a:pt x="67636" y="1244906"/>
+                </a:lnTo>
+                <a:lnTo>
+                  <a:pt x="26143" y="1244906"/>
+                </a:lnTo>
+                <a:cubicBezTo>
+                  <a:pt x="11705" y="1244906"/>
+                  <a:pt x="0" y="1233201"/>
+                  <a:pt x="0" y="1218763"/>
+                </a:cubicBezTo>
+                <a:lnTo>
+                  <a:pt x="0" y="26143"/>
+                </a:lnTo>
+                <a:cubicBezTo>
+                  <a:pt x="0" y="11705"/>
+                  <a:pt x="11705" y="0"/>
+                  <a:pt x="26143" y="0"/>
+                </a:cubicBezTo>
+                <a:close/>
+              </a:path>
+            </a:pathLst>
+          </a:custGeom>
+          <a:solidFill>
+            <a:srgbClr val="D9D9D9"/>
+          </a:solidFill>
+        </p:spPr>
+        <p:style>
+          <a:lnRef idx="2">
+            <a:schemeClr val="accent1">
+              <a:shade val="50000"/>
+            </a:schemeClr>
+          </a:lnRef>
+          <a:fillRef idx="1">
+            <a:schemeClr val="accent1"/>
+          </a:fillRef>
+          <a:effectRef idx="0">
+            <a:schemeClr val="accent1"/>
+          </a:effectRef>
+          <a:fontRef idx="minor">
+            <a:schemeClr val="lt1"/>
+          </a:fontRef>
+        </p:style>
+        <p:txBody>
+          <a:bodyPr wrap="square" rtlCol="0" anchor="t">
+            <a:noAutofit/>
+          </a:bodyPr>
+          <a:lstStyle/>
+          <a:p>
+            <a:pPr algn="ctr"/>
+            <a:endParaRPr lang="en-NL" sz="1400" dirty="0">
+              <a:solidFill>
+                <a:sysClr val="windowText" lastClr="000000"/>
+              </a:solidFill>
+            </a:endParaRPr>
+          </a:p>
+        </p:txBody>
+      </p:sp>
+      <p:sp>
+        <p:nvSpPr>
+          <p:cNvPr id="12" name="Rounded Rectangle 11">
+            <a:extLst>
+              <a:ext uri="{FF2B5EF4-FFF2-40B4-BE49-F238E27FC236}">
+                <a16:creationId xmlns:a16="http://schemas.microsoft.com/office/drawing/2014/main" id="{25BFF694-07BA-614A-BE59-5071E564B2A3}"/>
+              </a:ext>
+            </a:extLst>
+          </p:cNvPr>
+          <p:cNvSpPr/>
+          <p:nvPr/>
+        </p:nvSpPr>
+        <p:spPr>
+          <a:xfrm>
+            <a:off x="6019261" y="3055171"/>
+            <a:ext cx="1299434" cy="573336"/>
+          </a:xfrm>
+          <a:prstGeom prst="roundRect">
+            <a:avLst/>
+          </a:prstGeom>
+          <a:solidFill>
+            <a:srgbClr val="3A4298"/>
+          </a:solidFill>
+        </p:spPr>
+        <p:style>
+          <a:lnRef idx="2">
+            <a:schemeClr val="accent1">
+              <a:shade val="50000"/>
+            </a:schemeClr>
+          </a:lnRef>
+          <a:fillRef idx="1">
+            <a:schemeClr val="accent1"/>
+          </a:fillRef>
+          <a:effectRef idx="0">
+            <a:schemeClr val="accent1"/>
+          </a:effectRef>
+          <a:fontRef idx="minor">
+            <a:schemeClr val="lt1"/>
+          </a:fontRef>
+        </p:style>
+        <p:txBody>
+          <a:bodyPr rtlCol="0" anchor="ctr"/>
+          <a:lstStyle/>
+          <a:p>
+            <a:pPr algn="ctr"/>
+            <a:r>
+              <a:rPr lang="nl-NL" sz="1200" dirty="0" err="1">
+                <a:latin typeface="+mj-lt"/>
+              </a:rPr>
+              <a:t>Versionering</a:t>
+            </a:r>
+            <a:endParaRPr lang="en-NL" sz="1200" dirty="0">
+              <a:latin typeface="+mj-lt"/>
+            </a:endParaRPr>
+          </a:p>
+        </p:txBody>
+      </p:sp>
+      <p:sp>
+        <p:nvSpPr>
+          <p:cNvPr id="62" name="Rounded Rectangle 61">
+            <a:extLst>
+              <a:ext uri="{FF2B5EF4-FFF2-40B4-BE49-F238E27FC236}">
+                <a16:creationId xmlns:a16="http://schemas.microsoft.com/office/drawing/2014/main" id="{4131E2F9-4AFD-C64A-ACB3-397DDBCDF606}"/>
+              </a:ext>
+            </a:extLst>
+          </p:cNvPr>
+          <p:cNvSpPr/>
+          <p:nvPr/>
+        </p:nvSpPr>
+        <p:spPr>
+          <a:xfrm>
+            <a:off x="4563473" y="3055171"/>
+            <a:ext cx="1299434" cy="573336"/>
+          </a:xfrm>
+          <a:prstGeom prst="roundRect">
+            <a:avLst/>
+          </a:prstGeom>
+          <a:solidFill>
+            <a:srgbClr val="3A4298"/>
+          </a:solidFill>
+        </p:spPr>
+        <p:style>
+          <a:lnRef idx="2">
+            <a:schemeClr val="accent1">
+              <a:shade val="50000"/>
+            </a:schemeClr>
+          </a:lnRef>
+          <a:fillRef idx="1">
+            <a:schemeClr val="accent1"/>
+          </a:fillRef>
+          <a:effectRef idx="0">
+            <a:schemeClr val="accent1"/>
+          </a:effectRef>
+          <a:fontRef idx="minor">
+            <a:schemeClr val="lt1"/>
+          </a:fontRef>
+        </p:style>
+        <p:txBody>
+          <a:bodyPr rtlCol="0" anchor="ctr"/>
+          <a:lstStyle/>
+          <a:p>
+            <a:pPr algn="ctr"/>
+            <a:r>
+              <a:rPr lang="nl-NL" sz="1200" dirty="0">
+                <a:latin typeface="+mj-lt"/>
+              </a:rPr>
+              <a:t>API </a:t>
+            </a:r>
+            <a:r>
+              <a:rPr lang="nl-NL" sz="1200" dirty="0" err="1">
+                <a:latin typeface="+mj-lt"/>
+              </a:rPr>
+              <a:t>Lifecycle</a:t>
+            </a:r>
+            <a:r>
+              <a:rPr lang="nl-NL" sz="1200" dirty="0">
+                <a:latin typeface="+mj-lt"/>
+              </a:rPr>
+              <a:t> beheer</a:t>
+            </a:r>
+            <a:endParaRPr lang="en-NL" sz="1200" dirty="0">
+              <a:latin typeface="+mj-lt"/>
+            </a:endParaRPr>
+          </a:p>
+        </p:txBody>
+      </p:sp>
+      <p:sp>
+        <p:nvSpPr>
+          <p:cNvPr id="46" name="Rounded Rectangle 45">
+            <a:extLst>
+              <a:ext uri="{FF2B5EF4-FFF2-40B4-BE49-F238E27FC236}">
+                <a16:creationId xmlns:a16="http://schemas.microsoft.com/office/drawing/2014/main" id="{D4DBBAC5-FF20-DE49-94BD-345D6456E9CC}"/>
+              </a:ext>
+            </a:extLst>
+          </p:cNvPr>
+          <p:cNvSpPr/>
+          <p:nvPr/>
+        </p:nvSpPr>
+        <p:spPr>
+          <a:xfrm>
+            <a:off x="81828" y="4228508"/>
+            <a:ext cx="2777677" cy="2518457"/>
+          </a:xfrm>
+          <a:prstGeom prst="roundRect">
+            <a:avLst>
+              <a:gd name="adj" fmla="val 2100"/>
+            </a:avLst>
+          </a:prstGeom>
+          <a:solidFill>
+            <a:srgbClr val="D9D9D9"/>
+          </a:solidFill>
+        </p:spPr>
+        <p:style>
+          <a:lnRef idx="2">
+            <a:schemeClr val="accent1">
+              <a:shade val="50000"/>
+            </a:schemeClr>
+          </a:lnRef>
+          <a:fillRef idx="1">
+            <a:schemeClr val="accent1"/>
+          </a:fillRef>
+          <a:effectRef idx="0">
+            <a:schemeClr val="accent1"/>
+          </a:effectRef>
+          <a:fontRef idx="minor">
+            <a:schemeClr val="lt1"/>
+          </a:fontRef>
+        </p:style>
+        <p:txBody>
+          <a:bodyPr rtlCol="0" anchor="t"/>
+          <a:lstStyle/>
+          <a:p>
+            <a:pPr algn="ctr"/>
+            <a:r>
+              <a:rPr lang="en-NL" sz="1400" dirty="0">
+                <a:solidFill>
+                  <a:sysClr val="windowText" lastClr="000000"/>
+                </a:solidFill>
+              </a:rPr>
+              <a:t>Mediatie &amp; Orkestratie</a:t>
+            </a:r>
+          </a:p>
+        </p:txBody>
+      </p:sp>
+      <p:sp>
+        <p:nvSpPr>
+          <p:cNvPr id="47" name="Rounded Rectangle 46">
+            <a:extLst>
+              <a:ext uri="{FF2B5EF4-FFF2-40B4-BE49-F238E27FC236}">
+                <a16:creationId xmlns:a16="http://schemas.microsoft.com/office/drawing/2014/main" id="{86C16288-B110-BD46-9733-EF75F675AF35}"/>
+              </a:ext>
+            </a:extLst>
+          </p:cNvPr>
+          <p:cNvSpPr/>
+          <p:nvPr/>
+        </p:nvSpPr>
+        <p:spPr>
+          <a:xfrm>
+            <a:off x="2933040" y="4228509"/>
+            <a:ext cx="1486909" cy="2518456"/>
+          </a:xfrm>
+          <a:prstGeom prst="roundRect">
+            <a:avLst>
+              <a:gd name="adj" fmla="val 2100"/>
+            </a:avLst>
+          </a:prstGeom>
+          <a:solidFill>
+            <a:srgbClr val="D9D9D9"/>
+          </a:solidFill>
+        </p:spPr>
+        <p:style>
+          <a:lnRef idx="2">
+            <a:schemeClr val="accent1">
+              <a:shade val="50000"/>
+            </a:schemeClr>
+          </a:lnRef>
+          <a:fillRef idx="1">
+            <a:schemeClr val="accent1"/>
+          </a:fillRef>
+          <a:effectRef idx="0">
+            <a:schemeClr val="accent1"/>
+          </a:effectRef>
+          <a:fontRef idx="minor">
+            <a:schemeClr val="lt1"/>
+          </a:fontRef>
+        </p:style>
+        <p:txBody>
+          <a:bodyPr rtlCol="0" anchor="t"/>
+          <a:lstStyle/>
+          <a:p>
+            <a:pPr algn="ctr"/>
+            <a:r>
+              <a:rPr lang="en-NL" sz="1400" dirty="0">
+                <a:solidFill>
+                  <a:sysClr val="windowText" lastClr="000000"/>
+                </a:solidFill>
+              </a:rPr>
+              <a:t>Telemetrie &amp; Inzicht</a:t>
+            </a:r>
+          </a:p>
+        </p:txBody>
+      </p:sp>
+      <p:sp>
+        <p:nvSpPr>
+          <p:cNvPr id="42" name="Rounded Rectangle 41">
+            <a:extLst>
+              <a:ext uri="{FF2B5EF4-FFF2-40B4-BE49-F238E27FC236}">
+                <a16:creationId xmlns:a16="http://schemas.microsoft.com/office/drawing/2014/main" id="{A6AC3A0E-53C4-194D-B2E0-0325DE0D10B3}"/>
+              </a:ext>
+            </a:extLst>
+          </p:cNvPr>
+          <p:cNvSpPr/>
+          <p:nvPr/>
+        </p:nvSpPr>
+        <p:spPr>
+          <a:xfrm>
+            <a:off x="3026775" y="5458702"/>
+            <a:ext cx="1299434" cy="573336"/>
+          </a:xfrm>
+          <a:prstGeom prst="roundRect">
+            <a:avLst/>
+          </a:prstGeom>
+          <a:solidFill>
+            <a:srgbClr val="3A4298"/>
+          </a:solidFill>
+        </p:spPr>
+        <p:style>
+          <a:lnRef idx="2">
+            <a:schemeClr val="accent1">
+              <a:shade val="50000"/>
+            </a:schemeClr>
+          </a:lnRef>
+          <a:fillRef idx="1">
+            <a:schemeClr val="accent1"/>
+          </a:fillRef>
+          <a:effectRef idx="0">
+            <a:schemeClr val="accent1"/>
+          </a:effectRef>
+          <a:fontRef idx="minor">
+            <a:schemeClr val="lt1"/>
+          </a:fontRef>
+        </p:style>
+        <p:txBody>
+          <a:bodyPr rtlCol="0" anchor="ctr"/>
+          <a:lstStyle/>
+          <a:p>
+            <a:pPr algn="ctr"/>
+            <a:r>
+              <a:rPr lang="en-NL" sz="1200" dirty="0">
+                <a:latin typeface="+mj-lt"/>
+              </a:rPr>
+              <a:t>Monitoring &amp; Alerting</a:t>
+            </a:r>
+          </a:p>
+        </p:txBody>
+      </p:sp>
+      <p:sp>
+        <p:nvSpPr>
+          <p:cNvPr id="35" name="Rounded Rectangle 34">
+            <a:extLst>
+              <a:ext uri="{FF2B5EF4-FFF2-40B4-BE49-F238E27FC236}">
+                <a16:creationId xmlns:a16="http://schemas.microsoft.com/office/drawing/2014/main" id="{23700455-5CF1-084B-93E4-CE7E87E87DD4}"/>
+              </a:ext>
+            </a:extLst>
+          </p:cNvPr>
+          <p:cNvSpPr/>
+          <p:nvPr/>
+        </p:nvSpPr>
+        <p:spPr>
+          <a:xfrm>
+            <a:off x="3026775" y="4800191"/>
+            <a:ext cx="1299434" cy="573336"/>
+          </a:xfrm>
+          <a:prstGeom prst="roundRect">
+            <a:avLst/>
+          </a:prstGeom>
+          <a:solidFill>
+            <a:srgbClr val="3A4298"/>
+          </a:solidFill>
+        </p:spPr>
+        <p:style>
+          <a:lnRef idx="2">
+            <a:schemeClr val="accent1">
+              <a:shade val="50000"/>
+            </a:schemeClr>
+          </a:lnRef>
+          <a:fillRef idx="1">
+            <a:schemeClr val="accent1"/>
+          </a:fillRef>
+          <a:effectRef idx="0">
+            <a:schemeClr val="accent1"/>
+          </a:effectRef>
+          <a:fontRef idx="minor">
+            <a:schemeClr val="lt1"/>
+          </a:fontRef>
+        </p:style>
+        <p:txBody>
+          <a:bodyPr rtlCol="0" anchor="ctr"/>
+          <a:lstStyle/>
+          <a:p>
+            <a:pPr algn="ctr"/>
+            <a:r>
+              <a:rPr lang="en-NL" sz="1200" dirty="0">
+                <a:latin typeface="+mj-lt"/>
+              </a:rPr>
+              <a:t>Logging </a:t>
+            </a:r>
+            <a:r>
+              <a:rPr lang="nl-NL" sz="1200" dirty="0">
+                <a:latin typeface="+mj-lt"/>
+              </a:rPr>
+              <a:t>&amp;</a:t>
+            </a:r>
+            <a:r>
+              <a:rPr lang="en-NL" sz="1200" dirty="0">
+                <a:latin typeface="+mj-lt"/>
+              </a:rPr>
+              <a:t> Audit Trail</a:t>
+            </a:r>
+          </a:p>
+        </p:txBody>
+      </p:sp>
+      <p:sp>
+        <p:nvSpPr>
+          <p:cNvPr id="77" name="Rounded Rectangle 34">
+            <a:extLst>
+              <a:ext uri="{FF2B5EF4-FFF2-40B4-BE49-F238E27FC236}">
+                <a16:creationId xmlns:a16="http://schemas.microsoft.com/office/drawing/2014/main" id="{23700455-5CF1-084B-93E4-CE7E87E87DD4}"/>
+              </a:ext>
+            </a:extLst>
+          </p:cNvPr>
+          <p:cNvSpPr/>
+          <p:nvPr/>
+        </p:nvSpPr>
+        <p:spPr>
+          <a:xfrm>
+            <a:off x="3026775" y="6104858"/>
+            <a:ext cx="1299434" cy="573336"/>
+          </a:xfrm>
+          <a:prstGeom prst="roundRect">
+            <a:avLst/>
+          </a:prstGeom>
+          <a:solidFill>
+            <a:srgbClr val="3A4298"/>
+          </a:solidFill>
+        </p:spPr>
+        <p:style>
+          <a:lnRef idx="2">
+            <a:schemeClr val="accent1">
+              <a:shade val="50000"/>
+            </a:schemeClr>
+          </a:lnRef>
+          <a:fillRef idx="1">
+            <a:schemeClr val="accent1"/>
+          </a:fillRef>
+          <a:effectRef idx="0">
+            <a:schemeClr val="accent1"/>
+          </a:effectRef>
+          <a:fontRef idx="minor">
+            <a:schemeClr val="lt1"/>
+          </a:fontRef>
+        </p:style>
+        <p:txBody>
+          <a:bodyPr rtlCol="0" anchor="ctr"/>
+          <a:lstStyle/>
+          <a:p>
+            <a:pPr algn="ctr"/>
+            <a:r>
+              <a:rPr lang="nl-NL" sz="1200" dirty="0">
+                <a:latin typeface="+mj-lt"/>
+              </a:rPr>
+              <a:t>Analytics &amp; Dashboarding</a:t>
+            </a:r>
+            <a:endParaRPr lang="en-NL" sz="1200" dirty="0">
+              <a:latin typeface="+mj-lt"/>
+            </a:endParaRPr>
+          </a:p>
+        </p:txBody>
+      </p:sp>
+      <p:sp>
+        <p:nvSpPr>
+          <p:cNvPr id="44" name="Rounded Rectangle 43">
+            <a:extLst>
+              <a:ext uri="{FF2B5EF4-FFF2-40B4-BE49-F238E27FC236}">
+                <a16:creationId xmlns:a16="http://schemas.microsoft.com/office/drawing/2014/main" id="{B62883E1-8D45-F147-988F-B25B6ADC8673}"/>
+              </a:ext>
+            </a:extLst>
+          </p:cNvPr>
+          <p:cNvSpPr/>
+          <p:nvPr/>
+        </p:nvSpPr>
+        <p:spPr>
+          <a:xfrm>
+            <a:off x="1518195" y="4800191"/>
+            <a:ext cx="1299434" cy="573336"/>
+          </a:xfrm>
+          <a:prstGeom prst="roundRect">
+            <a:avLst/>
+          </a:prstGeom>
+          <a:solidFill>
+            <a:srgbClr val="3A4298"/>
+          </a:solidFill>
+        </p:spPr>
+        <p:style>
+          <a:lnRef idx="2">
+            <a:schemeClr val="accent1">
+              <a:shade val="50000"/>
+            </a:schemeClr>
+          </a:lnRef>
+          <a:fillRef idx="1">
+            <a:schemeClr val="accent1"/>
+          </a:fillRef>
+          <a:effectRef idx="0">
+            <a:schemeClr val="accent1"/>
+          </a:effectRef>
+          <a:fontRef idx="minor">
+            <a:schemeClr val="lt1"/>
+          </a:fontRef>
+        </p:style>
+        <p:txBody>
+          <a:bodyPr rtlCol="0" anchor="ctr"/>
+          <a:lstStyle/>
+          <a:p>
+            <a:pPr algn="ctr"/>
+            <a:r>
+              <a:rPr lang="en-NL" sz="1200" dirty="0">
+                <a:latin typeface="+mj-lt"/>
+              </a:rPr>
+              <a:t>Fout</a:t>
+            </a:r>
+          </a:p>
+          <a:p>
+            <a:pPr algn="ctr"/>
+            <a:r>
+              <a:rPr lang="en-NL" sz="1200" dirty="0">
+                <a:latin typeface="+mj-lt"/>
+              </a:rPr>
+              <a:t>afhandeling</a:t>
+            </a:r>
+          </a:p>
+        </p:txBody>
+      </p:sp>
+      <p:sp>
+        <p:nvSpPr>
+          <p:cNvPr id="52" name="Rounded Rectangle 51">
+            <a:extLst>
+              <a:ext uri="{FF2B5EF4-FFF2-40B4-BE49-F238E27FC236}">
+                <a16:creationId xmlns:a16="http://schemas.microsoft.com/office/drawing/2014/main" id="{31F77BE2-76C8-274C-8AB1-E4A9F2D9242E}"/>
+              </a:ext>
+            </a:extLst>
+          </p:cNvPr>
+          <p:cNvSpPr/>
+          <p:nvPr/>
+        </p:nvSpPr>
+        <p:spPr>
+          <a:xfrm>
+            <a:off x="149672" y="5458702"/>
+            <a:ext cx="1299434" cy="573336"/>
+          </a:xfrm>
+          <a:prstGeom prst="roundRect">
+            <a:avLst/>
+          </a:prstGeom>
+          <a:solidFill>
+            <a:srgbClr val="3A4298"/>
+          </a:solidFill>
+        </p:spPr>
+        <p:style>
+          <a:lnRef idx="2">
+            <a:schemeClr val="accent1">
+              <a:shade val="50000"/>
+            </a:schemeClr>
+          </a:lnRef>
+          <a:fillRef idx="1">
+            <a:schemeClr val="accent1"/>
+          </a:fillRef>
+          <a:effectRef idx="0">
+            <a:schemeClr val="accent1"/>
+          </a:effectRef>
+          <a:fontRef idx="minor">
+            <a:schemeClr val="lt1"/>
+          </a:fontRef>
+        </p:style>
+        <p:txBody>
+          <a:bodyPr rtlCol="0" anchor="ctr"/>
+          <a:lstStyle/>
+          <a:p>
+            <a:pPr algn="ctr"/>
+            <a:r>
+              <a:rPr lang="en-NL" sz="1200" dirty="0">
+                <a:latin typeface="+mj-lt"/>
+              </a:rPr>
+              <a:t>Rout</a:t>
+            </a:r>
+            <a:r>
+              <a:rPr lang="nl-NL" sz="1200" dirty="0">
+                <a:latin typeface="+mj-lt"/>
+              </a:rPr>
+              <a:t>er</a:t>
+            </a:r>
+            <a:r>
+              <a:rPr lang="en-NL" sz="1200" dirty="0">
+                <a:latin typeface="+mj-lt"/>
+              </a:rPr>
+              <a:t>ing</a:t>
+            </a:r>
+          </a:p>
+        </p:txBody>
+      </p:sp>
+      <p:sp>
+        <p:nvSpPr>
+          <p:cNvPr id="34" name="Rounded Rectangle 33">
+            <a:extLst>
+              <a:ext uri="{FF2B5EF4-FFF2-40B4-BE49-F238E27FC236}">
+                <a16:creationId xmlns:a16="http://schemas.microsoft.com/office/drawing/2014/main" id="{20D509D5-40A9-B142-BCA3-8243E162AFD8}"/>
+              </a:ext>
+            </a:extLst>
+          </p:cNvPr>
+          <p:cNvSpPr/>
+          <p:nvPr/>
+        </p:nvSpPr>
+        <p:spPr>
+          <a:xfrm>
+            <a:off x="1518195" y="6104858"/>
+            <a:ext cx="1299434" cy="573336"/>
+          </a:xfrm>
+          <a:prstGeom prst="roundRect">
+            <a:avLst/>
+          </a:prstGeom>
+          <a:solidFill>
+            <a:srgbClr val="3A4298"/>
+          </a:solidFill>
+        </p:spPr>
+        <p:style>
+          <a:lnRef idx="2">
+            <a:schemeClr val="accent1">
+              <a:shade val="50000"/>
+            </a:schemeClr>
+          </a:lnRef>
+          <a:fillRef idx="1">
+            <a:schemeClr val="accent1"/>
+          </a:fillRef>
+          <a:effectRef idx="0">
+            <a:schemeClr val="accent1"/>
+          </a:effectRef>
+          <a:fontRef idx="minor">
+            <a:schemeClr val="lt1"/>
+          </a:fontRef>
+        </p:style>
+        <p:txBody>
+          <a:bodyPr rtlCol="0" anchor="ctr"/>
+          <a:lstStyle/>
+          <a:p>
+            <a:pPr algn="ctr"/>
+            <a:r>
+              <a:rPr lang="en-NL" sz="1200" dirty="0">
+                <a:latin typeface="+mj-lt"/>
+              </a:rPr>
+              <a:t>Protocol conversies</a:t>
+            </a:r>
+          </a:p>
+        </p:txBody>
+      </p:sp>
+      <p:sp>
+        <p:nvSpPr>
+          <p:cNvPr id="29" name="Rounded Rectangle 28">
+            <a:extLst>
+              <a:ext uri="{FF2B5EF4-FFF2-40B4-BE49-F238E27FC236}">
+                <a16:creationId xmlns:a16="http://schemas.microsoft.com/office/drawing/2014/main" id="{D5B13440-F73D-C041-8C5E-EC28670620D2}"/>
+              </a:ext>
+            </a:extLst>
+          </p:cNvPr>
+          <p:cNvSpPr/>
+          <p:nvPr/>
+        </p:nvSpPr>
+        <p:spPr>
+          <a:xfrm>
+            <a:off x="149672" y="6104858"/>
+            <a:ext cx="1299434" cy="573336"/>
+          </a:xfrm>
+          <a:prstGeom prst="roundRect">
+            <a:avLst/>
+          </a:prstGeom>
+          <a:solidFill>
+            <a:srgbClr val="3A4298"/>
+          </a:solidFill>
+        </p:spPr>
+        <p:style>
+          <a:lnRef idx="2">
+            <a:schemeClr val="accent1">
+              <a:shade val="50000"/>
+            </a:schemeClr>
+          </a:lnRef>
+          <a:fillRef idx="1">
+            <a:schemeClr val="accent1"/>
+          </a:fillRef>
+          <a:effectRef idx="0">
+            <a:schemeClr val="accent1"/>
+          </a:effectRef>
+          <a:fontRef idx="minor">
+            <a:schemeClr val="lt1"/>
+          </a:fontRef>
+        </p:style>
+        <p:txBody>
+          <a:bodyPr rtlCol="0" anchor="ctr"/>
+          <a:lstStyle/>
+          <a:p>
+            <a:pPr algn="ctr"/>
+            <a:r>
+              <a:rPr lang="en-NL" sz="1200" dirty="0">
+                <a:latin typeface="+mj-lt"/>
+              </a:rPr>
+              <a:t>Data Transformaties</a:t>
+            </a:r>
+          </a:p>
+        </p:txBody>
+      </p:sp>
+      <p:sp>
+        <p:nvSpPr>
+          <p:cNvPr id="31" name="Rounded Rectangle 30">
+            <a:extLst>
+              <a:ext uri="{FF2B5EF4-FFF2-40B4-BE49-F238E27FC236}">
+                <a16:creationId xmlns:a16="http://schemas.microsoft.com/office/drawing/2014/main" id="{08360BF1-2669-444B-BED0-3D9411C66508}"/>
+              </a:ext>
+            </a:extLst>
+          </p:cNvPr>
+          <p:cNvSpPr/>
+          <p:nvPr/>
+        </p:nvSpPr>
+        <p:spPr>
+          <a:xfrm>
+            <a:off x="1518195" y="5458702"/>
+            <a:ext cx="1299434" cy="573336"/>
+          </a:xfrm>
+          <a:prstGeom prst="roundRect">
+            <a:avLst/>
+          </a:prstGeom>
+          <a:solidFill>
+            <a:srgbClr val="3A4298"/>
+          </a:solidFill>
+        </p:spPr>
+        <p:style>
+          <a:lnRef idx="2">
+            <a:schemeClr val="accent1">
+              <a:shade val="50000"/>
+            </a:schemeClr>
+          </a:lnRef>
+          <a:fillRef idx="1">
+            <a:schemeClr val="accent1"/>
+          </a:fillRef>
+          <a:effectRef idx="0">
+            <a:schemeClr val="accent1"/>
+          </a:effectRef>
+          <a:fontRef idx="minor">
+            <a:schemeClr val="lt1"/>
+          </a:fontRef>
+        </p:style>
+        <p:txBody>
+          <a:bodyPr rtlCol="0" anchor="ctr"/>
+          <a:lstStyle/>
+          <a:p>
+            <a:pPr algn="ctr"/>
+            <a:r>
+              <a:rPr lang="en-NL" sz="1200" dirty="0">
+                <a:latin typeface="+mj-lt"/>
+              </a:rPr>
+              <a:t>Caching</a:t>
+            </a:r>
+          </a:p>
+        </p:txBody>
+      </p:sp>
+      <p:sp>
+        <p:nvSpPr>
+          <p:cNvPr id="30" name="Rounded Rectangle 29">
+            <a:extLst>
+              <a:ext uri="{FF2B5EF4-FFF2-40B4-BE49-F238E27FC236}">
+                <a16:creationId xmlns:a16="http://schemas.microsoft.com/office/drawing/2014/main" id="{1D962EEE-DB89-944D-9623-088B18156BBE}"/>
+              </a:ext>
+            </a:extLst>
+          </p:cNvPr>
+          <p:cNvSpPr/>
+          <p:nvPr/>
+        </p:nvSpPr>
+        <p:spPr>
+          <a:xfrm>
+            <a:off x="149672" y="4800191"/>
+            <a:ext cx="1299434" cy="573336"/>
+          </a:xfrm>
+          <a:prstGeom prst="roundRect">
+            <a:avLst/>
+          </a:prstGeom>
+          <a:solidFill>
+            <a:srgbClr val="3A4298"/>
+          </a:solidFill>
+        </p:spPr>
+        <p:style>
+          <a:lnRef idx="2">
+            <a:schemeClr val="accent1">
+              <a:shade val="50000"/>
+            </a:schemeClr>
+          </a:lnRef>
+          <a:fillRef idx="1">
+            <a:schemeClr val="accent1"/>
+          </a:fillRef>
+          <a:effectRef idx="0">
+            <a:schemeClr val="accent1"/>
+          </a:effectRef>
+          <a:fontRef idx="minor">
+            <a:schemeClr val="lt1"/>
+          </a:fontRef>
+        </p:style>
+        <p:txBody>
+          <a:bodyPr rtlCol="0" anchor="ctr"/>
+          <a:lstStyle/>
+          <a:p>
+            <a:pPr algn="ctr"/>
+            <a:r>
+              <a:rPr lang="en-NL" sz="1200" dirty="0">
+                <a:latin typeface="+mj-lt"/>
+              </a:rPr>
+              <a:t>Mediatie / Orkestratie</a:t>
+            </a:r>
+          </a:p>
+        </p:txBody>
+      </p:sp>
+      <p:sp>
+        <p:nvSpPr>
+          <p:cNvPr id="48" name="Rounded Rectangle 47">
+            <a:extLst>
+              <a:ext uri="{FF2B5EF4-FFF2-40B4-BE49-F238E27FC236}">
+                <a16:creationId xmlns:a16="http://schemas.microsoft.com/office/drawing/2014/main" id="{AA311A09-63F1-C445-9D02-79BA5CF7C5BE}"/>
+              </a:ext>
+            </a:extLst>
+          </p:cNvPr>
+          <p:cNvSpPr/>
+          <p:nvPr/>
+        </p:nvSpPr>
+        <p:spPr>
+          <a:xfrm>
+            <a:off x="4479679" y="4019867"/>
+            <a:ext cx="2839016" cy="994405"/>
+          </a:xfrm>
+          <a:prstGeom prst="roundRect">
+            <a:avLst>
+              <a:gd name="adj" fmla="val 2100"/>
+            </a:avLst>
+          </a:prstGeom>
+          <a:solidFill>
+            <a:srgbClr val="D9D9D9"/>
+          </a:solidFill>
+        </p:spPr>
+        <p:style>
+          <a:lnRef idx="2">
+            <a:schemeClr val="accent1">
+              <a:shade val="50000"/>
+            </a:schemeClr>
+          </a:lnRef>
+          <a:fillRef idx="1">
+            <a:schemeClr val="accent1"/>
+          </a:fillRef>
+          <a:effectRef idx="0">
+            <a:schemeClr val="accent1"/>
+          </a:effectRef>
+          <a:fontRef idx="minor">
+            <a:schemeClr val="lt1"/>
+          </a:fontRef>
+        </p:style>
+        <p:txBody>
+          <a:bodyPr rtlCol="0" anchor="t"/>
+          <a:lstStyle/>
+          <a:p>
+            <a:pPr algn="ctr"/>
+            <a:r>
+              <a:rPr lang="en-NL" sz="1400" dirty="0">
+                <a:solidFill>
+                  <a:sysClr val="windowText" lastClr="000000"/>
+                </a:solidFill>
+              </a:rPr>
+              <a:t>Servicelevel beheer</a:t>
+            </a:r>
+          </a:p>
+        </p:txBody>
+      </p:sp>
+      <p:sp>
+        <p:nvSpPr>
+          <p:cNvPr id="14" name="Rounded Rectangle 13">
+            <a:extLst>
+              <a:ext uri="{FF2B5EF4-FFF2-40B4-BE49-F238E27FC236}">
+                <a16:creationId xmlns:a16="http://schemas.microsoft.com/office/drawing/2014/main" id="{96046C79-0F25-7644-89C7-A5FE98CA8823}"/>
+              </a:ext>
+            </a:extLst>
+          </p:cNvPr>
+          <p:cNvSpPr/>
+          <p:nvPr/>
+        </p:nvSpPr>
+        <p:spPr>
+          <a:xfrm>
+            <a:off x="5941084" y="4358408"/>
+            <a:ext cx="1299434" cy="573336"/>
+          </a:xfrm>
+          <a:prstGeom prst="roundRect">
+            <a:avLst/>
+          </a:prstGeom>
+          <a:solidFill>
+            <a:srgbClr val="3A4298"/>
+          </a:solidFill>
+        </p:spPr>
+        <p:style>
+          <a:lnRef idx="2">
+            <a:schemeClr val="accent1">
+              <a:shade val="50000"/>
+            </a:schemeClr>
+          </a:lnRef>
+          <a:fillRef idx="1">
+            <a:schemeClr val="accent1"/>
+          </a:fillRef>
+          <a:effectRef idx="0">
+            <a:schemeClr val="accent1"/>
+          </a:effectRef>
+          <a:fontRef idx="minor">
+            <a:schemeClr val="lt1"/>
+          </a:fontRef>
+        </p:style>
+        <p:txBody>
+          <a:bodyPr rtlCol="0" anchor="ctr"/>
+          <a:lstStyle/>
+          <a:p>
+            <a:pPr algn="ctr"/>
+            <a:r>
+              <a:rPr lang="en-NL" sz="1200" dirty="0">
+                <a:latin typeface="+mj-lt"/>
+              </a:rPr>
+              <a:t>Doorbelasting</a:t>
+            </a:r>
+          </a:p>
+        </p:txBody>
+      </p:sp>
+      <p:sp>
+        <p:nvSpPr>
+          <p:cNvPr id="50" name="Rounded Rectangle 49">
+            <a:extLst>
+              <a:ext uri="{FF2B5EF4-FFF2-40B4-BE49-F238E27FC236}">
+                <a16:creationId xmlns:a16="http://schemas.microsoft.com/office/drawing/2014/main" id="{5C32873E-79ED-634E-B7C3-871442944345}"/>
+              </a:ext>
+            </a:extLst>
+          </p:cNvPr>
+          <p:cNvSpPr/>
+          <p:nvPr/>
+        </p:nvSpPr>
+        <p:spPr>
+          <a:xfrm>
+            <a:off x="4553705" y="4358408"/>
+            <a:ext cx="1299434" cy="573336"/>
+          </a:xfrm>
+          <a:prstGeom prst="roundRect">
+            <a:avLst/>
+          </a:prstGeom>
+          <a:solidFill>
+            <a:srgbClr val="3A4298"/>
+          </a:solidFill>
+        </p:spPr>
+        <p:style>
+          <a:lnRef idx="2">
+            <a:schemeClr val="accent1">
+              <a:shade val="50000"/>
+            </a:schemeClr>
+          </a:lnRef>
+          <a:fillRef idx="1">
+            <a:schemeClr val="accent1"/>
+          </a:fillRef>
+          <a:effectRef idx="0">
+            <a:schemeClr val="accent1"/>
+          </a:effectRef>
+          <a:fontRef idx="minor">
+            <a:schemeClr val="lt1"/>
+          </a:fontRef>
+        </p:style>
+        <p:txBody>
+          <a:bodyPr rtlCol="0" anchor="ctr"/>
+          <a:lstStyle/>
+          <a:p>
+            <a:pPr algn="ctr"/>
+            <a:r>
+              <a:rPr lang="en-NL" sz="1200" dirty="0">
+                <a:latin typeface="+mj-lt"/>
+              </a:rPr>
+              <a:t>Rate Limiting / Throttling</a:t>
+            </a:r>
+          </a:p>
+        </p:txBody>
+      </p:sp>
+      <p:sp>
+        <p:nvSpPr>
+          <p:cNvPr id="49" name="Rounded Rectangle 48">
+            <a:extLst>
+              <a:ext uri="{FF2B5EF4-FFF2-40B4-BE49-F238E27FC236}">
+                <a16:creationId xmlns:a16="http://schemas.microsoft.com/office/drawing/2014/main" id="{1CF67D8A-3B4B-1443-88F7-0BBBFBB54CDA}"/>
+              </a:ext>
+            </a:extLst>
+          </p:cNvPr>
+          <p:cNvSpPr/>
+          <p:nvPr/>
+        </p:nvSpPr>
+        <p:spPr>
+          <a:xfrm>
+            <a:off x="4479679" y="5080330"/>
+            <a:ext cx="2839016" cy="1666638"/>
+          </a:xfrm>
+          <a:prstGeom prst="roundRect">
+            <a:avLst>
+              <a:gd name="adj" fmla="val 2100"/>
+            </a:avLst>
+          </a:prstGeom>
+          <a:solidFill>
+            <a:srgbClr val="D9D9D9"/>
+          </a:solidFill>
+        </p:spPr>
+        <p:style>
+          <a:lnRef idx="2">
+            <a:schemeClr val="accent1">
+              <a:shade val="50000"/>
+            </a:schemeClr>
+          </a:lnRef>
+          <a:fillRef idx="1">
+            <a:schemeClr val="accent1"/>
+          </a:fillRef>
+          <a:effectRef idx="0">
+            <a:schemeClr val="accent1"/>
+          </a:effectRef>
+          <a:fontRef idx="minor">
+            <a:schemeClr val="lt1"/>
+          </a:fontRef>
+        </p:style>
+        <p:txBody>
+          <a:bodyPr rtlCol="0" anchor="t"/>
+          <a:lstStyle/>
+          <a:p>
+            <a:pPr algn="ctr"/>
+            <a:r>
+              <a:rPr lang="en-NL" sz="1400" dirty="0">
+                <a:solidFill>
+                  <a:sysClr val="windowText" lastClr="000000"/>
+                </a:solidFill>
+              </a:rPr>
+              <a:t>Beveiliging</a:t>
+            </a:r>
+          </a:p>
+        </p:txBody>
+      </p:sp>
+      <p:sp>
+        <p:nvSpPr>
+          <p:cNvPr id="41" name="Rounded Rectangle 40">
+            <a:extLst>
+              <a:ext uri="{FF2B5EF4-FFF2-40B4-BE49-F238E27FC236}">
+                <a16:creationId xmlns:a16="http://schemas.microsoft.com/office/drawing/2014/main" id="{BEFA111F-B4F9-AC4D-8085-BC6A063166CB}"/>
+              </a:ext>
+            </a:extLst>
+          </p:cNvPr>
+          <p:cNvSpPr/>
+          <p:nvPr/>
+        </p:nvSpPr>
+        <p:spPr>
+          <a:xfrm>
+            <a:off x="4563473" y="5458702"/>
+            <a:ext cx="1299434" cy="573336"/>
+          </a:xfrm>
+          <a:prstGeom prst="roundRect">
+            <a:avLst/>
+          </a:prstGeom>
+          <a:solidFill>
+            <a:srgbClr val="3A4298"/>
+          </a:solidFill>
+        </p:spPr>
+        <p:style>
+          <a:lnRef idx="2">
+            <a:schemeClr val="accent1">
+              <a:shade val="50000"/>
+            </a:schemeClr>
+          </a:lnRef>
+          <a:fillRef idx="1">
+            <a:schemeClr val="accent1"/>
+          </a:fillRef>
+          <a:effectRef idx="0">
+            <a:schemeClr val="accent1"/>
+          </a:effectRef>
+          <a:fontRef idx="minor">
+            <a:schemeClr val="lt1"/>
+          </a:fontRef>
+        </p:style>
+        <p:txBody>
+          <a:bodyPr rtlCol="0" anchor="ctr"/>
+          <a:lstStyle/>
+          <a:p>
+            <a:pPr algn="ctr"/>
+            <a:r>
+              <a:rPr lang="nl-NL" sz="1200" dirty="0">
+                <a:latin typeface="+mj-lt"/>
+              </a:rPr>
+              <a:t>Identificatie &amp; Authenticatie</a:t>
+            </a:r>
+            <a:endParaRPr lang="en-NL" sz="1200" dirty="0">
+              <a:latin typeface="+mj-lt"/>
+            </a:endParaRPr>
+          </a:p>
+        </p:txBody>
+      </p:sp>
+      <p:sp>
+        <p:nvSpPr>
+          <p:cNvPr id="76" name="Rounded Rectangle 40">
+            <a:extLst>
+              <a:ext uri="{FF2B5EF4-FFF2-40B4-BE49-F238E27FC236}">
+                <a16:creationId xmlns:a16="http://schemas.microsoft.com/office/drawing/2014/main" id="{BEFA111F-B4F9-AC4D-8085-BC6A063166CB}"/>
+              </a:ext>
+            </a:extLst>
+          </p:cNvPr>
+          <p:cNvSpPr/>
+          <p:nvPr/>
+        </p:nvSpPr>
+        <p:spPr>
+          <a:xfrm>
+            <a:off x="5922639" y="5458702"/>
+            <a:ext cx="1299434" cy="573336"/>
+          </a:xfrm>
+          <a:prstGeom prst="roundRect">
+            <a:avLst/>
+          </a:prstGeom>
+          <a:solidFill>
+            <a:srgbClr val="3A4298"/>
+          </a:solidFill>
+        </p:spPr>
+        <p:style>
+          <a:lnRef idx="2">
+            <a:schemeClr val="accent1">
+              <a:shade val="50000"/>
+            </a:schemeClr>
+          </a:lnRef>
+          <a:fillRef idx="1">
+            <a:schemeClr val="accent1"/>
+          </a:fillRef>
+          <a:effectRef idx="0">
+            <a:schemeClr val="accent1"/>
+          </a:effectRef>
+          <a:fontRef idx="minor">
+            <a:schemeClr val="lt1"/>
+          </a:fontRef>
+        </p:style>
+        <p:txBody>
+          <a:bodyPr rtlCol="0" anchor="ctr"/>
+          <a:lstStyle/>
+          <a:p>
+            <a:pPr algn="ctr"/>
+            <a:r>
+              <a:rPr lang="nl-NL" sz="1200" dirty="0">
+                <a:latin typeface="+mj-lt"/>
+              </a:rPr>
+              <a:t>Autorisatie</a:t>
+            </a:r>
+            <a:endParaRPr lang="en-NL" sz="1200" dirty="0">
+              <a:latin typeface="+mj-lt"/>
+            </a:endParaRPr>
+          </a:p>
+        </p:txBody>
+      </p:sp>
+      <p:sp>
+        <p:nvSpPr>
+          <p:cNvPr id="36" name="Rounded Rectangle 35">
+            <a:extLst>
+              <a:ext uri="{FF2B5EF4-FFF2-40B4-BE49-F238E27FC236}">
+                <a16:creationId xmlns:a16="http://schemas.microsoft.com/office/drawing/2014/main" id="{3E8BA4F3-561C-D948-BE94-F344EA45A459}"/>
+              </a:ext>
+            </a:extLst>
+          </p:cNvPr>
+          <p:cNvSpPr/>
+          <p:nvPr/>
+        </p:nvSpPr>
+        <p:spPr>
+          <a:xfrm>
+            <a:off x="4553705" y="6104858"/>
+            <a:ext cx="1299434" cy="573336"/>
+          </a:xfrm>
+          <a:prstGeom prst="roundRect">
+            <a:avLst/>
+          </a:prstGeom>
+          <a:solidFill>
+            <a:srgbClr val="3A4298"/>
+          </a:solidFill>
+        </p:spPr>
+        <p:style>
+          <a:lnRef idx="2">
+            <a:schemeClr val="accent1">
+              <a:shade val="50000"/>
+            </a:schemeClr>
+          </a:lnRef>
+          <a:fillRef idx="1">
+            <a:schemeClr val="accent1"/>
+          </a:fillRef>
+          <a:effectRef idx="0">
+            <a:schemeClr val="accent1"/>
+          </a:effectRef>
+          <a:fontRef idx="minor">
+            <a:schemeClr val="lt1"/>
+          </a:fontRef>
+        </p:style>
+        <p:txBody>
+          <a:bodyPr rtlCol="0" anchor="ctr"/>
+          <a:lstStyle/>
+          <a:p>
+            <a:pPr algn="ctr"/>
+            <a:r>
+              <a:rPr lang="en-NL" sz="1200" dirty="0">
+                <a:latin typeface="+mj-lt"/>
+              </a:rPr>
+              <a:t>Policy handhaving</a:t>
+            </a:r>
+          </a:p>
+        </p:txBody>
+      </p:sp>
+      <p:sp>
+        <p:nvSpPr>
+          <p:cNvPr id="55" name="Rounded Rectangle 67">
+            <a:extLst>
+              <a:ext uri="{FF2B5EF4-FFF2-40B4-BE49-F238E27FC236}">
+                <a16:creationId xmlns:a16="http://schemas.microsoft.com/office/drawing/2014/main" id="{449DCC98-6C27-7346-B888-A2845F5B79AF}"/>
+              </a:ext>
+            </a:extLst>
+          </p:cNvPr>
+          <p:cNvSpPr/>
+          <p:nvPr/>
+        </p:nvSpPr>
+        <p:spPr>
+          <a:xfrm>
+            <a:off x="4510802" y="375833"/>
+            <a:ext cx="1404781" cy="2027848"/>
+          </a:xfrm>
+          <a:prstGeom prst="roundRect">
+            <a:avLst>
+              <a:gd name="adj" fmla="val 2100"/>
+            </a:avLst>
+          </a:prstGeom>
+          <a:solidFill>
+            <a:srgbClr val="D9D9D9"/>
+          </a:solidFill>
+        </p:spPr>
+        <p:style>
+          <a:lnRef idx="2">
+            <a:schemeClr val="accent1">
+              <a:shade val="50000"/>
+            </a:schemeClr>
+          </a:lnRef>
+          <a:fillRef idx="1">
+            <a:schemeClr val="accent1"/>
+          </a:fillRef>
+          <a:effectRef idx="0">
+            <a:schemeClr val="accent1"/>
+          </a:effectRef>
+          <a:fontRef idx="minor">
+            <a:schemeClr val="lt1"/>
+          </a:fontRef>
+        </p:style>
+        <p:txBody>
+          <a:bodyPr rtlCol="0" anchor="t"/>
+          <a:lstStyle/>
+          <a:p>
+            <a:pPr algn="ctr"/>
+            <a:r>
+              <a:rPr lang="nl-NL" sz="1400" dirty="0">
+                <a:solidFill>
+                  <a:sysClr val="windowText" lastClr="000000"/>
+                </a:solidFill>
+              </a:rPr>
+              <a:t>API </a:t>
+            </a:r>
+            <a:r>
+              <a:rPr lang="nl-NL" sz="1400" dirty="0" err="1">
+                <a:solidFill>
+                  <a:sysClr val="windowText" lastClr="000000"/>
+                </a:solidFill>
+              </a:rPr>
+              <a:t>Governance</a:t>
+            </a:r>
+            <a:endParaRPr lang="en-NL" sz="1400" dirty="0">
+              <a:solidFill>
+                <a:sysClr val="windowText" lastClr="000000"/>
+              </a:solidFill>
+            </a:endParaRPr>
+          </a:p>
+        </p:txBody>
+      </p:sp>
+      <p:sp>
+        <p:nvSpPr>
+          <p:cNvPr id="81" name="Rounded Rectangle 33">
+            <a:extLst>
+              <a:ext uri="{FF2B5EF4-FFF2-40B4-BE49-F238E27FC236}">
+                <a16:creationId xmlns:a16="http://schemas.microsoft.com/office/drawing/2014/main" id="{20D509D5-40A9-B142-BCA3-8243E162AFD8}"/>
+              </a:ext>
+            </a:extLst>
+          </p:cNvPr>
+          <p:cNvSpPr/>
+          <p:nvPr/>
+        </p:nvSpPr>
+        <p:spPr>
+          <a:xfrm>
+            <a:off x="5912871" y="6104858"/>
+            <a:ext cx="1299434" cy="573336"/>
+          </a:xfrm>
+          <a:prstGeom prst="roundRect">
+            <a:avLst/>
+          </a:prstGeom>
+          <a:solidFill>
+            <a:srgbClr val="3A4298"/>
+          </a:solidFill>
+        </p:spPr>
+        <p:style>
+          <a:lnRef idx="2">
+            <a:schemeClr val="accent1">
+              <a:shade val="50000"/>
+            </a:schemeClr>
+          </a:lnRef>
+          <a:fillRef idx="1">
+            <a:schemeClr val="accent1"/>
+          </a:fillRef>
+          <a:effectRef idx="0">
+            <a:schemeClr val="accent1"/>
+          </a:effectRef>
+          <a:fontRef idx="minor">
+            <a:schemeClr val="lt1"/>
+          </a:fontRef>
+        </p:style>
+        <p:txBody>
+          <a:bodyPr rtlCol="0" anchor="ctr"/>
+          <a:lstStyle/>
+          <a:p>
+            <a:pPr algn="ctr"/>
+            <a:r>
+              <a:rPr lang="nl-NL" sz="1200" dirty="0">
+                <a:latin typeface="+mj-lt"/>
+              </a:rPr>
+              <a:t>Anomalie detectie</a:t>
+            </a:r>
+            <a:endParaRPr lang="en-NL" sz="1200" dirty="0">
+              <a:latin typeface="+mj-lt"/>
+            </a:endParaRPr>
+          </a:p>
+        </p:txBody>
+      </p:sp>
+      <p:sp>
+        <p:nvSpPr>
+          <p:cNvPr id="57" name="Rounded Rectangle 38">
+            <a:extLst>
+              <a:ext uri="{FF2B5EF4-FFF2-40B4-BE49-F238E27FC236}">
+                <a16:creationId xmlns:a16="http://schemas.microsoft.com/office/drawing/2014/main" id="{E5C27DE2-CC0B-574B-A955-49A95A2F0DCB}"/>
+              </a:ext>
+            </a:extLst>
+          </p:cNvPr>
+          <p:cNvSpPr/>
+          <p:nvPr/>
+        </p:nvSpPr>
+        <p:spPr>
+          <a:xfrm>
+            <a:off x="4563473" y="1030903"/>
+            <a:ext cx="1299434" cy="573336"/>
+          </a:xfrm>
+          <a:prstGeom prst="roundRect">
+            <a:avLst/>
+          </a:prstGeom>
+          <a:solidFill>
+            <a:srgbClr val="3A4298"/>
+          </a:solidFill>
+        </p:spPr>
+        <p:style>
+          <a:lnRef idx="2">
+            <a:schemeClr val="accent1">
+              <a:shade val="50000"/>
+            </a:schemeClr>
+          </a:lnRef>
+          <a:fillRef idx="1">
+            <a:schemeClr val="accent1"/>
+          </a:fillRef>
+          <a:effectRef idx="0">
+            <a:schemeClr val="accent1"/>
+          </a:effectRef>
+          <a:fontRef idx="minor">
+            <a:schemeClr val="lt1"/>
+          </a:fontRef>
+        </p:style>
+        <p:txBody>
+          <a:bodyPr rtlCol="0" anchor="ctr"/>
+          <a:lstStyle/>
+          <a:p>
+            <a:pPr algn="ctr"/>
+            <a:r>
+              <a:rPr lang="nl-NL" sz="1200" dirty="0">
+                <a:latin typeface="+mj-lt"/>
+              </a:rPr>
+              <a:t>Afspraken, Standaarden &amp; Richtlijnen</a:t>
+            </a:r>
+            <a:endParaRPr lang="en-NL" sz="1200" dirty="0">
+              <a:latin typeface="+mj-lt"/>
+            </a:endParaRPr>
+          </a:p>
+        </p:txBody>
+      </p:sp>
+      <p:sp>
+        <p:nvSpPr>
+          <p:cNvPr id="2" name="Tekstvak 1"/>
+          <p:cNvSpPr txBox="1"/>
+          <p:nvPr/>
+        </p:nvSpPr>
+        <p:spPr>
+          <a:xfrm>
+            <a:off x="4656504" y="2469739"/>
+            <a:ext cx="1085169" cy="523220"/>
+          </a:xfrm>
+          <a:prstGeom prst="rect">
+            <a:avLst/>
+          </a:prstGeom>
+          <a:noFill/>
+        </p:spPr>
+        <p:txBody>
+          <a:bodyPr wrap="none" rtlCol="0">
+            <a:spAutoFit/>
+          </a:bodyPr>
+          <a:lstStyle/>
+          <a:p>
+            <a:pPr algn="ctr"/>
+            <a:r>
+              <a:rPr lang="nl-NL" sz="1400" dirty="0">
+                <a:solidFill>
+                  <a:sysClr val="windowText" lastClr="000000"/>
+                </a:solidFill>
+              </a:rPr>
+              <a:t>API </a:t>
+            </a:r>
+            <a:r>
+              <a:rPr lang="nl-NL" sz="1400" dirty="0" err="1">
+                <a:solidFill>
+                  <a:sysClr val="windowText" lastClr="000000"/>
+                </a:solidFill>
+              </a:rPr>
+              <a:t>Lifecycle</a:t>
+            </a:r>
+            <a:endParaRPr lang="nl-NL" sz="1400" dirty="0">
+              <a:solidFill>
+                <a:sysClr val="windowText" lastClr="000000"/>
+              </a:solidFill>
+            </a:endParaRPr>
+          </a:p>
+          <a:p>
+            <a:pPr algn="ctr"/>
+            <a:r>
+              <a:rPr lang="nl-NL" sz="1400" dirty="0">
+                <a:solidFill>
+                  <a:sysClr val="windowText" lastClr="000000"/>
+                </a:solidFill>
+              </a:rPr>
+              <a:t>beheer</a:t>
+            </a:r>
+            <a:endParaRPr lang="en-NL" sz="1400" dirty="0">
+              <a:solidFill>
+                <a:sysClr val="windowText" lastClr="000000"/>
+              </a:solidFill>
+            </a:endParaRPr>
+          </a:p>
+        </p:txBody>
+      </p:sp>
+      <p:sp>
+        <p:nvSpPr>
+          <p:cNvPr id="63" name="Rounded Rectangle 38">
+            <a:extLst>
+              <a:ext uri="{FF2B5EF4-FFF2-40B4-BE49-F238E27FC236}">
+                <a16:creationId xmlns:a16="http://schemas.microsoft.com/office/drawing/2014/main" id="{E5C27DE2-CC0B-574B-A955-49A95A2F0DCB}"/>
+              </a:ext>
+            </a:extLst>
+          </p:cNvPr>
+          <p:cNvSpPr/>
+          <p:nvPr/>
+        </p:nvSpPr>
+        <p:spPr>
+          <a:xfrm>
+            <a:off x="4563473" y="1680523"/>
+            <a:ext cx="1299434" cy="573336"/>
+          </a:xfrm>
+          <a:prstGeom prst="roundRect">
+            <a:avLst/>
+          </a:prstGeom>
+          <a:solidFill>
+            <a:srgbClr val="3A4298"/>
+          </a:solidFill>
+        </p:spPr>
+        <p:style>
+          <a:lnRef idx="2">
+            <a:schemeClr val="accent1">
+              <a:shade val="50000"/>
+            </a:schemeClr>
+          </a:lnRef>
+          <a:fillRef idx="1">
+            <a:schemeClr val="accent1"/>
+          </a:fillRef>
+          <a:effectRef idx="0">
+            <a:schemeClr val="accent1"/>
+          </a:effectRef>
+          <a:fontRef idx="minor">
+            <a:schemeClr val="lt1"/>
+          </a:fontRef>
+        </p:style>
+        <p:txBody>
+          <a:bodyPr rtlCol="0" anchor="ctr"/>
+          <a:lstStyle/>
+          <a:p>
+            <a:pPr algn="ctr"/>
+            <a:r>
+              <a:rPr lang="nl-NL" sz="1200" dirty="0" err="1">
+                <a:latin typeface="+mj-lt"/>
+              </a:rPr>
+              <a:t>Governance</a:t>
+            </a:r>
+            <a:r>
+              <a:rPr lang="nl-NL" sz="1200" dirty="0">
+                <a:latin typeface="+mj-lt"/>
+              </a:rPr>
+              <a:t> policy handhaving</a:t>
+            </a:r>
+            <a:endParaRPr lang="en-NL" sz="1200" dirty="0">
+              <a:latin typeface="+mj-lt"/>
+            </a:endParaRPr>
+          </a:p>
+        </p:txBody>
+      </p:sp>
+    </p:spTree>
+    <p:extLst>
+      <p:ext uri="{BB962C8B-B14F-4D97-AF65-F5344CB8AC3E}">
+        <p14:creationId xmlns:p14="http://schemas.microsoft.com/office/powerpoint/2010/main" val="2613981220"/>
       </p:ext>
     </p:extLst>
   </p:cSld>

</xml_diff>